<commit_message>
adding the files and folders related with the paper
</commit_message>
<xml_diff>
--- a/text/fig5_responses_to_conditions.pptx
+++ b/text/fig5_responses_to_conditions.pptx
@@ -288,7 +288,7 @@
           <a:p>
             <a:fld id="{1FCDAA73-CC50-0946-9171-AC34B7EC631E}" type="datetimeFigureOut">
               <a:rPr lang="en-US" smtClean="0"/>
-              <a:t>1/5/16</a:t>
+              <a:t>1/8/16</a:t>
             </a:fld>
             <a:endParaRPr lang="en-US"/>
           </a:p>
@@ -458,7 +458,7 @@
           <a:p>
             <a:fld id="{1FCDAA73-CC50-0946-9171-AC34B7EC631E}" type="datetimeFigureOut">
               <a:rPr lang="en-US" smtClean="0"/>
-              <a:t>1/5/16</a:t>
+              <a:t>1/8/16</a:t>
             </a:fld>
             <a:endParaRPr lang="en-US"/>
           </a:p>
@@ -638,7 +638,7 @@
           <a:p>
             <a:fld id="{1FCDAA73-CC50-0946-9171-AC34B7EC631E}" type="datetimeFigureOut">
               <a:rPr lang="en-US" smtClean="0"/>
-              <a:t>1/5/16</a:t>
+              <a:t>1/8/16</a:t>
             </a:fld>
             <a:endParaRPr lang="en-US"/>
           </a:p>
@@ -808,7 +808,7 @@
           <a:p>
             <a:fld id="{1FCDAA73-CC50-0946-9171-AC34B7EC631E}" type="datetimeFigureOut">
               <a:rPr lang="en-US" smtClean="0"/>
-              <a:t>1/5/16</a:t>
+              <a:t>1/8/16</a:t>
             </a:fld>
             <a:endParaRPr lang="en-US"/>
           </a:p>
@@ -1054,7 +1054,7 @@
           <a:p>
             <a:fld id="{1FCDAA73-CC50-0946-9171-AC34B7EC631E}" type="datetimeFigureOut">
               <a:rPr lang="en-US" smtClean="0"/>
-              <a:t>1/5/16</a:t>
+              <a:t>1/8/16</a:t>
             </a:fld>
             <a:endParaRPr lang="en-US"/>
           </a:p>
@@ -1342,7 +1342,7 @@
           <a:p>
             <a:fld id="{1FCDAA73-CC50-0946-9171-AC34B7EC631E}" type="datetimeFigureOut">
               <a:rPr lang="en-US" smtClean="0"/>
-              <a:t>1/5/16</a:t>
+              <a:t>1/8/16</a:t>
             </a:fld>
             <a:endParaRPr lang="en-US"/>
           </a:p>
@@ -1769,7 +1769,7 @@
           <a:p>
             <a:fld id="{1FCDAA73-CC50-0946-9171-AC34B7EC631E}" type="datetimeFigureOut">
               <a:rPr lang="en-US" smtClean="0"/>
-              <a:t>1/5/16</a:t>
+              <a:t>1/8/16</a:t>
             </a:fld>
             <a:endParaRPr lang="en-US"/>
           </a:p>
@@ -1887,7 +1887,7 @@
           <a:p>
             <a:fld id="{1FCDAA73-CC50-0946-9171-AC34B7EC631E}" type="datetimeFigureOut">
               <a:rPr lang="en-US" smtClean="0"/>
-              <a:t>1/5/16</a:t>
+              <a:t>1/8/16</a:t>
             </a:fld>
             <a:endParaRPr lang="en-US"/>
           </a:p>
@@ -1982,7 +1982,7 @@
           <a:p>
             <a:fld id="{1FCDAA73-CC50-0946-9171-AC34B7EC631E}" type="datetimeFigureOut">
               <a:rPr lang="en-US" smtClean="0"/>
-              <a:t>1/5/16</a:t>
+              <a:t>1/8/16</a:t>
             </a:fld>
             <a:endParaRPr lang="en-US"/>
           </a:p>
@@ -2259,7 +2259,7 @@
           <a:p>
             <a:fld id="{1FCDAA73-CC50-0946-9171-AC34B7EC631E}" type="datetimeFigureOut">
               <a:rPr lang="en-US" smtClean="0"/>
-              <a:t>1/5/16</a:t>
+              <a:t>1/8/16</a:t>
             </a:fld>
             <a:endParaRPr lang="en-US"/>
           </a:p>
@@ -2512,7 +2512,7 @@
           <a:p>
             <a:fld id="{1FCDAA73-CC50-0946-9171-AC34B7EC631E}" type="datetimeFigureOut">
               <a:rPr lang="en-US" smtClean="0"/>
-              <a:t>1/5/16</a:t>
+              <a:t>1/8/16</a:t>
             </a:fld>
             <a:endParaRPr lang="en-US"/>
           </a:p>
@@ -2725,7 +2725,7 @@
           <a:p>
             <a:fld id="{1FCDAA73-CC50-0946-9171-AC34B7EC631E}" type="datetimeFigureOut">
               <a:rPr lang="en-US" smtClean="0"/>
-              <a:t>1/5/16</a:t>
+              <a:t>1/8/16</a:t>
             </a:fld>
             <a:endParaRPr lang="en-US"/>
           </a:p>
@@ -3520,10 +3520,6 @@
                   <a:rPr lang="en-US" sz="1200" dirty="0" smtClean="0"/>
                   <a:t>Carbon </a:t>
                 </a:r>
-                <a:r>
-                  <a:rPr lang="en-US" sz="1200" dirty="0" smtClean="0"/>
-                  <a:t/>
-                </a:r>
                 <a:br>
                   <a:rPr lang="en-US" sz="1200" dirty="0" smtClean="0"/>
                 </a:br>
@@ -4056,10 +4052,6 @@
                 <a:r>
                   <a:rPr lang="en-US" sz="1200" dirty="0" smtClean="0"/>
                   <a:t>Carbon </a:t>
-                </a:r>
-                <a:r>
-                  <a:rPr lang="en-US" sz="1200" dirty="0" smtClean="0"/>
-                  <a:t/>
                 </a:r>
                 <a:br>
                   <a:rPr lang="en-US" sz="1200" dirty="0" smtClean="0"/>
@@ -4598,10 +4590,6 @@
                   <a:rPr lang="en-US" sz="1200" dirty="0" smtClean="0"/>
                   <a:t>Carbon </a:t>
                 </a:r>
-                <a:r>
-                  <a:rPr lang="en-US" sz="1200" dirty="0" smtClean="0"/>
-                  <a:t/>
-                </a:r>
                 <a:br>
                   <a:rPr lang="en-US" sz="1200" dirty="0" smtClean="0"/>
                 </a:br>
@@ -5135,10 +5123,6 @@
                   <a:rPr lang="en-US" sz="1200" dirty="0" smtClean="0"/>
                   <a:t>Carbon </a:t>
                 </a:r>
-                <a:r>
-                  <a:rPr lang="en-US" sz="1200" dirty="0" smtClean="0"/>
-                  <a:t/>
-                </a:r>
                 <a:br>
                   <a:rPr lang="en-US" sz="1200" dirty="0" smtClean="0"/>
                 </a:br>
@@ -5369,6 +5353,126 @@
               <a:t>Stationary</a:t>
             </a:r>
             <a:endParaRPr lang="en-US" dirty="0"/>
+          </a:p>
+        </p:txBody>
+      </p:sp>
+      <p:sp>
+        <p:nvSpPr>
+          <p:cNvPr id="2" name="TextBox 1"/>
+          <p:cNvSpPr txBox="1"/>
+          <p:nvPr/>
+        </p:nvSpPr>
+        <p:spPr>
+          <a:xfrm>
+            <a:off x="300826" y="2463756"/>
+            <a:ext cx="325730" cy="369332"/>
+          </a:xfrm>
+          <a:prstGeom prst="rect">
+            <a:avLst/>
+          </a:prstGeom>
+          <a:noFill/>
+        </p:spPr>
+        <p:txBody>
+          <a:bodyPr wrap="none" rtlCol="0">
+            <a:spAutoFit/>
+          </a:bodyPr>
+          <a:lstStyle/>
+          <a:p>
+            <a:r>
+              <a:rPr lang="en-US" b="1" dirty="0" smtClean="0"/>
+              <a:t>A</a:t>
+            </a:r>
+            <a:endParaRPr lang="en-US" b="1" dirty="0"/>
+          </a:p>
+        </p:txBody>
+      </p:sp>
+      <p:sp>
+        <p:nvSpPr>
+          <p:cNvPr id="75" name="TextBox 74"/>
+          <p:cNvSpPr txBox="1"/>
+          <p:nvPr/>
+        </p:nvSpPr>
+        <p:spPr>
+          <a:xfrm>
+            <a:off x="300826" y="5880318"/>
+            <a:ext cx="306845" cy="369332"/>
+          </a:xfrm>
+          <a:prstGeom prst="rect">
+            <a:avLst/>
+          </a:prstGeom>
+          <a:noFill/>
+        </p:spPr>
+        <p:txBody>
+          <a:bodyPr wrap="none" rtlCol="0">
+            <a:spAutoFit/>
+          </a:bodyPr>
+          <a:lstStyle/>
+          <a:p>
+            <a:r>
+              <a:rPr lang="en-US" b="1" dirty="0"/>
+              <a:t>C</a:t>
+            </a:r>
+            <a:endParaRPr lang="en-US" b="1" dirty="0"/>
+          </a:p>
+        </p:txBody>
+      </p:sp>
+      <p:sp>
+        <p:nvSpPr>
+          <p:cNvPr id="76" name="TextBox 75"/>
+          <p:cNvSpPr txBox="1"/>
+          <p:nvPr/>
+        </p:nvSpPr>
+        <p:spPr>
+          <a:xfrm>
+            <a:off x="4299766" y="5880318"/>
+            <a:ext cx="330176" cy="369332"/>
+          </a:xfrm>
+          <a:prstGeom prst="rect">
+            <a:avLst/>
+          </a:prstGeom>
+          <a:noFill/>
+        </p:spPr>
+        <p:txBody>
+          <a:bodyPr wrap="none" rtlCol="0">
+            <a:spAutoFit/>
+          </a:bodyPr>
+          <a:lstStyle/>
+          <a:p>
+            <a:r>
+              <a:rPr lang="en-US" b="1" dirty="0" smtClean="0"/>
+              <a:t>D</a:t>
+            </a:r>
+            <a:endParaRPr lang="en-US" b="1" dirty="0"/>
+          </a:p>
+        </p:txBody>
+      </p:sp>
+      <p:sp>
+        <p:nvSpPr>
+          <p:cNvPr id="77" name="TextBox 76"/>
+          <p:cNvSpPr txBox="1"/>
+          <p:nvPr/>
+        </p:nvSpPr>
+        <p:spPr>
+          <a:xfrm>
+            <a:off x="4299766" y="2463756"/>
+            <a:ext cx="314058" cy="369332"/>
+          </a:xfrm>
+          <a:prstGeom prst="rect">
+            <a:avLst/>
+          </a:prstGeom>
+          <a:noFill/>
+        </p:spPr>
+        <p:txBody>
+          <a:bodyPr wrap="none" rtlCol="0">
+            <a:spAutoFit/>
+          </a:bodyPr>
+          <a:lstStyle/>
+          <a:p>
+            <a:r>
+              <a:rPr lang="en-US" b="1" dirty="0"/>
+              <a:t>B</a:t>
+            </a:r>
+            <a:endParaRPr lang="en-US" b="1" dirty="0"/>
           </a:p>
         </p:txBody>
       </p:sp>

</xml_diff>

<commit_message>
small change in figure 5
</commit_message>
<xml_diff>
--- a/text/fig5_responses_to_conditions.pptx
+++ b/text/fig5_responses_to_conditions.pptx
@@ -3100,2382 +3100,2107 @@
           <a:chExt cx="0" cy="0"/>
         </a:xfrm>
       </p:grpSpPr>
+      <p:sp>
+        <p:nvSpPr>
+          <p:cNvPr id="7" name="Oval 6"/>
+          <p:cNvSpPr/>
+          <p:nvPr/>
+        </p:nvSpPr>
+        <p:spPr>
+          <a:xfrm>
+            <a:off x="1744147" y="2258969"/>
+            <a:ext cx="1686771" cy="1658060"/>
+          </a:xfrm>
+          <a:prstGeom prst="ellipse">
+            <a:avLst/>
+          </a:prstGeom>
+          <a:solidFill>
+            <a:schemeClr val="accent5">
+              <a:alpha val="43000"/>
+            </a:schemeClr>
+          </a:solidFill>
+          <a:ln>
+            <a:solidFill>
+              <a:srgbClr val="000000"/>
+            </a:solidFill>
+          </a:ln>
+          <a:effectLst/>
+        </p:spPr>
+        <p:style>
+          <a:lnRef idx="1">
+            <a:schemeClr val="accent1"/>
+          </a:lnRef>
+          <a:fillRef idx="3">
+            <a:schemeClr val="accent1"/>
+          </a:fillRef>
+          <a:effectRef idx="2">
+            <a:schemeClr val="accent1"/>
+          </a:effectRef>
+          <a:fontRef idx="minor">
+            <a:schemeClr val="lt1"/>
+          </a:fontRef>
+        </p:style>
+        <p:txBody>
+          <a:bodyPr rtlCol="0" anchor="ctr"/>
+          <a:lstStyle/>
+          <a:p>
+            <a:pPr algn="ctr"/>
+            <a:endParaRPr lang="en-US" sz="1200"/>
+          </a:p>
+        </p:txBody>
+      </p:sp>
+      <p:sp>
+        <p:nvSpPr>
+          <p:cNvPr id="8" name="Oval 7"/>
+          <p:cNvSpPr/>
+          <p:nvPr/>
+        </p:nvSpPr>
+        <p:spPr>
+          <a:xfrm>
+            <a:off x="571302" y="2258969"/>
+            <a:ext cx="1686771" cy="1658060"/>
+          </a:xfrm>
+          <a:prstGeom prst="ellipse">
+            <a:avLst/>
+          </a:prstGeom>
+          <a:solidFill>
+            <a:schemeClr val="accent4">
+              <a:alpha val="50000"/>
+            </a:schemeClr>
+          </a:solidFill>
+          <a:ln>
+            <a:solidFill>
+              <a:schemeClr val="tx1"/>
+            </a:solidFill>
+          </a:ln>
+          <a:effectLst/>
+        </p:spPr>
+        <p:style>
+          <a:lnRef idx="1">
+            <a:schemeClr val="accent1"/>
+          </a:lnRef>
+          <a:fillRef idx="3">
+            <a:schemeClr val="accent1"/>
+          </a:fillRef>
+          <a:effectRef idx="2">
+            <a:schemeClr val="accent1"/>
+          </a:effectRef>
+          <a:fontRef idx="minor">
+            <a:schemeClr val="lt1"/>
+          </a:fontRef>
+        </p:style>
+        <p:txBody>
+          <a:bodyPr rtlCol="0" anchor="ctr"/>
+          <a:lstStyle/>
+          <a:p>
+            <a:pPr algn="ctr"/>
+            <a:endParaRPr lang="en-US" sz="1200"/>
+          </a:p>
+        </p:txBody>
+      </p:sp>
+      <p:sp>
+        <p:nvSpPr>
+          <p:cNvPr id="9" name="Oval 8"/>
+          <p:cNvSpPr/>
+          <p:nvPr/>
+        </p:nvSpPr>
+        <p:spPr>
+          <a:xfrm>
+            <a:off x="1185717" y="3034884"/>
+            <a:ext cx="1686771" cy="1658060"/>
+          </a:xfrm>
+          <a:prstGeom prst="ellipse">
+            <a:avLst/>
+          </a:prstGeom>
+          <a:solidFill>
+            <a:schemeClr val="accent6">
+              <a:alpha val="39000"/>
+            </a:schemeClr>
+          </a:solidFill>
+          <a:ln>
+            <a:solidFill>
+              <a:srgbClr val="000000"/>
+            </a:solidFill>
+          </a:ln>
+          <a:effectLst/>
+        </p:spPr>
+        <p:style>
+          <a:lnRef idx="1">
+            <a:schemeClr val="accent1"/>
+          </a:lnRef>
+          <a:fillRef idx="3">
+            <a:schemeClr val="accent1"/>
+          </a:fillRef>
+          <a:effectRef idx="2">
+            <a:schemeClr val="accent1"/>
+          </a:effectRef>
+          <a:fontRef idx="minor">
+            <a:schemeClr val="lt1"/>
+          </a:fontRef>
+        </p:style>
+        <p:txBody>
+          <a:bodyPr rtlCol="0" anchor="ctr"/>
+          <a:lstStyle/>
+          <a:p>
+            <a:pPr algn="ctr"/>
+            <a:endParaRPr lang="en-US" sz="1200"/>
+          </a:p>
+        </p:txBody>
+      </p:sp>
+      <p:sp>
+        <p:nvSpPr>
+          <p:cNvPr id="10" name="TextBox 9"/>
+          <p:cNvSpPr txBox="1"/>
+          <p:nvPr/>
+        </p:nvSpPr>
+        <p:spPr>
+          <a:xfrm>
+            <a:off x="920141" y="2815709"/>
+            <a:ext cx="531154" cy="276999"/>
+          </a:xfrm>
+          <a:prstGeom prst="rect">
+            <a:avLst/>
+          </a:prstGeom>
+          <a:noFill/>
+        </p:spPr>
+        <p:txBody>
+          <a:bodyPr wrap="square" rtlCol="0">
+            <a:spAutoFit/>
+          </a:bodyPr>
+          <a:lstStyle/>
+          <a:p>
+            <a:pPr algn="ctr"/>
+            <a:r>
+              <a:rPr lang="en-US" sz="1200" dirty="0" smtClean="0"/>
+              <a:t>234</a:t>
+            </a:r>
+            <a:endParaRPr lang="en-US" sz="1200" dirty="0"/>
+          </a:p>
+        </p:txBody>
+      </p:sp>
+      <p:sp>
+        <p:nvSpPr>
+          <p:cNvPr id="11" name="TextBox 10"/>
+          <p:cNvSpPr txBox="1"/>
+          <p:nvPr/>
+        </p:nvSpPr>
+        <p:spPr>
+          <a:xfrm>
+            <a:off x="1726920" y="2706121"/>
+            <a:ext cx="531154" cy="276999"/>
+          </a:xfrm>
+          <a:prstGeom prst="rect">
+            <a:avLst/>
+          </a:prstGeom>
+          <a:noFill/>
+        </p:spPr>
+        <p:txBody>
+          <a:bodyPr wrap="square" rtlCol="0">
+            <a:spAutoFit/>
+          </a:bodyPr>
+          <a:lstStyle/>
+          <a:p>
+            <a:pPr algn="ctr"/>
+            <a:r>
+              <a:rPr lang="en-US" sz="1200" dirty="0" smtClean="0"/>
+              <a:t>1132</a:t>
+            </a:r>
+            <a:endParaRPr lang="en-US" sz="1200" dirty="0"/>
+          </a:p>
+        </p:txBody>
+      </p:sp>
+      <p:sp>
+        <p:nvSpPr>
+          <p:cNvPr id="12" name="TextBox 11"/>
+          <p:cNvSpPr txBox="1"/>
+          <p:nvPr/>
+        </p:nvSpPr>
+        <p:spPr>
+          <a:xfrm>
+            <a:off x="2520779" y="2815709"/>
+            <a:ext cx="531154" cy="276999"/>
+          </a:xfrm>
+          <a:prstGeom prst="rect">
+            <a:avLst/>
+          </a:prstGeom>
+          <a:noFill/>
+        </p:spPr>
+        <p:txBody>
+          <a:bodyPr wrap="square" rtlCol="0">
+            <a:spAutoFit/>
+          </a:bodyPr>
+          <a:lstStyle/>
+          <a:p>
+            <a:pPr algn="ctr"/>
+            <a:r>
+              <a:rPr lang="en-US" sz="1200" dirty="0" smtClean="0"/>
+              <a:t>794</a:t>
+            </a:r>
+            <a:endParaRPr lang="en-US" sz="1200" dirty="0"/>
+          </a:p>
+        </p:txBody>
+      </p:sp>
+      <p:sp>
+        <p:nvSpPr>
+          <p:cNvPr id="13" name="TextBox 12"/>
+          <p:cNvSpPr txBox="1"/>
+          <p:nvPr/>
+        </p:nvSpPr>
+        <p:spPr>
+          <a:xfrm>
+            <a:off x="1276157" y="3466014"/>
+            <a:ext cx="531154" cy="276999"/>
+          </a:xfrm>
+          <a:prstGeom prst="rect">
+            <a:avLst/>
+          </a:prstGeom>
+          <a:noFill/>
+        </p:spPr>
+        <p:txBody>
+          <a:bodyPr wrap="square" rtlCol="0">
+            <a:spAutoFit/>
+          </a:bodyPr>
+          <a:lstStyle/>
+          <a:p>
+            <a:pPr algn="ctr"/>
+            <a:r>
+              <a:rPr lang="en-US" sz="1200" dirty="0" smtClean="0"/>
+              <a:t>22</a:t>
+            </a:r>
+            <a:endParaRPr lang="en-US" sz="1200" dirty="0"/>
+          </a:p>
+        </p:txBody>
+      </p:sp>
+      <p:sp>
+        <p:nvSpPr>
+          <p:cNvPr id="14" name="TextBox 13"/>
+          <p:cNvSpPr txBox="1"/>
+          <p:nvPr/>
+        </p:nvSpPr>
+        <p:spPr>
+          <a:xfrm>
+            <a:off x="1726920" y="3186082"/>
+            <a:ext cx="531154" cy="276999"/>
+          </a:xfrm>
+          <a:prstGeom prst="rect">
+            <a:avLst/>
+          </a:prstGeom>
+          <a:noFill/>
+        </p:spPr>
+        <p:txBody>
+          <a:bodyPr wrap="square" rtlCol="0">
+            <a:spAutoFit/>
+          </a:bodyPr>
+          <a:lstStyle/>
+          <a:p>
+            <a:pPr algn="ctr"/>
+            <a:r>
+              <a:rPr lang="en-US" sz="1200" dirty="0" smtClean="0"/>
+              <a:t>234</a:t>
+            </a:r>
+            <a:endParaRPr lang="en-US" sz="1200" dirty="0"/>
+          </a:p>
+        </p:txBody>
+      </p:sp>
+      <p:sp>
+        <p:nvSpPr>
+          <p:cNvPr id="15" name="TextBox 14"/>
+          <p:cNvSpPr txBox="1"/>
+          <p:nvPr/>
+        </p:nvSpPr>
+        <p:spPr>
+          <a:xfrm>
+            <a:off x="2187731" y="3466014"/>
+            <a:ext cx="531154" cy="276999"/>
+          </a:xfrm>
+          <a:prstGeom prst="rect">
+            <a:avLst/>
+          </a:prstGeom>
+          <a:noFill/>
+        </p:spPr>
+        <p:txBody>
+          <a:bodyPr wrap="square" rtlCol="0">
+            <a:spAutoFit/>
+          </a:bodyPr>
+          <a:lstStyle/>
+          <a:p>
+            <a:pPr algn="ctr"/>
+            <a:r>
+              <a:rPr lang="en-US" sz="1200" dirty="0" smtClean="0"/>
+              <a:t>83</a:t>
+            </a:r>
+            <a:endParaRPr lang="en-US" sz="1200" dirty="0"/>
+          </a:p>
+        </p:txBody>
+      </p:sp>
+      <p:sp>
+        <p:nvSpPr>
+          <p:cNvPr id="16" name="TextBox 15"/>
+          <p:cNvSpPr txBox="1"/>
+          <p:nvPr/>
+        </p:nvSpPr>
+        <p:spPr>
+          <a:xfrm>
+            <a:off x="1726920" y="4025878"/>
+            <a:ext cx="531154" cy="276999"/>
+          </a:xfrm>
+          <a:prstGeom prst="rect">
+            <a:avLst/>
+          </a:prstGeom>
+          <a:noFill/>
+        </p:spPr>
+        <p:txBody>
+          <a:bodyPr wrap="square" rtlCol="0">
+            <a:spAutoFit/>
+          </a:bodyPr>
+          <a:lstStyle/>
+          <a:p>
+            <a:pPr algn="ctr"/>
+            <a:r>
+              <a:rPr lang="en-US" sz="1200" dirty="0" smtClean="0"/>
+              <a:t>77</a:t>
+            </a:r>
+            <a:endParaRPr lang="en-US" sz="1200" dirty="0"/>
+          </a:p>
+        </p:txBody>
+      </p:sp>
+      <p:sp>
+        <p:nvSpPr>
+          <p:cNvPr id="17" name="TextBox 16"/>
+          <p:cNvSpPr txBox="1"/>
+          <p:nvPr/>
+        </p:nvSpPr>
+        <p:spPr>
+          <a:xfrm>
+            <a:off x="131401" y="2213390"/>
+            <a:ext cx="636938" cy="461665"/>
+          </a:xfrm>
+          <a:prstGeom prst="rect">
+            <a:avLst/>
+          </a:prstGeom>
+          <a:noFill/>
+        </p:spPr>
+        <p:txBody>
+          <a:bodyPr wrap="none" rtlCol="0">
+            <a:spAutoFit/>
+          </a:bodyPr>
+          <a:lstStyle/>
+          <a:p>
+            <a:r>
+              <a:rPr lang="en-US" sz="1200" dirty="0" smtClean="0"/>
+              <a:t>Carbon </a:t>
+            </a:r>
+            <a:br>
+              <a:rPr lang="en-US" sz="1200" dirty="0" smtClean="0"/>
+            </a:br>
+            <a:r>
+              <a:rPr lang="en-US" sz="1200" dirty="0" smtClean="0"/>
+              <a:t>Source</a:t>
+            </a:r>
+            <a:endParaRPr lang="en-US" sz="1200" dirty="0"/>
+          </a:p>
+        </p:txBody>
+      </p:sp>
+      <p:sp>
+        <p:nvSpPr>
+          <p:cNvPr id="18" name="TextBox 17"/>
+          <p:cNvSpPr txBox="1"/>
+          <p:nvPr/>
+        </p:nvSpPr>
+        <p:spPr>
+          <a:xfrm>
+            <a:off x="3157135" y="2280708"/>
+            <a:ext cx="800220" cy="276999"/>
+          </a:xfrm>
+          <a:prstGeom prst="rect">
+            <a:avLst/>
+          </a:prstGeom>
+          <a:noFill/>
+        </p:spPr>
+        <p:txBody>
+          <a:bodyPr wrap="none" rtlCol="0">
+            <a:spAutoFit/>
+          </a:bodyPr>
+          <a:lstStyle/>
+          <a:p>
+            <a:r>
+              <a:rPr lang="en-US" sz="1200" dirty="0" smtClean="0"/>
+              <a:t>Mg Stress</a:t>
+            </a:r>
+            <a:endParaRPr lang="en-US" sz="1200" dirty="0"/>
+          </a:p>
+        </p:txBody>
+      </p:sp>
+      <p:sp>
+        <p:nvSpPr>
+          <p:cNvPr id="19" name="TextBox 18"/>
+          <p:cNvSpPr txBox="1"/>
+          <p:nvPr/>
+        </p:nvSpPr>
+        <p:spPr>
+          <a:xfrm>
+            <a:off x="1627947" y="4691790"/>
+            <a:ext cx="774571" cy="276999"/>
+          </a:xfrm>
+          <a:prstGeom prst="rect">
+            <a:avLst/>
+          </a:prstGeom>
+          <a:noFill/>
+        </p:spPr>
+        <p:txBody>
+          <a:bodyPr wrap="none" rtlCol="0">
+            <a:spAutoFit/>
+          </a:bodyPr>
+          <a:lstStyle/>
+          <a:p>
+            <a:r>
+              <a:rPr lang="en-US" sz="1200" dirty="0" smtClean="0"/>
+              <a:t>Na Stress</a:t>
+            </a:r>
+            <a:endParaRPr lang="en-US" sz="1200" dirty="0"/>
+          </a:p>
+        </p:txBody>
+      </p:sp>
+      <p:sp>
+        <p:nvSpPr>
+          <p:cNvPr id="23" name="Oval 22"/>
+          <p:cNvSpPr/>
+          <p:nvPr/>
+        </p:nvSpPr>
+        <p:spPr>
+          <a:xfrm>
+            <a:off x="1747512" y="5620520"/>
+            <a:ext cx="1686771" cy="1658060"/>
+          </a:xfrm>
+          <a:prstGeom prst="ellipse">
+            <a:avLst/>
+          </a:prstGeom>
+          <a:solidFill>
+            <a:schemeClr val="accent5">
+              <a:alpha val="43000"/>
+            </a:schemeClr>
+          </a:solidFill>
+          <a:ln>
+            <a:solidFill>
+              <a:srgbClr val="000000"/>
+            </a:solidFill>
+          </a:ln>
+          <a:effectLst/>
+        </p:spPr>
+        <p:style>
+          <a:lnRef idx="1">
+            <a:schemeClr val="accent1"/>
+          </a:lnRef>
+          <a:fillRef idx="3">
+            <a:schemeClr val="accent1"/>
+          </a:fillRef>
+          <a:effectRef idx="2">
+            <a:schemeClr val="accent1"/>
+          </a:effectRef>
+          <a:fontRef idx="minor">
+            <a:schemeClr val="lt1"/>
+          </a:fontRef>
+        </p:style>
+        <p:txBody>
+          <a:bodyPr rtlCol="0" anchor="ctr"/>
+          <a:lstStyle/>
+          <a:p>
+            <a:pPr algn="ctr"/>
+            <a:endParaRPr lang="en-US" sz="1200"/>
+          </a:p>
+        </p:txBody>
+      </p:sp>
+      <p:sp>
+        <p:nvSpPr>
+          <p:cNvPr id="24" name="Oval 23"/>
+          <p:cNvSpPr/>
+          <p:nvPr/>
+        </p:nvSpPr>
+        <p:spPr>
+          <a:xfrm>
+            <a:off x="574668" y="5620520"/>
+            <a:ext cx="1686771" cy="1658060"/>
+          </a:xfrm>
+          <a:prstGeom prst="ellipse">
+            <a:avLst/>
+          </a:prstGeom>
+          <a:solidFill>
+            <a:schemeClr val="accent4">
+              <a:alpha val="50000"/>
+            </a:schemeClr>
+          </a:solidFill>
+          <a:ln>
+            <a:solidFill>
+              <a:schemeClr val="tx1"/>
+            </a:solidFill>
+          </a:ln>
+          <a:effectLst/>
+        </p:spPr>
+        <p:style>
+          <a:lnRef idx="1">
+            <a:schemeClr val="accent1"/>
+          </a:lnRef>
+          <a:fillRef idx="3">
+            <a:schemeClr val="accent1"/>
+          </a:fillRef>
+          <a:effectRef idx="2">
+            <a:schemeClr val="accent1"/>
+          </a:effectRef>
+          <a:fontRef idx="minor">
+            <a:schemeClr val="lt1"/>
+          </a:fontRef>
+        </p:style>
+        <p:txBody>
+          <a:bodyPr rtlCol="0" anchor="ctr"/>
+          <a:lstStyle/>
+          <a:p>
+            <a:pPr algn="ctr"/>
+            <a:endParaRPr lang="en-US" sz="1200"/>
+          </a:p>
+        </p:txBody>
+      </p:sp>
+      <p:sp>
+        <p:nvSpPr>
+          <p:cNvPr id="25" name="Oval 24"/>
+          <p:cNvSpPr/>
+          <p:nvPr/>
+        </p:nvSpPr>
+        <p:spPr>
+          <a:xfrm>
+            <a:off x="1189083" y="6396435"/>
+            <a:ext cx="1686771" cy="1658060"/>
+          </a:xfrm>
+          <a:prstGeom prst="ellipse">
+            <a:avLst/>
+          </a:prstGeom>
+          <a:solidFill>
+            <a:schemeClr val="accent6">
+              <a:alpha val="39000"/>
+            </a:schemeClr>
+          </a:solidFill>
+          <a:ln>
+            <a:solidFill>
+              <a:srgbClr val="000000"/>
+            </a:solidFill>
+          </a:ln>
+          <a:effectLst/>
+        </p:spPr>
+        <p:style>
+          <a:lnRef idx="1">
+            <a:schemeClr val="accent1"/>
+          </a:lnRef>
+          <a:fillRef idx="3">
+            <a:schemeClr val="accent1"/>
+          </a:fillRef>
+          <a:effectRef idx="2">
+            <a:schemeClr val="accent1"/>
+          </a:effectRef>
+          <a:fontRef idx="minor">
+            <a:schemeClr val="lt1"/>
+          </a:fontRef>
+        </p:style>
+        <p:txBody>
+          <a:bodyPr rtlCol="0" anchor="ctr"/>
+          <a:lstStyle/>
+          <a:p>
+            <a:pPr algn="ctr"/>
+            <a:endParaRPr lang="en-US" sz="1200"/>
+          </a:p>
+        </p:txBody>
+      </p:sp>
+      <p:sp>
+        <p:nvSpPr>
+          <p:cNvPr id="26" name="TextBox 25"/>
+          <p:cNvSpPr txBox="1"/>
+          <p:nvPr/>
+        </p:nvSpPr>
+        <p:spPr>
+          <a:xfrm>
+            <a:off x="923507" y="6177260"/>
+            <a:ext cx="531154" cy="276999"/>
+          </a:xfrm>
+          <a:prstGeom prst="rect">
+            <a:avLst/>
+          </a:prstGeom>
+          <a:noFill/>
+        </p:spPr>
+        <p:txBody>
+          <a:bodyPr wrap="square" rtlCol="0">
+            <a:spAutoFit/>
+          </a:bodyPr>
+          <a:lstStyle/>
+          <a:p>
+            <a:pPr algn="ctr"/>
+            <a:r>
+              <a:rPr lang="en-US" sz="1200" dirty="0" smtClean="0"/>
+              <a:t>139</a:t>
+            </a:r>
+            <a:endParaRPr lang="en-US" sz="1200" dirty="0"/>
+          </a:p>
+        </p:txBody>
+      </p:sp>
+      <p:sp>
+        <p:nvSpPr>
+          <p:cNvPr id="27" name="TextBox 26"/>
+          <p:cNvSpPr txBox="1"/>
+          <p:nvPr/>
+        </p:nvSpPr>
+        <p:spPr>
+          <a:xfrm>
+            <a:off x="1730286" y="6067672"/>
+            <a:ext cx="531154" cy="276999"/>
+          </a:xfrm>
+          <a:prstGeom prst="rect">
+            <a:avLst/>
+          </a:prstGeom>
+          <a:noFill/>
+        </p:spPr>
+        <p:txBody>
+          <a:bodyPr wrap="square" rtlCol="0">
+            <a:spAutoFit/>
+          </a:bodyPr>
+          <a:lstStyle/>
+          <a:p>
+            <a:pPr algn="ctr"/>
+            <a:r>
+              <a:rPr lang="en-US" sz="1200" dirty="0" smtClean="0"/>
+              <a:t>80</a:t>
+            </a:r>
+            <a:endParaRPr lang="en-US" sz="1200" dirty="0"/>
+          </a:p>
+        </p:txBody>
+      </p:sp>
+      <p:sp>
+        <p:nvSpPr>
+          <p:cNvPr id="28" name="TextBox 27"/>
+          <p:cNvSpPr txBox="1"/>
+          <p:nvPr/>
+        </p:nvSpPr>
+        <p:spPr>
+          <a:xfrm>
+            <a:off x="2524145" y="6177260"/>
+            <a:ext cx="531154" cy="276999"/>
+          </a:xfrm>
+          <a:prstGeom prst="rect">
+            <a:avLst/>
+          </a:prstGeom>
+          <a:noFill/>
+        </p:spPr>
+        <p:txBody>
+          <a:bodyPr wrap="square" rtlCol="0">
+            <a:spAutoFit/>
+          </a:bodyPr>
+          <a:lstStyle/>
+          <a:p>
+            <a:pPr algn="ctr"/>
+            <a:r>
+              <a:rPr lang="en-US" sz="1200" dirty="0" smtClean="0"/>
+              <a:t>270</a:t>
+            </a:r>
+            <a:endParaRPr lang="en-US" sz="1200" dirty="0"/>
+          </a:p>
+        </p:txBody>
+      </p:sp>
+      <p:sp>
+        <p:nvSpPr>
+          <p:cNvPr id="29" name="TextBox 28"/>
+          <p:cNvSpPr txBox="1"/>
+          <p:nvPr/>
+        </p:nvSpPr>
+        <p:spPr>
+          <a:xfrm>
+            <a:off x="1279523" y="6827565"/>
+            <a:ext cx="531154" cy="276999"/>
+          </a:xfrm>
+          <a:prstGeom prst="rect">
+            <a:avLst/>
+          </a:prstGeom>
+          <a:noFill/>
+        </p:spPr>
+        <p:txBody>
+          <a:bodyPr wrap="square" rtlCol="0">
+            <a:spAutoFit/>
+          </a:bodyPr>
+          <a:lstStyle/>
+          <a:p>
+            <a:pPr algn="ctr"/>
+            <a:r>
+              <a:rPr lang="en-US" sz="1200" dirty="0" smtClean="0"/>
+              <a:t>55</a:t>
+            </a:r>
+            <a:endParaRPr lang="en-US" sz="1200" dirty="0"/>
+          </a:p>
+        </p:txBody>
+      </p:sp>
+      <p:sp>
+        <p:nvSpPr>
+          <p:cNvPr id="30" name="TextBox 29"/>
+          <p:cNvSpPr txBox="1"/>
+          <p:nvPr/>
+        </p:nvSpPr>
+        <p:spPr>
+          <a:xfrm>
+            <a:off x="1730286" y="6547633"/>
+            <a:ext cx="531154" cy="276999"/>
+          </a:xfrm>
+          <a:prstGeom prst="rect">
+            <a:avLst/>
+          </a:prstGeom>
+          <a:noFill/>
+        </p:spPr>
+        <p:txBody>
+          <a:bodyPr wrap="square" rtlCol="0">
+            <a:spAutoFit/>
+          </a:bodyPr>
+          <a:lstStyle/>
+          <a:p>
+            <a:pPr algn="ctr"/>
+            <a:r>
+              <a:rPr lang="en-US" sz="1200" dirty="0" smtClean="0"/>
+              <a:t>36</a:t>
+            </a:r>
+            <a:endParaRPr lang="en-US" sz="1200" dirty="0"/>
+          </a:p>
+        </p:txBody>
+      </p:sp>
+      <p:sp>
+        <p:nvSpPr>
+          <p:cNvPr id="31" name="TextBox 30"/>
+          <p:cNvSpPr txBox="1"/>
+          <p:nvPr/>
+        </p:nvSpPr>
+        <p:spPr>
+          <a:xfrm>
+            <a:off x="2191096" y="6827565"/>
+            <a:ext cx="531154" cy="276999"/>
+          </a:xfrm>
+          <a:prstGeom prst="rect">
+            <a:avLst/>
+          </a:prstGeom>
+          <a:noFill/>
+        </p:spPr>
+        <p:txBody>
+          <a:bodyPr wrap="square" rtlCol="0">
+            <a:spAutoFit/>
+          </a:bodyPr>
+          <a:lstStyle/>
+          <a:p>
+            <a:pPr algn="ctr"/>
+            <a:r>
+              <a:rPr lang="en-US" sz="1200" dirty="0" smtClean="0"/>
+              <a:t>30</a:t>
+            </a:r>
+            <a:endParaRPr lang="en-US" sz="1200" dirty="0"/>
+          </a:p>
+        </p:txBody>
+      </p:sp>
+      <p:sp>
+        <p:nvSpPr>
+          <p:cNvPr id="32" name="TextBox 31"/>
+          <p:cNvSpPr txBox="1"/>
+          <p:nvPr/>
+        </p:nvSpPr>
+        <p:spPr>
+          <a:xfrm>
+            <a:off x="1730286" y="7387429"/>
+            <a:ext cx="531154" cy="276999"/>
+          </a:xfrm>
+          <a:prstGeom prst="rect">
+            <a:avLst/>
+          </a:prstGeom>
+          <a:noFill/>
+        </p:spPr>
+        <p:txBody>
+          <a:bodyPr wrap="square" rtlCol="0">
+            <a:spAutoFit/>
+          </a:bodyPr>
+          <a:lstStyle/>
+          <a:p>
+            <a:pPr algn="ctr"/>
+            <a:r>
+              <a:rPr lang="en-US" sz="1200" dirty="0" smtClean="0"/>
+              <a:t>118</a:t>
+            </a:r>
+            <a:endParaRPr lang="en-US" sz="1200" dirty="0"/>
+          </a:p>
+        </p:txBody>
+      </p:sp>
+      <p:sp>
+        <p:nvSpPr>
+          <p:cNvPr id="33" name="TextBox 32"/>
+          <p:cNvSpPr txBox="1"/>
+          <p:nvPr/>
+        </p:nvSpPr>
+        <p:spPr>
+          <a:xfrm>
+            <a:off x="131401" y="5556165"/>
+            <a:ext cx="636938" cy="461665"/>
+          </a:xfrm>
+          <a:prstGeom prst="rect">
+            <a:avLst/>
+          </a:prstGeom>
+          <a:noFill/>
+        </p:spPr>
+        <p:txBody>
+          <a:bodyPr wrap="none" rtlCol="0">
+            <a:spAutoFit/>
+          </a:bodyPr>
+          <a:lstStyle/>
+          <a:p>
+            <a:r>
+              <a:rPr lang="en-US" sz="1200" dirty="0" smtClean="0"/>
+              <a:t>Carbon </a:t>
+            </a:r>
+            <a:br>
+              <a:rPr lang="en-US" sz="1200" dirty="0" smtClean="0"/>
+            </a:br>
+            <a:r>
+              <a:rPr lang="en-US" sz="1200" dirty="0" smtClean="0"/>
+              <a:t>Source</a:t>
+            </a:r>
+            <a:endParaRPr lang="en-US" sz="1200" dirty="0"/>
+          </a:p>
+        </p:txBody>
+      </p:sp>
+      <p:sp>
+        <p:nvSpPr>
+          <p:cNvPr id="34" name="TextBox 33"/>
+          <p:cNvSpPr txBox="1"/>
+          <p:nvPr/>
+        </p:nvSpPr>
+        <p:spPr>
+          <a:xfrm>
+            <a:off x="3160501" y="5642259"/>
+            <a:ext cx="800219" cy="276999"/>
+          </a:xfrm>
+          <a:prstGeom prst="rect">
+            <a:avLst/>
+          </a:prstGeom>
+          <a:noFill/>
+        </p:spPr>
+        <p:txBody>
+          <a:bodyPr wrap="none" rtlCol="0">
+            <a:spAutoFit/>
+          </a:bodyPr>
+          <a:lstStyle/>
+          <a:p>
+            <a:r>
+              <a:rPr lang="en-US" sz="1200" dirty="0" smtClean="0"/>
+              <a:t>Mg Stress</a:t>
+            </a:r>
+            <a:endParaRPr lang="en-US" sz="1200" dirty="0"/>
+          </a:p>
+        </p:txBody>
+      </p:sp>
+      <p:sp>
+        <p:nvSpPr>
+          <p:cNvPr id="35" name="TextBox 34"/>
+          <p:cNvSpPr txBox="1"/>
+          <p:nvPr/>
+        </p:nvSpPr>
+        <p:spPr>
+          <a:xfrm>
+            <a:off x="1631312" y="8053341"/>
+            <a:ext cx="774571" cy="276999"/>
+          </a:xfrm>
+          <a:prstGeom prst="rect">
+            <a:avLst/>
+          </a:prstGeom>
+          <a:noFill/>
+        </p:spPr>
+        <p:txBody>
+          <a:bodyPr wrap="none" rtlCol="0">
+            <a:spAutoFit/>
+          </a:bodyPr>
+          <a:lstStyle/>
+          <a:p>
+            <a:r>
+              <a:rPr lang="en-US" sz="1200" dirty="0" smtClean="0"/>
+              <a:t>Na Stress</a:t>
+            </a:r>
+            <a:endParaRPr lang="en-US" sz="1200" dirty="0"/>
+          </a:p>
+        </p:txBody>
+      </p:sp>
+      <p:sp>
+        <p:nvSpPr>
+          <p:cNvPr id="39" name="Oval 38"/>
+          <p:cNvSpPr/>
+          <p:nvPr/>
+        </p:nvSpPr>
+        <p:spPr>
+          <a:xfrm>
+            <a:off x="5794975" y="2256283"/>
+            <a:ext cx="1686771" cy="1658060"/>
+          </a:xfrm>
+          <a:prstGeom prst="ellipse">
+            <a:avLst/>
+          </a:prstGeom>
+          <a:solidFill>
+            <a:schemeClr val="accent5">
+              <a:alpha val="43000"/>
+            </a:schemeClr>
+          </a:solidFill>
+          <a:ln>
+            <a:solidFill>
+              <a:srgbClr val="000000"/>
+            </a:solidFill>
+          </a:ln>
+          <a:effectLst/>
+        </p:spPr>
+        <p:style>
+          <a:lnRef idx="1">
+            <a:schemeClr val="accent1"/>
+          </a:lnRef>
+          <a:fillRef idx="3">
+            <a:schemeClr val="accent1"/>
+          </a:fillRef>
+          <a:effectRef idx="2">
+            <a:schemeClr val="accent1"/>
+          </a:effectRef>
+          <a:fontRef idx="minor">
+            <a:schemeClr val="lt1"/>
+          </a:fontRef>
+        </p:style>
+        <p:txBody>
+          <a:bodyPr rtlCol="0" anchor="ctr"/>
+          <a:lstStyle/>
+          <a:p>
+            <a:pPr algn="ctr"/>
+            <a:endParaRPr lang="en-US" sz="1200"/>
+          </a:p>
+        </p:txBody>
+      </p:sp>
+      <p:sp>
+        <p:nvSpPr>
+          <p:cNvPr id="40" name="Oval 39"/>
+          <p:cNvSpPr/>
+          <p:nvPr/>
+        </p:nvSpPr>
+        <p:spPr>
+          <a:xfrm>
+            <a:off x="4622131" y="2256283"/>
+            <a:ext cx="1686771" cy="1658060"/>
+          </a:xfrm>
+          <a:prstGeom prst="ellipse">
+            <a:avLst/>
+          </a:prstGeom>
+          <a:solidFill>
+            <a:schemeClr val="accent4">
+              <a:alpha val="50000"/>
+            </a:schemeClr>
+          </a:solidFill>
+          <a:ln>
+            <a:solidFill>
+              <a:schemeClr val="tx1"/>
+            </a:solidFill>
+          </a:ln>
+          <a:effectLst/>
+        </p:spPr>
+        <p:style>
+          <a:lnRef idx="1">
+            <a:schemeClr val="accent1"/>
+          </a:lnRef>
+          <a:fillRef idx="3">
+            <a:schemeClr val="accent1"/>
+          </a:fillRef>
+          <a:effectRef idx="2">
+            <a:schemeClr val="accent1"/>
+          </a:effectRef>
+          <a:fontRef idx="minor">
+            <a:schemeClr val="lt1"/>
+          </a:fontRef>
+        </p:style>
+        <p:txBody>
+          <a:bodyPr rtlCol="0" anchor="ctr"/>
+          <a:lstStyle/>
+          <a:p>
+            <a:pPr algn="ctr"/>
+            <a:endParaRPr lang="en-US" sz="1200"/>
+          </a:p>
+        </p:txBody>
+      </p:sp>
+      <p:sp>
+        <p:nvSpPr>
+          <p:cNvPr id="41" name="Oval 40"/>
+          <p:cNvSpPr/>
+          <p:nvPr/>
+        </p:nvSpPr>
+        <p:spPr>
+          <a:xfrm>
+            <a:off x="5236546" y="3032198"/>
+            <a:ext cx="1686771" cy="1658060"/>
+          </a:xfrm>
+          <a:prstGeom prst="ellipse">
+            <a:avLst/>
+          </a:prstGeom>
+          <a:solidFill>
+            <a:schemeClr val="accent6">
+              <a:alpha val="39000"/>
+            </a:schemeClr>
+          </a:solidFill>
+          <a:ln>
+            <a:solidFill>
+              <a:srgbClr val="000000"/>
+            </a:solidFill>
+          </a:ln>
+          <a:effectLst/>
+        </p:spPr>
+        <p:style>
+          <a:lnRef idx="1">
+            <a:schemeClr val="accent1"/>
+          </a:lnRef>
+          <a:fillRef idx="3">
+            <a:schemeClr val="accent1"/>
+          </a:fillRef>
+          <a:effectRef idx="2">
+            <a:schemeClr val="accent1"/>
+          </a:effectRef>
+          <a:fontRef idx="minor">
+            <a:schemeClr val="lt1"/>
+          </a:fontRef>
+        </p:style>
+        <p:txBody>
+          <a:bodyPr rtlCol="0" anchor="ctr"/>
+          <a:lstStyle/>
+          <a:p>
+            <a:pPr algn="ctr"/>
+            <a:endParaRPr lang="en-US" sz="1200"/>
+          </a:p>
+        </p:txBody>
+      </p:sp>
+      <p:sp>
+        <p:nvSpPr>
+          <p:cNvPr id="42" name="TextBox 41"/>
+          <p:cNvSpPr txBox="1"/>
+          <p:nvPr/>
+        </p:nvSpPr>
+        <p:spPr>
+          <a:xfrm>
+            <a:off x="4970970" y="2813023"/>
+            <a:ext cx="531154" cy="276999"/>
+          </a:xfrm>
+          <a:prstGeom prst="rect">
+            <a:avLst/>
+          </a:prstGeom>
+          <a:noFill/>
+        </p:spPr>
+        <p:txBody>
+          <a:bodyPr wrap="square" rtlCol="0">
+            <a:spAutoFit/>
+          </a:bodyPr>
+          <a:lstStyle/>
+          <a:p>
+            <a:pPr algn="ctr"/>
+            <a:r>
+              <a:rPr lang="en-US" sz="1200" dirty="0" smtClean="0"/>
+              <a:t>139</a:t>
+            </a:r>
+            <a:endParaRPr lang="en-US" sz="1200" dirty="0"/>
+          </a:p>
+        </p:txBody>
+      </p:sp>
+      <p:sp>
+        <p:nvSpPr>
+          <p:cNvPr id="43" name="TextBox 42"/>
+          <p:cNvSpPr txBox="1"/>
+          <p:nvPr/>
+        </p:nvSpPr>
+        <p:spPr>
+          <a:xfrm>
+            <a:off x="5777749" y="2703435"/>
+            <a:ext cx="531154" cy="276999"/>
+          </a:xfrm>
+          <a:prstGeom prst="rect">
+            <a:avLst/>
+          </a:prstGeom>
+          <a:noFill/>
+        </p:spPr>
+        <p:txBody>
+          <a:bodyPr wrap="square" rtlCol="0">
+            <a:spAutoFit/>
+          </a:bodyPr>
+          <a:lstStyle/>
+          <a:p>
+            <a:pPr algn="ctr"/>
+            <a:r>
+              <a:rPr lang="en-US" sz="1200" dirty="0"/>
+              <a:t>4</a:t>
+            </a:r>
+            <a:r>
+              <a:rPr lang="en-US" sz="1200" dirty="0" smtClean="0"/>
+              <a:t>5</a:t>
+            </a:r>
+            <a:endParaRPr lang="en-US" sz="1200" dirty="0"/>
+          </a:p>
+        </p:txBody>
+      </p:sp>
+      <p:sp>
+        <p:nvSpPr>
+          <p:cNvPr id="44" name="TextBox 43"/>
+          <p:cNvSpPr txBox="1"/>
+          <p:nvPr/>
+        </p:nvSpPr>
+        <p:spPr>
+          <a:xfrm>
+            <a:off x="6571608" y="2813023"/>
+            <a:ext cx="531154" cy="276999"/>
+          </a:xfrm>
+          <a:prstGeom prst="rect">
+            <a:avLst/>
+          </a:prstGeom>
+          <a:noFill/>
+        </p:spPr>
+        <p:txBody>
+          <a:bodyPr wrap="square" rtlCol="0">
+            <a:spAutoFit/>
+          </a:bodyPr>
+          <a:lstStyle/>
+          <a:p>
+            <a:pPr algn="ctr"/>
+            <a:r>
+              <a:rPr lang="en-US" sz="1200" dirty="0" smtClean="0"/>
+              <a:t>84</a:t>
+            </a:r>
+            <a:endParaRPr lang="en-US" sz="1200" dirty="0"/>
+          </a:p>
+        </p:txBody>
+      </p:sp>
+      <p:sp>
+        <p:nvSpPr>
+          <p:cNvPr id="45" name="TextBox 44"/>
+          <p:cNvSpPr txBox="1"/>
+          <p:nvPr/>
+        </p:nvSpPr>
+        <p:spPr>
+          <a:xfrm>
+            <a:off x="5326985" y="3463328"/>
+            <a:ext cx="531154" cy="276999"/>
+          </a:xfrm>
+          <a:prstGeom prst="rect">
+            <a:avLst/>
+          </a:prstGeom>
+          <a:noFill/>
+        </p:spPr>
+        <p:txBody>
+          <a:bodyPr wrap="square" rtlCol="0">
+            <a:spAutoFit/>
+          </a:bodyPr>
+          <a:lstStyle/>
+          <a:p>
+            <a:pPr algn="ctr"/>
+            <a:r>
+              <a:rPr lang="en-US" sz="1200" dirty="0" smtClean="0"/>
+              <a:t>1207</a:t>
+            </a:r>
+            <a:endParaRPr lang="en-US" sz="1200" dirty="0"/>
+          </a:p>
+        </p:txBody>
+      </p:sp>
+      <p:sp>
+        <p:nvSpPr>
+          <p:cNvPr id="46" name="TextBox 45"/>
+          <p:cNvSpPr txBox="1"/>
+          <p:nvPr/>
+        </p:nvSpPr>
+        <p:spPr>
+          <a:xfrm>
+            <a:off x="5777749" y="3183396"/>
+            <a:ext cx="531154" cy="276999"/>
+          </a:xfrm>
+          <a:prstGeom prst="rect">
+            <a:avLst/>
+          </a:prstGeom>
+          <a:noFill/>
+        </p:spPr>
+        <p:txBody>
+          <a:bodyPr wrap="square" rtlCol="0">
+            <a:spAutoFit/>
+          </a:bodyPr>
+          <a:lstStyle/>
+          <a:p>
+            <a:pPr algn="ctr"/>
+            <a:r>
+              <a:rPr lang="en-US" sz="1200" dirty="0" smtClean="0"/>
+              <a:t>518</a:t>
+            </a:r>
+            <a:endParaRPr lang="en-US" sz="1200" dirty="0"/>
+          </a:p>
+        </p:txBody>
+      </p:sp>
+      <p:sp>
+        <p:nvSpPr>
+          <p:cNvPr id="47" name="TextBox 46"/>
+          <p:cNvSpPr txBox="1"/>
+          <p:nvPr/>
+        </p:nvSpPr>
+        <p:spPr>
+          <a:xfrm>
+            <a:off x="6238559" y="3463328"/>
+            <a:ext cx="531154" cy="276999"/>
+          </a:xfrm>
+          <a:prstGeom prst="rect">
+            <a:avLst/>
+          </a:prstGeom>
+          <a:noFill/>
+        </p:spPr>
+        <p:txBody>
+          <a:bodyPr wrap="square" rtlCol="0">
+            <a:spAutoFit/>
+          </a:bodyPr>
+          <a:lstStyle/>
+          <a:p>
+            <a:pPr algn="ctr"/>
+            <a:r>
+              <a:rPr lang="en-US" sz="1200" dirty="0" smtClean="0"/>
+              <a:t>231</a:t>
+            </a:r>
+            <a:endParaRPr lang="en-US" sz="1200" dirty="0"/>
+          </a:p>
+        </p:txBody>
+      </p:sp>
+      <p:sp>
+        <p:nvSpPr>
+          <p:cNvPr id="48" name="TextBox 47"/>
+          <p:cNvSpPr txBox="1"/>
+          <p:nvPr/>
+        </p:nvSpPr>
+        <p:spPr>
+          <a:xfrm>
+            <a:off x="5777749" y="4023192"/>
+            <a:ext cx="531154" cy="276999"/>
+          </a:xfrm>
+          <a:prstGeom prst="rect">
+            <a:avLst/>
+          </a:prstGeom>
+          <a:noFill/>
+        </p:spPr>
+        <p:txBody>
+          <a:bodyPr wrap="square" rtlCol="0">
+            <a:spAutoFit/>
+          </a:bodyPr>
+          <a:lstStyle/>
+          <a:p>
+            <a:pPr algn="ctr"/>
+            <a:r>
+              <a:rPr lang="en-US" sz="1200" dirty="0" smtClean="0"/>
+              <a:t>615</a:t>
+            </a:r>
+            <a:endParaRPr lang="en-US" sz="1200" dirty="0"/>
+          </a:p>
+        </p:txBody>
+      </p:sp>
+      <p:sp>
+        <p:nvSpPr>
+          <p:cNvPr id="49" name="TextBox 48"/>
+          <p:cNvSpPr txBox="1"/>
+          <p:nvPr/>
+        </p:nvSpPr>
+        <p:spPr>
+          <a:xfrm>
+            <a:off x="4205853" y="2213390"/>
+            <a:ext cx="636938" cy="461665"/>
+          </a:xfrm>
+          <a:prstGeom prst="rect">
+            <a:avLst/>
+          </a:prstGeom>
+          <a:noFill/>
+        </p:spPr>
+        <p:txBody>
+          <a:bodyPr wrap="none" rtlCol="0">
+            <a:spAutoFit/>
+          </a:bodyPr>
+          <a:lstStyle/>
+          <a:p>
+            <a:r>
+              <a:rPr lang="en-US" sz="1200" dirty="0" smtClean="0"/>
+              <a:t>Carbon </a:t>
+            </a:r>
+            <a:br>
+              <a:rPr lang="en-US" sz="1200" dirty="0" smtClean="0"/>
+            </a:br>
+            <a:r>
+              <a:rPr lang="en-US" sz="1200" dirty="0" smtClean="0"/>
+              <a:t>Source</a:t>
+            </a:r>
+            <a:endParaRPr lang="en-US" sz="1200" dirty="0"/>
+          </a:p>
+        </p:txBody>
+      </p:sp>
+      <p:sp>
+        <p:nvSpPr>
+          <p:cNvPr id="50" name="TextBox 49"/>
+          <p:cNvSpPr txBox="1"/>
+          <p:nvPr/>
+        </p:nvSpPr>
+        <p:spPr>
+          <a:xfrm>
+            <a:off x="7207964" y="2278022"/>
+            <a:ext cx="800219" cy="276999"/>
+          </a:xfrm>
+          <a:prstGeom prst="rect">
+            <a:avLst/>
+          </a:prstGeom>
+          <a:noFill/>
+        </p:spPr>
+        <p:txBody>
+          <a:bodyPr wrap="none" rtlCol="0">
+            <a:spAutoFit/>
+          </a:bodyPr>
+          <a:lstStyle/>
+          <a:p>
+            <a:r>
+              <a:rPr lang="en-US" sz="1200" dirty="0" smtClean="0"/>
+              <a:t>Mg Stress</a:t>
+            </a:r>
+            <a:endParaRPr lang="en-US" sz="1200" dirty="0"/>
+          </a:p>
+        </p:txBody>
+      </p:sp>
+      <p:sp>
+        <p:nvSpPr>
+          <p:cNvPr id="51" name="TextBox 50"/>
+          <p:cNvSpPr txBox="1"/>
+          <p:nvPr/>
+        </p:nvSpPr>
+        <p:spPr>
+          <a:xfrm>
+            <a:off x="5678775" y="4689104"/>
+            <a:ext cx="774571" cy="276999"/>
+          </a:xfrm>
+          <a:prstGeom prst="rect">
+            <a:avLst/>
+          </a:prstGeom>
+          <a:noFill/>
+        </p:spPr>
+        <p:txBody>
+          <a:bodyPr wrap="none" rtlCol="0">
+            <a:spAutoFit/>
+          </a:bodyPr>
+          <a:lstStyle/>
+          <a:p>
+            <a:r>
+              <a:rPr lang="en-US" sz="1200" dirty="0" smtClean="0"/>
+              <a:t>Na Stress</a:t>
+            </a:r>
+            <a:endParaRPr lang="en-US" sz="1200" dirty="0"/>
+          </a:p>
+        </p:txBody>
+      </p:sp>
+      <p:sp>
+        <p:nvSpPr>
+          <p:cNvPr id="55" name="Oval 54"/>
+          <p:cNvSpPr/>
+          <p:nvPr/>
+        </p:nvSpPr>
+        <p:spPr>
+          <a:xfrm>
+            <a:off x="5798340" y="5617832"/>
+            <a:ext cx="1686771" cy="1658060"/>
+          </a:xfrm>
+          <a:prstGeom prst="ellipse">
+            <a:avLst/>
+          </a:prstGeom>
+          <a:solidFill>
+            <a:schemeClr val="accent5">
+              <a:alpha val="43000"/>
+            </a:schemeClr>
+          </a:solidFill>
+          <a:ln>
+            <a:solidFill>
+              <a:srgbClr val="000000"/>
+            </a:solidFill>
+          </a:ln>
+          <a:effectLst/>
+        </p:spPr>
+        <p:style>
+          <a:lnRef idx="1">
+            <a:schemeClr val="accent1"/>
+          </a:lnRef>
+          <a:fillRef idx="3">
+            <a:schemeClr val="accent1"/>
+          </a:fillRef>
+          <a:effectRef idx="2">
+            <a:schemeClr val="accent1"/>
+          </a:effectRef>
+          <a:fontRef idx="minor">
+            <a:schemeClr val="lt1"/>
+          </a:fontRef>
+        </p:style>
+        <p:txBody>
+          <a:bodyPr rtlCol="0" anchor="ctr"/>
+          <a:lstStyle/>
+          <a:p>
+            <a:pPr algn="ctr"/>
+            <a:endParaRPr lang="en-US" sz="1200"/>
+          </a:p>
+        </p:txBody>
+      </p:sp>
+      <p:sp>
+        <p:nvSpPr>
+          <p:cNvPr id="56" name="Oval 55"/>
+          <p:cNvSpPr/>
+          <p:nvPr/>
+        </p:nvSpPr>
+        <p:spPr>
+          <a:xfrm>
+            <a:off x="4625496" y="5617832"/>
+            <a:ext cx="1686771" cy="1658060"/>
+          </a:xfrm>
+          <a:prstGeom prst="ellipse">
+            <a:avLst/>
+          </a:prstGeom>
+          <a:solidFill>
+            <a:schemeClr val="accent4">
+              <a:alpha val="50000"/>
+            </a:schemeClr>
+          </a:solidFill>
+          <a:ln>
+            <a:solidFill>
+              <a:schemeClr val="tx1"/>
+            </a:solidFill>
+          </a:ln>
+          <a:effectLst/>
+        </p:spPr>
+        <p:style>
+          <a:lnRef idx="1">
+            <a:schemeClr val="accent1"/>
+          </a:lnRef>
+          <a:fillRef idx="3">
+            <a:schemeClr val="accent1"/>
+          </a:fillRef>
+          <a:effectRef idx="2">
+            <a:schemeClr val="accent1"/>
+          </a:effectRef>
+          <a:fontRef idx="minor">
+            <a:schemeClr val="lt1"/>
+          </a:fontRef>
+        </p:style>
+        <p:txBody>
+          <a:bodyPr rtlCol="0" anchor="ctr"/>
+          <a:lstStyle/>
+          <a:p>
+            <a:pPr algn="ctr"/>
+            <a:endParaRPr lang="en-US" sz="1200"/>
+          </a:p>
+        </p:txBody>
+      </p:sp>
+      <p:sp>
+        <p:nvSpPr>
+          <p:cNvPr id="57" name="Oval 56"/>
+          <p:cNvSpPr/>
+          <p:nvPr/>
+        </p:nvSpPr>
+        <p:spPr>
+          <a:xfrm>
+            <a:off x="5239911" y="6393747"/>
+            <a:ext cx="1686771" cy="1658060"/>
+          </a:xfrm>
+          <a:prstGeom prst="ellipse">
+            <a:avLst/>
+          </a:prstGeom>
+          <a:solidFill>
+            <a:schemeClr val="accent6">
+              <a:alpha val="39000"/>
+            </a:schemeClr>
+          </a:solidFill>
+          <a:ln>
+            <a:solidFill>
+              <a:srgbClr val="000000"/>
+            </a:solidFill>
+          </a:ln>
+          <a:effectLst/>
+        </p:spPr>
+        <p:style>
+          <a:lnRef idx="1">
+            <a:schemeClr val="accent1"/>
+          </a:lnRef>
+          <a:fillRef idx="3">
+            <a:schemeClr val="accent1"/>
+          </a:fillRef>
+          <a:effectRef idx="2">
+            <a:schemeClr val="accent1"/>
+          </a:effectRef>
+          <a:fontRef idx="minor">
+            <a:schemeClr val="lt1"/>
+          </a:fontRef>
+        </p:style>
+        <p:txBody>
+          <a:bodyPr rtlCol="0" anchor="ctr"/>
+          <a:lstStyle/>
+          <a:p>
+            <a:pPr algn="ctr"/>
+            <a:endParaRPr lang="en-US" sz="1200"/>
+          </a:p>
+        </p:txBody>
+      </p:sp>
+      <p:sp>
+        <p:nvSpPr>
+          <p:cNvPr id="58" name="TextBox 57"/>
+          <p:cNvSpPr txBox="1"/>
+          <p:nvPr/>
+        </p:nvSpPr>
+        <p:spPr>
+          <a:xfrm>
+            <a:off x="4974335" y="6174572"/>
+            <a:ext cx="531154" cy="276999"/>
+          </a:xfrm>
+          <a:prstGeom prst="rect">
+            <a:avLst/>
+          </a:prstGeom>
+          <a:noFill/>
+        </p:spPr>
+        <p:txBody>
+          <a:bodyPr wrap="square" rtlCol="0">
+            <a:spAutoFit/>
+          </a:bodyPr>
+          <a:lstStyle/>
+          <a:p>
+            <a:pPr algn="ctr"/>
+            <a:r>
+              <a:rPr lang="en-US" sz="1200" dirty="0" smtClean="0"/>
+              <a:t>37</a:t>
+            </a:r>
+            <a:endParaRPr lang="en-US" sz="1200" dirty="0"/>
+          </a:p>
+        </p:txBody>
+      </p:sp>
+      <p:sp>
+        <p:nvSpPr>
+          <p:cNvPr id="59" name="TextBox 58"/>
+          <p:cNvSpPr txBox="1"/>
+          <p:nvPr/>
+        </p:nvSpPr>
+        <p:spPr>
+          <a:xfrm>
+            <a:off x="5781114" y="6064984"/>
+            <a:ext cx="531154" cy="276999"/>
+          </a:xfrm>
+          <a:prstGeom prst="rect">
+            <a:avLst/>
+          </a:prstGeom>
+          <a:noFill/>
+        </p:spPr>
+        <p:txBody>
+          <a:bodyPr wrap="square" rtlCol="0">
+            <a:spAutoFit/>
+          </a:bodyPr>
+          <a:lstStyle/>
+          <a:p>
+            <a:pPr algn="ctr"/>
+            <a:r>
+              <a:rPr lang="en-US" sz="1200" dirty="0" smtClean="0"/>
+              <a:t>11</a:t>
+            </a:r>
+            <a:endParaRPr lang="en-US" sz="1200" dirty="0"/>
+          </a:p>
+        </p:txBody>
+      </p:sp>
+      <p:sp>
+        <p:nvSpPr>
+          <p:cNvPr id="60" name="TextBox 59"/>
+          <p:cNvSpPr txBox="1"/>
+          <p:nvPr/>
+        </p:nvSpPr>
+        <p:spPr>
+          <a:xfrm>
+            <a:off x="6574973" y="6174572"/>
+            <a:ext cx="531154" cy="276999"/>
+          </a:xfrm>
+          <a:prstGeom prst="rect">
+            <a:avLst/>
+          </a:prstGeom>
+          <a:noFill/>
+        </p:spPr>
+        <p:txBody>
+          <a:bodyPr wrap="square" rtlCol="0">
+            <a:spAutoFit/>
+          </a:bodyPr>
+          <a:lstStyle/>
+          <a:p>
+            <a:pPr algn="ctr"/>
+            <a:r>
+              <a:rPr lang="en-US" sz="1200" dirty="0" smtClean="0"/>
+              <a:t>58</a:t>
+            </a:r>
+            <a:endParaRPr lang="en-US" sz="1200" dirty="0"/>
+          </a:p>
+        </p:txBody>
+      </p:sp>
+      <p:sp>
+        <p:nvSpPr>
+          <p:cNvPr id="61" name="TextBox 60"/>
+          <p:cNvSpPr txBox="1"/>
+          <p:nvPr/>
+        </p:nvSpPr>
+        <p:spPr>
+          <a:xfrm>
+            <a:off x="5330351" y="6824877"/>
+            <a:ext cx="531154" cy="276999"/>
+          </a:xfrm>
+          <a:prstGeom prst="rect">
+            <a:avLst/>
+          </a:prstGeom>
+          <a:noFill/>
+        </p:spPr>
+        <p:txBody>
+          <a:bodyPr wrap="square" rtlCol="0">
+            <a:spAutoFit/>
+          </a:bodyPr>
+          <a:lstStyle/>
+          <a:p>
+            <a:pPr algn="ctr"/>
+            <a:r>
+              <a:rPr lang="en-US" sz="1200" dirty="0" smtClean="0"/>
+              <a:t>772</a:t>
+            </a:r>
+            <a:endParaRPr lang="en-US" sz="1200" dirty="0"/>
+          </a:p>
+        </p:txBody>
+      </p:sp>
+      <p:sp>
+        <p:nvSpPr>
+          <p:cNvPr id="62" name="TextBox 61"/>
+          <p:cNvSpPr txBox="1"/>
+          <p:nvPr/>
+        </p:nvSpPr>
+        <p:spPr>
+          <a:xfrm>
+            <a:off x="5781114" y="6544945"/>
+            <a:ext cx="531154" cy="276999"/>
+          </a:xfrm>
+          <a:prstGeom prst="rect">
+            <a:avLst/>
+          </a:prstGeom>
+          <a:noFill/>
+        </p:spPr>
+        <p:txBody>
+          <a:bodyPr wrap="square" rtlCol="0">
+            <a:spAutoFit/>
+          </a:bodyPr>
+          <a:lstStyle/>
+          <a:p>
+            <a:pPr algn="ctr"/>
+            <a:r>
+              <a:rPr lang="en-US" sz="1200" dirty="0" smtClean="0"/>
+              <a:t>15</a:t>
+            </a:r>
+            <a:endParaRPr lang="en-US" sz="1200" dirty="0"/>
+          </a:p>
+        </p:txBody>
+      </p:sp>
+      <p:sp>
+        <p:nvSpPr>
+          <p:cNvPr id="63" name="TextBox 62"/>
+          <p:cNvSpPr txBox="1"/>
+          <p:nvPr/>
+        </p:nvSpPr>
+        <p:spPr>
+          <a:xfrm>
+            <a:off x="6241924" y="6824877"/>
+            <a:ext cx="531154" cy="276999"/>
+          </a:xfrm>
+          <a:prstGeom prst="rect">
+            <a:avLst/>
+          </a:prstGeom>
+          <a:noFill/>
+        </p:spPr>
+        <p:txBody>
+          <a:bodyPr wrap="square" rtlCol="0">
+            <a:spAutoFit/>
+          </a:bodyPr>
+          <a:lstStyle/>
+          <a:p>
+            <a:pPr algn="ctr"/>
+            <a:r>
+              <a:rPr lang="en-US" sz="1200" dirty="0" smtClean="0"/>
+              <a:t>419</a:t>
+            </a:r>
+            <a:endParaRPr lang="en-US" sz="1200" dirty="0"/>
+          </a:p>
+        </p:txBody>
+      </p:sp>
+      <p:sp>
+        <p:nvSpPr>
+          <p:cNvPr id="64" name="TextBox 63"/>
+          <p:cNvSpPr txBox="1"/>
+          <p:nvPr/>
+        </p:nvSpPr>
+        <p:spPr>
+          <a:xfrm>
+            <a:off x="5781114" y="7384741"/>
+            <a:ext cx="531154" cy="276999"/>
+          </a:xfrm>
+          <a:prstGeom prst="rect">
+            <a:avLst/>
+          </a:prstGeom>
+          <a:noFill/>
+        </p:spPr>
+        <p:txBody>
+          <a:bodyPr wrap="square" rtlCol="0">
+            <a:spAutoFit/>
+          </a:bodyPr>
+          <a:lstStyle/>
+          <a:p>
+            <a:pPr algn="ctr"/>
+            <a:r>
+              <a:rPr lang="en-US" sz="1200" dirty="0" smtClean="0"/>
+              <a:t>1044</a:t>
+            </a:r>
+            <a:endParaRPr lang="en-US" sz="1200" dirty="0"/>
+          </a:p>
+        </p:txBody>
+      </p:sp>
+      <p:sp>
+        <p:nvSpPr>
+          <p:cNvPr id="65" name="TextBox 64"/>
+          <p:cNvSpPr txBox="1"/>
+          <p:nvPr/>
+        </p:nvSpPr>
+        <p:spPr>
+          <a:xfrm>
+            <a:off x="4205853" y="5553477"/>
+            <a:ext cx="636938" cy="461665"/>
+          </a:xfrm>
+          <a:prstGeom prst="rect">
+            <a:avLst/>
+          </a:prstGeom>
+          <a:noFill/>
+        </p:spPr>
+        <p:txBody>
+          <a:bodyPr wrap="none" rtlCol="0">
+            <a:spAutoFit/>
+          </a:bodyPr>
+          <a:lstStyle/>
+          <a:p>
+            <a:r>
+              <a:rPr lang="en-US" sz="1200" dirty="0" smtClean="0"/>
+              <a:t>Carbon </a:t>
+            </a:r>
+            <a:br>
+              <a:rPr lang="en-US" sz="1200" dirty="0" smtClean="0"/>
+            </a:br>
+            <a:r>
+              <a:rPr lang="en-US" sz="1200" dirty="0" smtClean="0"/>
+              <a:t>Source</a:t>
+            </a:r>
+            <a:endParaRPr lang="en-US" sz="1200" dirty="0"/>
+          </a:p>
+        </p:txBody>
+      </p:sp>
+      <p:sp>
+        <p:nvSpPr>
+          <p:cNvPr id="66" name="TextBox 65"/>
+          <p:cNvSpPr txBox="1"/>
+          <p:nvPr/>
+        </p:nvSpPr>
+        <p:spPr>
+          <a:xfrm>
+            <a:off x="7211329" y="5639571"/>
+            <a:ext cx="800219" cy="276999"/>
+          </a:xfrm>
+          <a:prstGeom prst="rect">
+            <a:avLst/>
+          </a:prstGeom>
+          <a:noFill/>
+        </p:spPr>
+        <p:txBody>
+          <a:bodyPr wrap="none" rtlCol="0">
+            <a:spAutoFit/>
+          </a:bodyPr>
+          <a:lstStyle/>
+          <a:p>
+            <a:r>
+              <a:rPr lang="en-US" sz="1200" dirty="0" smtClean="0"/>
+              <a:t>Mg Stress</a:t>
+            </a:r>
+            <a:endParaRPr lang="en-US" sz="1200" dirty="0"/>
+          </a:p>
+        </p:txBody>
+      </p:sp>
+      <p:sp>
+        <p:nvSpPr>
+          <p:cNvPr id="67" name="TextBox 66"/>
+          <p:cNvSpPr txBox="1"/>
+          <p:nvPr/>
+        </p:nvSpPr>
+        <p:spPr>
+          <a:xfrm>
+            <a:off x="5682140" y="8050653"/>
+            <a:ext cx="774571" cy="276999"/>
+          </a:xfrm>
+          <a:prstGeom prst="rect">
+            <a:avLst/>
+          </a:prstGeom>
+          <a:noFill/>
+        </p:spPr>
+        <p:txBody>
+          <a:bodyPr wrap="none" rtlCol="0">
+            <a:spAutoFit/>
+          </a:bodyPr>
+          <a:lstStyle/>
+          <a:p>
+            <a:r>
+              <a:rPr lang="en-US" sz="1200" dirty="0" smtClean="0"/>
+              <a:t>Na Stress</a:t>
+            </a:r>
+            <a:endParaRPr lang="en-US" sz="1200" dirty="0"/>
+          </a:p>
+        </p:txBody>
+      </p:sp>
+      <p:sp>
+        <p:nvSpPr>
+          <p:cNvPr id="68" name="TextBox 67"/>
+          <p:cNvSpPr txBox="1"/>
+          <p:nvPr/>
+        </p:nvSpPr>
+        <p:spPr>
+          <a:xfrm>
+            <a:off x="1627947" y="1645766"/>
+            <a:ext cx="776963" cy="369332"/>
+          </a:xfrm>
+          <a:prstGeom prst="rect">
+            <a:avLst/>
+          </a:prstGeom>
+          <a:noFill/>
+        </p:spPr>
+        <p:txBody>
+          <a:bodyPr wrap="none" rtlCol="0">
+            <a:spAutoFit/>
+          </a:bodyPr>
+          <a:lstStyle/>
+          <a:p>
+            <a:r>
+              <a:rPr lang="en-US" dirty="0" smtClean="0"/>
+              <a:t>mRNA</a:t>
+            </a:r>
+            <a:endParaRPr lang="en-US" dirty="0"/>
+          </a:p>
+        </p:txBody>
+      </p:sp>
+      <p:sp>
+        <p:nvSpPr>
+          <p:cNvPr id="69" name="TextBox 68"/>
+          <p:cNvSpPr txBox="1"/>
+          <p:nvPr/>
+        </p:nvSpPr>
+        <p:spPr>
+          <a:xfrm>
+            <a:off x="5633527" y="1643080"/>
+            <a:ext cx="872542" cy="369332"/>
+          </a:xfrm>
+          <a:prstGeom prst="rect">
+            <a:avLst/>
+          </a:prstGeom>
+          <a:noFill/>
+        </p:spPr>
+        <p:txBody>
+          <a:bodyPr wrap="none" rtlCol="0">
+            <a:spAutoFit/>
+          </a:bodyPr>
+          <a:lstStyle/>
+          <a:p>
+            <a:r>
+              <a:rPr lang="en-US" dirty="0" smtClean="0"/>
+              <a:t>Protein</a:t>
+            </a:r>
+            <a:endParaRPr lang="en-US" dirty="0"/>
+          </a:p>
+        </p:txBody>
+      </p:sp>
+      <p:sp>
+        <p:nvSpPr>
+          <p:cNvPr id="70" name="TextBox 69"/>
+          <p:cNvSpPr txBox="1"/>
+          <p:nvPr/>
+        </p:nvSpPr>
+        <p:spPr>
+          <a:xfrm>
+            <a:off x="7726901" y="3151793"/>
+            <a:ext cx="1289911" cy="369332"/>
+          </a:xfrm>
+          <a:prstGeom prst="rect">
+            <a:avLst/>
+          </a:prstGeom>
+          <a:noFill/>
+        </p:spPr>
+        <p:txBody>
+          <a:bodyPr wrap="none" rtlCol="0">
+            <a:spAutoFit/>
+          </a:bodyPr>
+          <a:lstStyle/>
+          <a:p>
+            <a:r>
+              <a:rPr lang="en-US" dirty="0" smtClean="0"/>
+              <a:t>Exponential</a:t>
+            </a:r>
+            <a:endParaRPr lang="en-US" dirty="0"/>
+          </a:p>
+        </p:txBody>
+      </p:sp>
+      <p:sp>
+        <p:nvSpPr>
+          <p:cNvPr id="71" name="TextBox 70"/>
+          <p:cNvSpPr txBox="1"/>
+          <p:nvPr/>
+        </p:nvSpPr>
+        <p:spPr>
+          <a:xfrm>
+            <a:off x="7726901" y="6669245"/>
+            <a:ext cx="1146468" cy="369332"/>
+          </a:xfrm>
+          <a:prstGeom prst="rect">
+            <a:avLst/>
+          </a:prstGeom>
+          <a:noFill/>
+        </p:spPr>
+        <p:txBody>
+          <a:bodyPr wrap="none" rtlCol="0">
+            <a:spAutoFit/>
+          </a:bodyPr>
+          <a:lstStyle/>
+          <a:p>
+            <a:r>
+              <a:rPr lang="en-US" dirty="0" smtClean="0"/>
+              <a:t>Stationary</a:t>
+            </a:r>
+            <a:endParaRPr lang="en-US" dirty="0"/>
+          </a:p>
+        </p:txBody>
+      </p:sp>
       <p:grpSp>
         <p:nvGrpSpPr>
-          <p:cNvPr id="4" name="Group 3"/>
+          <p:cNvPr id="3" name="Group 2"/>
           <p:cNvGrpSpPr/>
           <p:nvPr/>
         </p:nvGrpSpPr>
         <p:grpSpPr>
           <a:xfrm>
-            <a:off x="187769" y="1849670"/>
-            <a:ext cx="3741117" cy="3238063"/>
-            <a:chOff x="205933" y="640747"/>
-            <a:chExt cx="3741117" cy="3238063"/>
+            <a:off x="169888" y="1778717"/>
+            <a:ext cx="4408738" cy="3826127"/>
+            <a:chOff x="221204" y="1509308"/>
+            <a:chExt cx="4408738" cy="3826127"/>
           </a:xfrm>
         </p:grpSpPr>
-        <p:grpSp>
-          <p:nvGrpSpPr>
-            <p:cNvPr id="5" name="Group 4"/>
-            <p:cNvGrpSpPr>
-              <a:grpSpLocks noChangeAspect="1"/>
-            </p:cNvGrpSpPr>
-            <p:nvPr/>
-          </p:nvGrpSpPr>
-          <p:grpSpPr>
-            <a:xfrm>
-              <a:off x="315625" y="754859"/>
-              <a:ext cx="3529195" cy="3005007"/>
-              <a:chOff x="315625" y="98681"/>
-              <a:chExt cx="3798388" cy="3234217"/>
-            </a:xfrm>
-          </p:grpSpPr>
-          <p:sp>
-            <p:nvSpPr>
-              <p:cNvPr id="7" name="Oval 6"/>
-              <p:cNvSpPr/>
-              <p:nvPr/>
-            </p:nvSpPr>
-            <p:spPr>
-              <a:xfrm>
-                <a:off x="2038349" y="416384"/>
-                <a:ext cx="1815431" cy="1784530"/>
-              </a:xfrm>
-              <a:prstGeom prst="ellipse">
-                <a:avLst/>
-              </a:prstGeom>
-              <a:solidFill>
-                <a:schemeClr val="accent5">
-                  <a:alpha val="43000"/>
-                </a:schemeClr>
-              </a:solidFill>
-              <a:ln>
-                <a:solidFill>
-                  <a:srgbClr val="000000"/>
-                </a:solidFill>
-              </a:ln>
-              <a:effectLst/>
-            </p:spPr>
-            <p:style>
-              <a:lnRef idx="1">
-                <a:schemeClr val="accent1"/>
-              </a:lnRef>
-              <a:fillRef idx="3">
-                <a:schemeClr val="accent1"/>
-              </a:fillRef>
-              <a:effectRef idx="2">
-                <a:schemeClr val="accent1"/>
-              </a:effectRef>
-              <a:fontRef idx="minor">
-                <a:schemeClr val="lt1"/>
-              </a:fontRef>
-            </p:style>
-            <p:txBody>
-              <a:bodyPr rtlCol="0" anchor="ctr"/>
-              <a:lstStyle/>
-              <a:p>
-                <a:pPr algn="ctr"/>
-                <a:endParaRPr lang="en-US" sz="1200"/>
-              </a:p>
-            </p:txBody>
-          </p:sp>
-          <p:sp>
-            <p:nvSpPr>
-              <p:cNvPr id="8" name="Oval 7"/>
-              <p:cNvSpPr/>
-              <p:nvPr/>
-            </p:nvSpPr>
-            <p:spPr>
-              <a:xfrm>
-                <a:off x="776045" y="416384"/>
-                <a:ext cx="1815431" cy="1784530"/>
-              </a:xfrm>
-              <a:prstGeom prst="ellipse">
-                <a:avLst/>
-              </a:prstGeom>
-              <a:solidFill>
-                <a:schemeClr val="accent4">
-                  <a:alpha val="50000"/>
-                </a:schemeClr>
-              </a:solidFill>
-              <a:ln>
-                <a:solidFill>
-                  <a:schemeClr val="tx1"/>
-                </a:solidFill>
-              </a:ln>
-              <a:effectLst/>
-            </p:spPr>
-            <p:style>
-              <a:lnRef idx="1">
-                <a:schemeClr val="accent1"/>
-              </a:lnRef>
-              <a:fillRef idx="3">
-                <a:schemeClr val="accent1"/>
-              </a:fillRef>
-              <a:effectRef idx="2">
-                <a:schemeClr val="accent1"/>
-              </a:effectRef>
-              <a:fontRef idx="minor">
-                <a:schemeClr val="lt1"/>
-              </a:fontRef>
-            </p:style>
-            <p:txBody>
-              <a:bodyPr rtlCol="0" anchor="ctr"/>
-              <a:lstStyle/>
-              <a:p>
-                <a:pPr algn="ctr"/>
-                <a:endParaRPr lang="en-US" sz="1200"/>
-              </a:p>
-            </p:txBody>
-          </p:sp>
-          <p:sp>
-            <p:nvSpPr>
-              <p:cNvPr id="9" name="Oval 8"/>
-              <p:cNvSpPr/>
-              <p:nvPr/>
-            </p:nvSpPr>
-            <p:spPr>
-              <a:xfrm>
-                <a:off x="1437325" y="1251482"/>
-                <a:ext cx="1815431" cy="1784530"/>
-              </a:xfrm>
-              <a:prstGeom prst="ellipse">
-                <a:avLst/>
-              </a:prstGeom>
-              <a:solidFill>
-                <a:schemeClr val="accent6">
-                  <a:alpha val="39000"/>
-                </a:schemeClr>
-              </a:solidFill>
-              <a:ln>
-                <a:solidFill>
-                  <a:srgbClr val="000000"/>
-                </a:solidFill>
-              </a:ln>
-              <a:effectLst/>
-            </p:spPr>
-            <p:style>
-              <a:lnRef idx="1">
-                <a:schemeClr val="accent1"/>
-              </a:lnRef>
-              <a:fillRef idx="3">
-                <a:schemeClr val="accent1"/>
-              </a:fillRef>
-              <a:effectRef idx="2">
-                <a:schemeClr val="accent1"/>
-              </a:effectRef>
-              <a:fontRef idx="minor">
-                <a:schemeClr val="lt1"/>
-              </a:fontRef>
-            </p:style>
-            <p:txBody>
-              <a:bodyPr rtlCol="0" anchor="ctr"/>
-              <a:lstStyle/>
-              <a:p>
-                <a:pPr algn="ctr"/>
-                <a:endParaRPr lang="en-US" sz="1200"/>
-              </a:p>
-            </p:txBody>
-          </p:sp>
-          <p:sp>
-            <p:nvSpPr>
-              <p:cNvPr id="10" name="TextBox 9"/>
-              <p:cNvSpPr txBox="1"/>
-              <p:nvPr/>
-            </p:nvSpPr>
-            <p:spPr>
-              <a:xfrm>
-                <a:off x="1151492" y="1015590"/>
-                <a:ext cx="571668" cy="298127"/>
-              </a:xfrm>
-              <a:prstGeom prst="rect">
-                <a:avLst/>
-              </a:prstGeom>
-              <a:noFill/>
-            </p:spPr>
-            <p:txBody>
-              <a:bodyPr wrap="square" rtlCol="0">
-                <a:spAutoFit/>
-              </a:bodyPr>
-              <a:lstStyle/>
-              <a:p>
-                <a:pPr algn="ctr"/>
-                <a:r>
-                  <a:rPr lang="en-US" sz="1200" dirty="0" smtClean="0"/>
-                  <a:t>234</a:t>
-                </a:r>
-                <a:endParaRPr lang="en-US" sz="1200" dirty="0"/>
-              </a:p>
-            </p:txBody>
-          </p:sp>
-          <p:sp>
-            <p:nvSpPr>
-              <p:cNvPr id="11" name="TextBox 10"/>
-              <p:cNvSpPr txBox="1"/>
-              <p:nvPr/>
-            </p:nvSpPr>
-            <p:spPr>
-              <a:xfrm>
-                <a:off x="2019809" y="897643"/>
-                <a:ext cx="571668" cy="298127"/>
-              </a:xfrm>
-              <a:prstGeom prst="rect">
-                <a:avLst/>
-              </a:prstGeom>
-              <a:noFill/>
-            </p:spPr>
-            <p:txBody>
-              <a:bodyPr wrap="square" rtlCol="0">
-                <a:spAutoFit/>
-              </a:bodyPr>
-              <a:lstStyle/>
-              <a:p>
-                <a:pPr algn="ctr"/>
-                <a:r>
-                  <a:rPr lang="en-US" sz="1200" dirty="0" smtClean="0"/>
-                  <a:t>1132</a:t>
-                </a:r>
-                <a:endParaRPr lang="en-US" sz="1200" dirty="0"/>
-              </a:p>
-            </p:txBody>
-          </p:sp>
-          <p:sp>
-            <p:nvSpPr>
-              <p:cNvPr id="12" name="TextBox 11"/>
-              <p:cNvSpPr txBox="1"/>
-              <p:nvPr/>
-            </p:nvSpPr>
-            <p:spPr>
-              <a:xfrm>
-                <a:off x="2874220" y="1015590"/>
-                <a:ext cx="571668" cy="298127"/>
-              </a:xfrm>
-              <a:prstGeom prst="rect">
-                <a:avLst/>
-              </a:prstGeom>
-              <a:noFill/>
-            </p:spPr>
-            <p:txBody>
-              <a:bodyPr wrap="square" rtlCol="0">
-                <a:spAutoFit/>
-              </a:bodyPr>
-              <a:lstStyle/>
-              <a:p>
-                <a:pPr algn="ctr"/>
-                <a:r>
-                  <a:rPr lang="en-US" sz="1200" dirty="0" smtClean="0"/>
-                  <a:t>794</a:t>
-                </a:r>
-                <a:endParaRPr lang="en-US" sz="1200" dirty="0"/>
-              </a:p>
-            </p:txBody>
-          </p:sp>
-          <p:sp>
-            <p:nvSpPr>
-              <p:cNvPr id="13" name="TextBox 12"/>
-              <p:cNvSpPr txBox="1"/>
-              <p:nvPr/>
-            </p:nvSpPr>
-            <p:spPr>
-              <a:xfrm>
-                <a:off x="1534663" y="1715497"/>
-                <a:ext cx="571668" cy="298127"/>
-              </a:xfrm>
-              <a:prstGeom prst="rect">
-                <a:avLst/>
-              </a:prstGeom>
-              <a:noFill/>
-            </p:spPr>
-            <p:txBody>
-              <a:bodyPr wrap="square" rtlCol="0">
-                <a:spAutoFit/>
-              </a:bodyPr>
-              <a:lstStyle/>
-              <a:p>
-                <a:pPr algn="ctr"/>
-                <a:r>
-                  <a:rPr lang="en-US" sz="1200" dirty="0" smtClean="0"/>
-                  <a:t>22</a:t>
-                </a:r>
-                <a:endParaRPr lang="en-US" sz="1200" dirty="0"/>
-              </a:p>
-            </p:txBody>
-          </p:sp>
-          <p:sp>
-            <p:nvSpPr>
-              <p:cNvPr id="14" name="TextBox 13"/>
-              <p:cNvSpPr txBox="1"/>
-              <p:nvPr/>
-            </p:nvSpPr>
-            <p:spPr>
-              <a:xfrm>
-                <a:off x="2019809" y="1414213"/>
-                <a:ext cx="571668" cy="298127"/>
-              </a:xfrm>
-              <a:prstGeom prst="rect">
-                <a:avLst/>
-              </a:prstGeom>
-              <a:noFill/>
-            </p:spPr>
-            <p:txBody>
-              <a:bodyPr wrap="square" rtlCol="0">
-                <a:spAutoFit/>
-              </a:bodyPr>
-              <a:lstStyle/>
-              <a:p>
-                <a:pPr algn="ctr"/>
-                <a:r>
-                  <a:rPr lang="en-US" sz="1200" dirty="0" smtClean="0"/>
-                  <a:t>234</a:t>
-                </a:r>
-                <a:endParaRPr lang="en-US" sz="1200" dirty="0"/>
-              </a:p>
-            </p:txBody>
-          </p:sp>
-          <p:sp>
-            <p:nvSpPr>
-              <p:cNvPr id="15" name="TextBox 14"/>
-              <p:cNvSpPr txBox="1"/>
-              <p:nvPr/>
-            </p:nvSpPr>
-            <p:spPr>
-              <a:xfrm>
-                <a:off x="2515768" y="1715497"/>
-                <a:ext cx="571668" cy="298127"/>
-              </a:xfrm>
-              <a:prstGeom prst="rect">
-                <a:avLst/>
-              </a:prstGeom>
-              <a:noFill/>
-            </p:spPr>
-            <p:txBody>
-              <a:bodyPr wrap="square" rtlCol="0">
-                <a:spAutoFit/>
-              </a:bodyPr>
-              <a:lstStyle/>
-              <a:p>
-                <a:pPr algn="ctr"/>
-                <a:r>
-                  <a:rPr lang="en-US" sz="1200" dirty="0" smtClean="0"/>
-                  <a:t>83</a:t>
-                </a:r>
-                <a:endParaRPr lang="en-US" sz="1200" dirty="0"/>
-              </a:p>
-            </p:txBody>
-          </p:sp>
-          <p:sp>
-            <p:nvSpPr>
-              <p:cNvPr id="16" name="TextBox 15"/>
-              <p:cNvSpPr txBox="1"/>
-              <p:nvPr/>
-            </p:nvSpPr>
-            <p:spPr>
-              <a:xfrm>
-                <a:off x="2019809" y="2318066"/>
-                <a:ext cx="571668" cy="298127"/>
-              </a:xfrm>
-              <a:prstGeom prst="rect">
-                <a:avLst/>
-              </a:prstGeom>
-              <a:noFill/>
-            </p:spPr>
-            <p:txBody>
-              <a:bodyPr wrap="square" rtlCol="0">
-                <a:spAutoFit/>
-              </a:bodyPr>
-              <a:lstStyle/>
-              <a:p>
-                <a:pPr algn="ctr"/>
-                <a:r>
-                  <a:rPr lang="en-US" sz="1200" dirty="0" smtClean="0"/>
-                  <a:t>77</a:t>
-                </a:r>
-                <a:endParaRPr lang="en-US" sz="1200" dirty="0"/>
-              </a:p>
-            </p:txBody>
-          </p:sp>
-          <p:sp>
-            <p:nvSpPr>
-              <p:cNvPr id="17" name="TextBox 16"/>
-              <p:cNvSpPr txBox="1"/>
-              <p:nvPr/>
-            </p:nvSpPr>
-            <p:spPr>
-              <a:xfrm>
-                <a:off x="315625" y="98681"/>
-                <a:ext cx="685521" cy="496879"/>
-              </a:xfrm>
-              <a:prstGeom prst="rect">
-                <a:avLst/>
-              </a:prstGeom>
-              <a:noFill/>
-            </p:spPr>
-            <p:txBody>
-              <a:bodyPr wrap="none" rtlCol="0">
-                <a:spAutoFit/>
-              </a:bodyPr>
-              <a:lstStyle/>
-              <a:p>
-                <a:r>
-                  <a:rPr lang="en-US" sz="1200" dirty="0" smtClean="0"/>
-                  <a:t>Carbon </a:t>
-                </a:r>
-                <a:br>
-                  <a:rPr lang="en-US" sz="1200" dirty="0" smtClean="0"/>
-                </a:br>
-                <a:r>
-                  <a:rPr lang="en-US" sz="1200" dirty="0" smtClean="0"/>
-                  <a:t>Source</a:t>
-                </a:r>
-                <a:endParaRPr lang="en-US" sz="1200" dirty="0"/>
-              </a:p>
-            </p:txBody>
-          </p:sp>
-          <p:sp>
-            <p:nvSpPr>
-              <p:cNvPr id="18" name="TextBox 17"/>
-              <p:cNvSpPr txBox="1"/>
-              <p:nvPr/>
-            </p:nvSpPr>
-            <p:spPr>
-              <a:xfrm>
-                <a:off x="3252756" y="98681"/>
-                <a:ext cx="861257" cy="298127"/>
-              </a:xfrm>
-              <a:prstGeom prst="rect">
-                <a:avLst/>
-              </a:prstGeom>
-              <a:noFill/>
-            </p:spPr>
-            <p:txBody>
-              <a:bodyPr wrap="none" rtlCol="0">
-                <a:spAutoFit/>
-              </a:bodyPr>
-              <a:lstStyle/>
-              <a:p>
-                <a:r>
-                  <a:rPr lang="en-US" sz="1200" dirty="0" smtClean="0"/>
-                  <a:t>Mg Stress</a:t>
-                </a:r>
-                <a:endParaRPr lang="en-US" sz="1200" dirty="0"/>
-              </a:p>
-            </p:txBody>
-          </p:sp>
-          <p:sp>
-            <p:nvSpPr>
-              <p:cNvPr id="19" name="TextBox 18"/>
-              <p:cNvSpPr txBox="1"/>
-              <p:nvPr/>
-            </p:nvSpPr>
-            <p:spPr>
-              <a:xfrm>
-                <a:off x="1913286" y="3034771"/>
-                <a:ext cx="833652" cy="298127"/>
-              </a:xfrm>
-              <a:prstGeom prst="rect">
-                <a:avLst/>
-              </a:prstGeom>
-              <a:noFill/>
-            </p:spPr>
-            <p:txBody>
-              <a:bodyPr wrap="none" rtlCol="0">
-                <a:spAutoFit/>
-              </a:bodyPr>
-              <a:lstStyle/>
-              <a:p>
-                <a:r>
-                  <a:rPr lang="en-US" sz="1200" dirty="0" smtClean="0"/>
-                  <a:t>Na Stress</a:t>
-                </a:r>
-                <a:endParaRPr lang="en-US" sz="1200" dirty="0"/>
-              </a:p>
-            </p:txBody>
-          </p:sp>
-        </p:grpSp>
         <p:sp>
           <p:nvSpPr>
-            <p:cNvPr id="6" name="Rectangle 5"/>
-            <p:cNvSpPr/>
+            <p:cNvPr id="2" name="TextBox 1"/>
+            <p:cNvSpPr txBox="1"/>
             <p:nvPr/>
           </p:nvSpPr>
           <p:spPr>
             <a:xfrm>
-              <a:off x="205933" y="640747"/>
-              <a:ext cx="3741117" cy="3238063"/>
+              <a:off x="221204" y="1549541"/>
+              <a:ext cx="325730" cy="369332"/>
             </a:xfrm>
             <a:prstGeom prst="rect">
               <a:avLst/>
             </a:prstGeom>
             <a:noFill/>
-            <a:effectLst/>
           </p:spPr>
-          <p:style>
-            <a:lnRef idx="1">
-              <a:schemeClr val="accent1"/>
-            </a:lnRef>
-            <a:fillRef idx="3">
-              <a:schemeClr val="accent1"/>
-            </a:fillRef>
-            <a:effectRef idx="2">
-              <a:schemeClr val="accent1"/>
-            </a:effectRef>
-            <a:fontRef idx="minor">
-              <a:schemeClr val="lt1"/>
-            </a:fontRef>
-          </p:style>
           <p:txBody>
-            <a:bodyPr rtlCol="0" anchor="ctr"/>
+            <a:bodyPr wrap="none" rtlCol="0">
+              <a:spAutoFit/>
+            </a:bodyPr>
             <a:lstStyle/>
             <a:p>
-              <a:pPr algn="ctr"/>
-              <a:endParaRPr lang="en-US"/>
+              <a:r>
+                <a:rPr lang="en-US" b="1" dirty="0" smtClean="0"/>
+                <a:t>A</a:t>
+              </a:r>
+              <a:endParaRPr lang="en-US" b="1" dirty="0"/>
             </a:p>
           </p:txBody>
         </p:sp>
-      </p:grpSp>
-      <p:grpSp>
-        <p:nvGrpSpPr>
-          <p:cNvPr id="20" name="Group 19"/>
-          <p:cNvGrpSpPr/>
-          <p:nvPr/>
-        </p:nvGrpSpPr>
-        <p:grpSpPr>
-          <a:xfrm>
-            <a:off x="191134" y="5211221"/>
-            <a:ext cx="3741117" cy="3238063"/>
-            <a:chOff x="205933" y="640747"/>
-            <a:chExt cx="3741117" cy="3238063"/>
-          </a:xfrm>
-        </p:grpSpPr>
-        <p:grpSp>
-          <p:nvGrpSpPr>
-            <p:cNvPr id="21" name="Group 20"/>
-            <p:cNvGrpSpPr>
-              <a:grpSpLocks noChangeAspect="1"/>
-            </p:cNvGrpSpPr>
-            <p:nvPr/>
-          </p:nvGrpSpPr>
-          <p:grpSpPr>
-            <a:xfrm>
-              <a:off x="315625" y="754859"/>
-              <a:ext cx="3529195" cy="3005007"/>
-              <a:chOff x="315625" y="98681"/>
-              <a:chExt cx="3798388" cy="3234217"/>
-            </a:xfrm>
-          </p:grpSpPr>
-          <p:sp>
-            <p:nvSpPr>
-              <p:cNvPr id="23" name="Oval 22"/>
-              <p:cNvSpPr/>
-              <p:nvPr/>
-            </p:nvSpPr>
-            <p:spPr>
-              <a:xfrm>
-                <a:off x="2038349" y="416384"/>
-                <a:ext cx="1815431" cy="1784530"/>
-              </a:xfrm>
-              <a:prstGeom prst="ellipse">
-                <a:avLst/>
-              </a:prstGeom>
-              <a:solidFill>
-                <a:schemeClr val="accent5">
-                  <a:alpha val="43000"/>
-                </a:schemeClr>
-              </a:solidFill>
-              <a:ln>
-                <a:solidFill>
-                  <a:srgbClr val="000000"/>
-                </a:solidFill>
-              </a:ln>
-              <a:effectLst/>
-            </p:spPr>
-            <p:style>
-              <a:lnRef idx="1">
-                <a:schemeClr val="accent1"/>
-              </a:lnRef>
-              <a:fillRef idx="3">
-                <a:schemeClr val="accent1"/>
-              </a:fillRef>
-              <a:effectRef idx="2">
-                <a:schemeClr val="accent1"/>
-              </a:effectRef>
-              <a:fontRef idx="minor">
-                <a:schemeClr val="lt1"/>
-              </a:fontRef>
-            </p:style>
-            <p:txBody>
-              <a:bodyPr rtlCol="0" anchor="ctr"/>
-              <a:lstStyle/>
-              <a:p>
-                <a:pPr algn="ctr"/>
-                <a:endParaRPr lang="en-US" sz="1200"/>
-              </a:p>
-            </p:txBody>
-          </p:sp>
-          <p:sp>
-            <p:nvSpPr>
-              <p:cNvPr id="24" name="Oval 23"/>
-              <p:cNvSpPr/>
-              <p:nvPr/>
-            </p:nvSpPr>
-            <p:spPr>
-              <a:xfrm>
-                <a:off x="776045" y="416384"/>
-                <a:ext cx="1815431" cy="1784530"/>
-              </a:xfrm>
-              <a:prstGeom prst="ellipse">
-                <a:avLst/>
-              </a:prstGeom>
-              <a:solidFill>
-                <a:schemeClr val="accent4">
-                  <a:alpha val="50000"/>
-                </a:schemeClr>
-              </a:solidFill>
-              <a:ln>
-                <a:solidFill>
-                  <a:schemeClr val="tx1"/>
-                </a:solidFill>
-              </a:ln>
-              <a:effectLst/>
-            </p:spPr>
-            <p:style>
-              <a:lnRef idx="1">
-                <a:schemeClr val="accent1"/>
-              </a:lnRef>
-              <a:fillRef idx="3">
-                <a:schemeClr val="accent1"/>
-              </a:fillRef>
-              <a:effectRef idx="2">
-                <a:schemeClr val="accent1"/>
-              </a:effectRef>
-              <a:fontRef idx="minor">
-                <a:schemeClr val="lt1"/>
-              </a:fontRef>
-            </p:style>
-            <p:txBody>
-              <a:bodyPr rtlCol="0" anchor="ctr"/>
-              <a:lstStyle/>
-              <a:p>
-                <a:pPr algn="ctr"/>
-                <a:endParaRPr lang="en-US" sz="1200"/>
-              </a:p>
-            </p:txBody>
-          </p:sp>
-          <p:sp>
-            <p:nvSpPr>
-              <p:cNvPr id="25" name="Oval 24"/>
-              <p:cNvSpPr/>
-              <p:nvPr/>
-            </p:nvSpPr>
-            <p:spPr>
-              <a:xfrm>
-                <a:off x="1437325" y="1251482"/>
-                <a:ext cx="1815431" cy="1784530"/>
-              </a:xfrm>
-              <a:prstGeom prst="ellipse">
-                <a:avLst/>
-              </a:prstGeom>
-              <a:solidFill>
-                <a:schemeClr val="accent6">
-                  <a:alpha val="39000"/>
-                </a:schemeClr>
-              </a:solidFill>
-              <a:ln>
-                <a:solidFill>
-                  <a:srgbClr val="000000"/>
-                </a:solidFill>
-              </a:ln>
-              <a:effectLst/>
-            </p:spPr>
-            <p:style>
-              <a:lnRef idx="1">
-                <a:schemeClr val="accent1"/>
-              </a:lnRef>
-              <a:fillRef idx="3">
-                <a:schemeClr val="accent1"/>
-              </a:fillRef>
-              <a:effectRef idx="2">
-                <a:schemeClr val="accent1"/>
-              </a:effectRef>
-              <a:fontRef idx="minor">
-                <a:schemeClr val="lt1"/>
-              </a:fontRef>
-            </p:style>
-            <p:txBody>
-              <a:bodyPr rtlCol="0" anchor="ctr"/>
-              <a:lstStyle/>
-              <a:p>
-                <a:pPr algn="ctr"/>
-                <a:endParaRPr lang="en-US" sz="1200"/>
-              </a:p>
-            </p:txBody>
-          </p:sp>
-          <p:sp>
-            <p:nvSpPr>
-              <p:cNvPr id="26" name="TextBox 25"/>
-              <p:cNvSpPr txBox="1"/>
-              <p:nvPr/>
-            </p:nvSpPr>
-            <p:spPr>
-              <a:xfrm>
-                <a:off x="1151492" y="1015590"/>
-                <a:ext cx="571668" cy="298127"/>
-              </a:xfrm>
-              <a:prstGeom prst="rect">
-                <a:avLst/>
-              </a:prstGeom>
-              <a:noFill/>
-            </p:spPr>
-            <p:txBody>
-              <a:bodyPr wrap="square" rtlCol="0">
-                <a:spAutoFit/>
-              </a:bodyPr>
-              <a:lstStyle/>
-              <a:p>
-                <a:pPr algn="ctr"/>
-                <a:r>
-                  <a:rPr lang="en-US" sz="1200" dirty="0" smtClean="0"/>
-                  <a:t>139</a:t>
-                </a:r>
-                <a:endParaRPr lang="en-US" sz="1200" dirty="0"/>
-              </a:p>
-            </p:txBody>
-          </p:sp>
-          <p:sp>
-            <p:nvSpPr>
-              <p:cNvPr id="27" name="TextBox 26"/>
-              <p:cNvSpPr txBox="1"/>
-              <p:nvPr/>
-            </p:nvSpPr>
-            <p:spPr>
-              <a:xfrm>
-                <a:off x="2019809" y="897643"/>
-                <a:ext cx="571668" cy="298127"/>
-              </a:xfrm>
-              <a:prstGeom prst="rect">
-                <a:avLst/>
-              </a:prstGeom>
-              <a:noFill/>
-            </p:spPr>
-            <p:txBody>
-              <a:bodyPr wrap="square" rtlCol="0">
-                <a:spAutoFit/>
-              </a:bodyPr>
-              <a:lstStyle/>
-              <a:p>
-                <a:pPr algn="ctr"/>
-                <a:r>
-                  <a:rPr lang="en-US" sz="1200" dirty="0" smtClean="0"/>
-                  <a:t>80</a:t>
-                </a:r>
-                <a:endParaRPr lang="en-US" sz="1200" dirty="0"/>
-              </a:p>
-            </p:txBody>
-          </p:sp>
-          <p:sp>
-            <p:nvSpPr>
-              <p:cNvPr id="28" name="TextBox 27"/>
-              <p:cNvSpPr txBox="1"/>
-              <p:nvPr/>
-            </p:nvSpPr>
-            <p:spPr>
-              <a:xfrm>
-                <a:off x="2874220" y="1015590"/>
-                <a:ext cx="571668" cy="298127"/>
-              </a:xfrm>
-              <a:prstGeom prst="rect">
-                <a:avLst/>
-              </a:prstGeom>
-              <a:noFill/>
-            </p:spPr>
-            <p:txBody>
-              <a:bodyPr wrap="square" rtlCol="0">
-                <a:spAutoFit/>
-              </a:bodyPr>
-              <a:lstStyle/>
-              <a:p>
-                <a:pPr algn="ctr"/>
-                <a:r>
-                  <a:rPr lang="en-US" sz="1200" dirty="0" smtClean="0"/>
-                  <a:t>270</a:t>
-                </a:r>
-                <a:endParaRPr lang="en-US" sz="1200" dirty="0"/>
-              </a:p>
-            </p:txBody>
-          </p:sp>
-          <p:sp>
-            <p:nvSpPr>
-              <p:cNvPr id="29" name="TextBox 28"/>
-              <p:cNvSpPr txBox="1"/>
-              <p:nvPr/>
-            </p:nvSpPr>
-            <p:spPr>
-              <a:xfrm>
-                <a:off x="1534663" y="1715497"/>
-                <a:ext cx="571668" cy="298127"/>
-              </a:xfrm>
-              <a:prstGeom prst="rect">
-                <a:avLst/>
-              </a:prstGeom>
-              <a:noFill/>
-            </p:spPr>
-            <p:txBody>
-              <a:bodyPr wrap="square" rtlCol="0">
-                <a:spAutoFit/>
-              </a:bodyPr>
-              <a:lstStyle/>
-              <a:p>
-                <a:pPr algn="ctr"/>
-                <a:r>
-                  <a:rPr lang="en-US" sz="1200" dirty="0" smtClean="0"/>
-                  <a:t>55</a:t>
-                </a:r>
-                <a:endParaRPr lang="en-US" sz="1200" dirty="0"/>
-              </a:p>
-            </p:txBody>
-          </p:sp>
-          <p:sp>
-            <p:nvSpPr>
-              <p:cNvPr id="30" name="TextBox 29"/>
-              <p:cNvSpPr txBox="1"/>
-              <p:nvPr/>
-            </p:nvSpPr>
-            <p:spPr>
-              <a:xfrm>
-                <a:off x="2019809" y="1414213"/>
-                <a:ext cx="571668" cy="298127"/>
-              </a:xfrm>
-              <a:prstGeom prst="rect">
-                <a:avLst/>
-              </a:prstGeom>
-              <a:noFill/>
-            </p:spPr>
-            <p:txBody>
-              <a:bodyPr wrap="square" rtlCol="0">
-                <a:spAutoFit/>
-              </a:bodyPr>
-              <a:lstStyle/>
-              <a:p>
-                <a:pPr algn="ctr"/>
-                <a:r>
-                  <a:rPr lang="en-US" sz="1200" dirty="0" smtClean="0"/>
-                  <a:t>36</a:t>
-                </a:r>
-                <a:endParaRPr lang="en-US" sz="1200" dirty="0"/>
-              </a:p>
-            </p:txBody>
-          </p:sp>
-          <p:sp>
-            <p:nvSpPr>
-              <p:cNvPr id="31" name="TextBox 30"/>
-              <p:cNvSpPr txBox="1"/>
-              <p:nvPr/>
-            </p:nvSpPr>
-            <p:spPr>
-              <a:xfrm>
-                <a:off x="2515768" y="1715497"/>
-                <a:ext cx="571668" cy="298127"/>
-              </a:xfrm>
-              <a:prstGeom prst="rect">
-                <a:avLst/>
-              </a:prstGeom>
-              <a:noFill/>
-            </p:spPr>
-            <p:txBody>
-              <a:bodyPr wrap="square" rtlCol="0">
-                <a:spAutoFit/>
-              </a:bodyPr>
-              <a:lstStyle/>
-              <a:p>
-                <a:pPr algn="ctr"/>
-                <a:r>
-                  <a:rPr lang="en-US" sz="1200" dirty="0" smtClean="0"/>
-                  <a:t>30</a:t>
-                </a:r>
-                <a:endParaRPr lang="en-US" sz="1200" dirty="0"/>
-              </a:p>
-            </p:txBody>
-          </p:sp>
-          <p:sp>
-            <p:nvSpPr>
-              <p:cNvPr id="32" name="TextBox 31"/>
-              <p:cNvSpPr txBox="1"/>
-              <p:nvPr/>
-            </p:nvSpPr>
-            <p:spPr>
-              <a:xfrm>
-                <a:off x="2019809" y="2318066"/>
-                <a:ext cx="571668" cy="298127"/>
-              </a:xfrm>
-              <a:prstGeom prst="rect">
-                <a:avLst/>
-              </a:prstGeom>
-              <a:noFill/>
-            </p:spPr>
-            <p:txBody>
-              <a:bodyPr wrap="square" rtlCol="0">
-                <a:spAutoFit/>
-              </a:bodyPr>
-              <a:lstStyle/>
-              <a:p>
-                <a:pPr algn="ctr"/>
-                <a:r>
-                  <a:rPr lang="en-US" sz="1200" dirty="0" smtClean="0"/>
-                  <a:t>118</a:t>
-                </a:r>
-                <a:endParaRPr lang="en-US" sz="1200" dirty="0"/>
-              </a:p>
-            </p:txBody>
-          </p:sp>
-          <p:sp>
-            <p:nvSpPr>
-              <p:cNvPr id="33" name="TextBox 32"/>
-              <p:cNvSpPr txBox="1"/>
-              <p:nvPr/>
-            </p:nvSpPr>
-            <p:spPr>
-              <a:xfrm>
-                <a:off x="315625" y="98681"/>
-                <a:ext cx="685521" cy="496879"/>
-              </a:xfrm>
-              <a:prstGeom prst="rect">
-                <a:avLst/>
-              </a:prstGeom>
-              <a:noFill/>
-            </p:spPr>
-            <p:txBody>
-              <a:bodyPr wrap="none" rtlCol="0">
-                <a:spAutoFit/>
-              </a:bodyPr>
-              <a:lstStyle/>
-              <a:p>
-                <a:r>
-                  <a:rPr lang="en-US" sz="1200" dirty="0" smtClean="0"/>
-                  <a:t>Carbon </a:t>
-                </a:r>
-                <a:br>
-                  <a:rPr lang="en-US" sz="1200" dirty="0" smtClean="0"/>
-                </a:br>
-                <a:r>
-                  <a:rPr lang="en-US" sz="1200" dirty="0" smtClean="0"/>
-                  <a:t>Source</a:t>
-                </a:r>
-                <a:endParaRPr lang="en-US" sz="1200" dirty="0"/>
-              </a:p>
-            </p:txBody>
-          </p:sp>
-          <p:sp>
-            <p:nvSpPr>
-              <p:cNvPr id="34" name="TextBox 33"/>
-              <p:cNvSpPr txBox="1"/>
-              <p:nvPr/>
-            </p:nvSpPr>
-            <p:spPr>
-              <a:xfrm>
-                <a:off x="3252756" y="98681"/>
-                <a:ext cx="861257" cy="298127"/>
-              </a:xfrm>
-              <a:prstGeom prst="rect">
-                <a:avLst/>
-              </a:prstGeom>
-              <a:noFill/>
-            </p:spPr>
-            <p:txBody>
-              <a:bodyPr wrap="none" rtlCol="0">
-                <a:spAutoFit/>
-              </a:bodyPr>
-              <a:lstStyle/>
-              <a:p>
-                <a:r>
-                  <a:rPr lang="en-US" sz="1200" dirty="0" smtClean="0"/>
-                  <a:t>Mg Stress</a:t>
-                </a:r>
-                <a:endParaRPr lang="en-US" sz="1200" dirty="0"/>
-              </a:p>
-            </p:txBody>
-          </p:sp>
-          <p:sp>
-            <p:nvSpPr>
-              <p:cNvPr id="35" name="TextBox 34"/>
-              <p:cNvSpPr txBox="1"/>
-              <p:nvPr/>
-            </p:nvSpPr>
-            <p:spPr>
-              <a:xfrm>
-                <a:off x="1913286" y="3034771"/>
-                <a:ext cx="833652" cy="298127"/>
-              </a:xfrm>
-              <a:prstGeom prst="rect">
-                <a:avLst/>
-              </a:prstGeom>
-              <a:noFill/>
-            </p:spPr>
-            <p:txBody>
-              <a:bodyPr wrap="none" rtlCol="0">
-                <a:spAutoFit/>
-              </a:bodyPr>
-              <a:lstStyle/>
-              <a:p>
-                <a:r>
-                  <a:rPr lang="en-US" sz="1200" dirty="0" smtClean="0"/>
-                  <a:t>Na Stress</a:t>
-                </a:r>
-                <a:endParaRPr lang="en-US" sz="1200" dirty="0"/>
-              </a:p>
-            </p:txBody>
-          </p:sp>
-        </p:grpSp>
         <p:sp>
           <p:nvSpPr>
-            <p:cNvPr id="22" name="Rectangle 21"/>
-            <p:cNvSpPr/>
+            <p:cNvPr id="75" name="TextBox 74"/>
+            <p:cNvSpPr txBox="1"/>
             <p:nvPr/>
           </p:nvSpPr>
           <p:spPr>
             <a:xfrm>
-              <a:off x="205933" y="640747"/>
-              <a:ext cx="3741117" cy="3238063"/>
+              <a:off x="221204" y="4966103"/>
+              <a:ext cx="306845" cy="369332"/>
             </a:xfrm>
             <a:prstGeom prst="rect">
               <a:avLst/>
             </a:prstGeom>
             <a:noFill/>
-            <a:effectLst/>
           </p:spPr>
-          <p:style>
-            <a:lnRef idx="1">
-              <a:schemeClr val="accent1"/>
-            </a:lnRef>
-            <a:fillRef idx="3">
-              <a:schemeClr val="accent1"/>
-            </a:fillRef>
-            <a:effectRef idx="2">
-              <a:schemeClr val="accent1"/>
-            </a:effectRef>
-            <a:fontRef idx="minor">
-              <a:schemeClr val="lt1"/>
-            </a:fontRef>
-          </p:style>
           <p:txBody>
-            <a:bodyPr rtlCol="0" anchor="ctr"/>
+            <a:bodyPr wrap="none" rtlCol="0">
+              <a:spAutoFit/>
+            </a:bodyPr>
             <a:lstStyle/>
             <a:p>
-              <a:pPr algn="ctr"/>
-              <a:endParaRPr lang="en-US"/>
+              <a:r>
+                <a:rPr lang="en-US" b="1" dirty="0"/>
+                <a:t>C</a:t>
+              </a:r>
             </a:p>
           </p:txBody>
         </p:sp>
-      </p:grpSp>
-      <p:grpSp>
-        <p:nvGrpSpPr>
-          <p:cNvPr id="36" name="Group 35"/>
-          <p:cNvGrpSpPr/>
-          <p:nvPr/>
-        </p:nvGrpSpPr>
-        <p:grpSpPr>
-          <a:xfrm>
-            <a:off x="4084649" y="1846984"/>
-            <a:ext cx="3741117" cy="3238063"/>
-            <a:chOff x="205933" y="640747"/>
-            <a:chExt cx="3741117" cy="3238063"/>
-          </a:xfrm>
-        </p:grpSpPr>
-        <p:grpSp>
-          <p:nvGrpSpPr>
-            <p:cNvPr id="37" name="Group 36"/>
-            <p:cNvGrpSpPr>
-              <a:grpSpLocks noChangeAspect="1"/>
-            </p:cNvGrpSpPr>
-            <p:nvPr/>
-          </p:nvGrpSpPr>
-          <p:grpSpPr>
-            <a:xfrm>
-              <a:off x="315625" y="754859"/>
-              <a:ext cx="3529195" cy="3005007"/>
-              <a:chOff x="315625" y="98681"/>
-              <a:chExt cx="3798388" cy="3234217"/>
-            </a:xfrm>
-          </p:grpSpPr>
-          <p:sp>
-            <p:nvSpPr>
-              <p:cNvPr id="39" name="Oval 38"/>
-              <p:cNvSpPr/>
-              <p:nvPr/>
-            </p:nvSpPr>
-            <p:spPr>
-              <a:xfrm>
-                <a:off x="2038349" y="416384"/>
-                <a:ext cx="1815431" cy="1784530"/>
-              </a:xfrm>
-              <a:prstGeom prst="ellipse">
-                <a:avLst/>
-              </a:prstGeom>
-              <a:solidFill>
-                <a:schemeClr val="accent5">
-                  <a:alpha val="43000"/>
-                </a:schemeClr>
-              </a:solidFill>
-              <a:ln>
-                <a:solidFill>
-                  <a:srgbClr val="000000"/>
-                </a:solidFill>
-              </a:ln>
-              <a:effectLst/>
-            </p:spPr>
-            <p:style>
-              <a:lnRef idx="1">
-                <a:schemeClr val="accent1"/>
-              </a:lnRef>
-              <a:fillRef idx="3">
-                <a:schemeClr val="accent1"/>
-              </a:fillRef>
-              <a:effectRef idx="2">
-                <a:schemeClr val="accent1"/>
-              </a:effectRef>
-              <a:fontRef idx="minor">
-                <a:schemeClr val="lt1"/>
-              </a:fontRef>
-            </p:style>
-            <p:txBody>
-              <a:bodyPr rtlCol="0" anchor="ctr"/>
-              <a:lstStyle/>
-              <a:p>
-                <a:pPr algn="ctr"/>
-                <a:endParaRPr lang="en-US" sz="1200"/>
-              </a:p>
-            </p:txBody>
-          </p:sp>
-          <p:sp>
-            <p:nvSpPr>
-              <p:cNvPr id="40" name="Oval 39"/>
-              <p:cNvSpPr/>
-              <p:nvPr/>
-            </p:nvSpPr>
-            <p:spPr>
-              <a:xfrm>
-                <a:off x="776045" y="416384"/>
-                <a:ext cx="1815431" cy="1784530"/>
-              </a:xfrm>
-              <a:prstGeom prst="ellipse">
-                <a:avLst/>
-              </a:prstGeom>
-              <a:solidFill>
-                <a:schemeClr val="accent4">
-                  <a:alpha val="50000"/>
-                </a:schemeClr>
-              </a:solidFill>
-              <a:ln>
-                <a:solidFill>
-                  <a:schemeClr val="tx1"/>
-                </a:solidFill>
-              </a:ln>
-              <a:effectLst/>
-            </p:spPr>
-            <p:style>
-              <a:lnRef idx="1">
-                <a:schemeClr val="accent1"/>
-              </a:lnRef>
-              <a:fillRef idx="3">
-                <a:schemeClr val="accent1"/>
-              </a:fillRef>
-              <a:effectRef idx="2">
-                <a:schemeClr val="accent1"/>
-              </a:effectRef>
-              <a:fontRef idx="minor">
-                <a:schemeClr val="lt1"/>
-              </a:fontRef>
-            </p:style>
-            <p:txBody>
-              <a:bodyPr rtlCol="0" anchor="ctr"/>
-              <a:lstStyle/>
-              <a:p>
-                <a:pPr algn="ctr"/>
-                <a:endParaRPr lang="en-US" sz="1200"/>
-              </a:p>
-            </p:txBody>
-          </p:sp>
-          <p:sp>
-            <p:nvSpPr>
-              <p:cNvPr id="41" name="Oval 40"/>
-              <p:cNvSpPr/>
-              <p:nvPr/>
-            </p:nvSpPr>
-            <p:spPr>
-              <a:xfrm>
-                <a:off x="1437325" y="1251482"/>
-                <a:ext cx="1815431" cy="1784530"/>
-              </a:xfrm>
-              <a:prstGeom prst="ellipse">
-                <a:avLst/>
-              </a:prstGeom>
-              <a:solidFill>
-                <a:schemeClr val="accent6">
-                  <a:alpha val="39000"/>
-                </a:schemeClr>
-              </a:solidFill>
-              <a:ln>
-                <a:solidFill>
-                  <a:srgbClr val="000000"/>
-                </a:solidFill>
-              </a:ln>
-              <a:effectLst/>
-            </p:spPr>
-            <p:style>
-              <a:lnRef idx="1">
-                <a:schemeClr val="accent1"/>
-              </a:lnRef>
-              <a:fillRef idx="3">
-                <a:schemeClr val="accent1"/>
-              </a:fillRef>
-              <a:effectRef idx="2">
-                <a:schemeClr val="accent1"/>
-              </a:effectRef>
-              <a:fontRef idx="minor">
-                <a:schemeClr val="lt1"/>
-              </a:fontRef>
-            </p:style>
-            <p:txBody>
-              <a:bodyPr rtlCol="0" anchor="ctr"/>
-              <a:lstStyle/>
-              <a:p>
-                <a:pPr algn="ctr"/>
-                <a:endParaRPr lang="en-US" sz="1200"/>
-              </a:p>
-            </p:txBody>
-          </p:sp>
-          <p:sp>
-            <p:nvSpPr>
-              <p:cNvPr id="42" name="TextBox 41"/>
-              <p:cNvSpPr txBox="1"/>
-              <p:nvPr/>
-            </p:nvSpPr>
-            <p:spPr>
-              <a:xfrm>
-                <a:off x="1151492" y="1015590"/>
-                <a:ext cx="571668" cy="298127"/>
-              </a:xfrm>
-              <a:prstGeom prst="rect">
-                <a:avLst/>
-              </a:prstGeom>
-              <a:noFill/>
-            </p:spPr>
-            <p:txBody>
-              <a:bodyPr wrap="square" rtlCol="0">
-                <a:spAutoFit/>
-              </a:bodyPr>
-              <a:lstStyle/>
-              <a:p>
-                <a:pPr algn="ctr"/>
-                <a:r>
-                  <a:rPr lang="en-US" sz="1200" dirty="0" smtClean="0"/>
-                  <a:t>139</a:t>
-                </a:r>
-                <a:endParaRPr lang="en-US" sz="1200" dirty="0"/>
-              </a:p>
-            </p:txBody>
-          </p:sp>
-          <p:sp>
-            <p:nvSpPr>
-              <p:cNvPr id="43" name="TextBox 42"/>
-              <p:cNvSpPr txBox="1"/>
-              <p:nvPr/>
-            </p:nvSpPr>
-            <p:spPr>
-              <a:xfrm>
-                <a:off x="2019809" y="897643"/>
-                <a:ext cx="571668" cy="298127"/>
-              </a:xfrm>
-              <a:prstGeom prst="rect">
-                <a:avLst/>
-              </a:prstGeom>
-              <a:noFill/>
-            </p:spPr>
-            <p:txBody>
-              <a:bodyPr wrap="square" rtlCol="0">
-                <a:spAutoFit/>
-              </a:bodyPr>
-              <a:lstStyle/>
-              <a:p>
-                <a:pPr algn="ctr"/>
-                <a:r>
-                  <a:rPr lang="en-US" sz="1200" dirty="0"/>
-                  <a:t>4</a:t>
-                </a:r>
-                <a:r>
-                  <a:rPr lang="en-US" sz="1200" dirty="0" smtClean="0"/>
-                  <a:t>5</a:t>
-                </a:r>
-                <a:endParaRPr lang="en-US" sz="1200" dirty="0"/>
-              </a:p>
-            </p:txBody>
-          </p:sp>
-          <p:sp>
-            <p:nvSpPr>
-              <p:cNvPr id="44" name="TextBox 43"/>
-              <p:cNvSpPr txBox="1"/>
-              <p:nvPr/>
-            </p:nvSpPr>
-            <p:spPr>
-              <a:xfrm>
-                <a:off x="2874220" y="1015590"/>
-                <a:ext cx="571668" cy="298127"/>
-              </a:xfrm>
-              <a:prstGeom prst="rect">
-                <a:avLst/>
-              </a:prstGeom>
-              <a:noFill/>
-            </p:spPr>
-            <p:txBody>
-              <a:bodyPr wrap="square" rtlCol="0">
-                <a:spAutoFit/>
-              </a:bodyPr>
-              <a:lstStyle/>
-              <a:p>
-                <a:pPr algn="ctr"/>
-                <a:r>
-                  <a:rPr lang="en-US" sz="1200" dirty="0" smtClean="0"/>
-                  <a:t>84</a:t>
-                </a:r>
-                <a:endParaRPr lang="en-US" sz="1200" dirty="0"/>
-              </a:p>
-            </p:txBody>
-          </p:sp>
-          <p:sp>
-            <p:nvSpPr>
-              <p:cNvPr id="45" name="TextBox 44"/>
-              <p:cNvSpPr txBox="1"/>
-              <p:nvPr/>
-            </p:nvSpPr>
-            <p:spPr>
-              <a:xfrm>
-                <a:off x="1534663" y="1715497"/>
-                <a:ext cx="571668" cy="298127"/>
-              </a:xfrm>
-              <a:prstGeom prst="rect">
-                <a:avLst/>
-              </a:prstGeom>
-              <a:noFill/>
-            </p:spPr>
-            <p:txBody>
-              <a:bodyPr wrap="square" rtlCol="0">
-                <a:spAutoFit/>
-              </a:bodyPr>
-              <a:lstStyle/>
-              <a:p>
-                <a:pPr algn="ctr"/>
-                <a:r>
-                  <a:rPr lang="en-US" sz="1200" dirty="0" smtClean="0"/>
-                  <a:t>1207</a:t>
-                </a:r>
-                <a:endParaRPr lang="en-US" sz="1200" dirty="0"/>
-              </a:p>
-            </p:txBody>
-          </p:sp>
-          <p:sp>
-            <p:nvSpPr>
-              <p:cNvPr id="46" name="TextBox 45"/>
-              <p:cNvSpPr txBox="1"/>
-              <p:nvPr/>
-            </p:nvSpPr>
-            <p:spPr>
-              <a:xfrm>
-                <a:off x="2019809" y="1414213"/>
-                <a:ext cx="571668" cy="298127"/>
-              </a:xfrm>
-              <a:prstGeom prst="rect">
-                <a:avLst/>
-              </a:prstGeom>
-              <a:noFill/>
-            </p:spPr>
-            <p:txBody>
-              <a:bodyPr wrap="square" rtlCol="0">
-                <a:spAutoFit/>
-              </a:bodyPr>
-              <a:lstStyle/>
-              <a:p>
-                <a:pPr algn="ctr"/>
-                <a:r>
-                  <a:rPr lang="en-US" sz="1200" dirty="0" smtClean="0"/>
-                  <a:t>518</a:t>
-                </a:r>
-                <a:endParaRPr lang="en-US" sz="1200" dirty="0"/>
-              </a:p>
-            </p:txBody>
-          </p:sp>
-          <p:sp>
-            <p:nvSpPr>
-              <p:cNvPr id="47" name="TextBox 46"/>
-              <p:cNvSpPr txBox="1"/>
-              <p:nvPr/>
-            </p:nvSpPr>
-            <p:spPr>
-              <a:xfrm>
-                <a:off x="2515768" y="1715497"/>
-                <a:ext cx="571668" cy="298127"/>
-              </a:xfrm>
-              <a:prstGeom prst="rect">
-                <a:avLst/>
-              </a:prstGeom>
-              <a:noFill/>
-            </p:spPr>
-            <p:txBody>
-              <a:bodyPr wrap="square" rtlCol="0">
-                <a:spAutoFit/>
-              </a:bodyPr>
-              <a:lstStyle/>
-              <a:p>
-                <a:pPr algn="ctr"/>
-                <a:r>
-                  <a:rPr lang="en-US" sz="1200" dirty="0" smtClean="0"/>
-                  <a:t>231</a:t>
-                </a:r>
-                <a:endParaRPr lang="en-US" sz="1200" dirty="0"/>
-              </a:p>
-            </p:txBody>
-          </p:sp>
-          <p:sp>
-            <p:nvSpPr>
-              <p:cNvPr id="48" name="TextBox 47"/>
-              <p:cNvSpPr txBox="1"/>
-              <p:nvPr/>
-            </p:nvSpPr>
-            <p:spPr>
-              <a:xfrm>
-                <a:off x="2019809" y="2318066"/>
-                <a:ext cx="571668" cy="298127"/>
-              </a:xfrm>
-              <a:prstGeom prst="rect">
-                <a:avLst/>
-              </a:prstGeom>
-              <a:noFill/>
-            </p:spPr>
-            <p:txBody>
-              <a:bodyPr wrap="square" rtlCol="0">
-                <a:spAutoFit/>
-              </a:bodyPr>
-              <a:lstStyle/>
-              <a:p>
-                <a:pPr algn="ctr"/>
-                <a:r>
-                  <a:rPr lang="en-US" sz="1200" dirty="0" smtClean="0"/>
-                  <a:t>615</a:t>
-                </a:r>
-                <a:endParaRPr lang="en-US" sz="1200" dirty="0"/>
-              </a:p>
-            </p:txBody>
-          </p:sp>
-          <p:sp>
-            <p:nvSpPr>
-              <p:cNvPr id="49" name="TextBox 48"/>
-              <p:cNvSpPr txBox="1"/>
-              <p:nvPr/>
-            </p:nvSpPr>
-            <p:spPr>
-              <a:xfrm>
-                <a:off x="315625" y="98681"/>
-                <a:ext cx="685521" cy="496879"/>
-              </a:xfrm>
-              <a:prstGeom prst="rect">
-                <a:avLst/>
-              </a:prstGeom>
-              <a:noFill/>
-            </p:spPr>
-            <p:txBody>
-              <a:bodyPr wrap="none" rtlCol="0">
-                <a:spAutoFit/>
-              </a:bodyPr>
-              <a:lstStyle/>
-              <a:p>
-                <a:r>
-                  <a:rPr lang="en-US" sz="1200" dirty="0" smtClean="0"/>
-                  <a:t>Carbon </a:t>
-                </a:r>
-                <a:br>
-                  <a:rPr lang="en-US" sz="1200" dirty="0" smtClean="0"/>
-                </a:br>
-                <a:r>
-                  <a:rPr lang="en-US" sz="1200" dirty="0" smtClean="0"/>
-                  <a:t>Source</a:t>
-                </a:r>
-                <a:endParaRPr lang="en-US" sz="1200" dirty="0"/>
-              </a:p>
-            </p:txBody>
-          </p:sp>
-          <p:sp>
-            <p:nvSpPr>
-              <p:cNvPr id="50" name="TextBox 49"/>
-              <p:cNvSpPr txBox="1"/>
-              <p:nvPr/>
-            </p:nvSpPr>
-            <p:spPr>
-              <a:xfrm>
-                <a:off x="3252756" y="98681"/>
-                <a:ext cx="861257" cy="298127"/>
-              </a:xfrm>
-              <a:prstGeom prst="rect">
-                <a:avLst/>
-              </a:prstGeom>
-              <a:noFill/>
-            </p:spPr>
-            <p:txBody>
-              <a:bodyPr wrap="none" rtlCol="0">
-                <a:spAutoFit/>
-              </a:bodyPr>
-              <a:lstStyle/>
-              <a:p>
-                <a:r>
-                  <a:rPr lang="en-US" sz="1200" dirty="0" smtClean="0"/>
-                  <a:t>Mg Stress</a:t>
-                </a:r>
-                <a:endParaRPr lang="en-US" sz="1200" dirty="0"/>
-              </a:p>
-            </p:txBody>
-          </p:sp>
-          <p:sp>
-            <p:nvSpPr>
-              <p:cNvPr id="51" name="TextBox 50"/>
-              <p:cNvSpPr txBox="1"/>
-              <p:nvPr/>
-            </p:nvSpPr>
-            <p:spPr>
-              <a:xfrm>
-                <a:off x="1913286" y="3034771"/>
-                <a:ext cx="833652" cy="298127"/>
-              </a:xfrm>
-              <a:prstGeom prst="rect">
-                <a:avLst/>
-              </a:prstGeom>
-              <a:noFill/>
-            </p:spPr>
-            <p:txBody>
-              <a:bodyPr wrap="none" rtlCol="0">
-                <a:spAutoFit/>
-              </a:bodyPr>
-              <a:lstStyle/>
-              <a:p>
-                <a:r>
-                  <a:rPr lang="en-US" sz="1200" dirty="0" smtClean="0"/>
-                  <a:t>Na Stress</a:t>
-                </a:r>
-                <a:endParaRPr lang="en-US" sz="1200" dirty="0"/>
-              </a:p>
-            </p:txBody>
-          </p:sp>
-        </p:grpSp>
         <p:sp>
           <p:nvSpPr>
-            <p:cNvPr id="38" name="Rectangle 37"/>
-            <p:cNvSpPr/>
+            <p:cNvPr id="76" name="TextBox 75"/>
+            <p:cNvSpPr txBox="1"/>
             <p:nvPr/>
           </p:nvSpPr>
           <p:spPr>
             <a:xfrm>
-              <a:off x="205933" y="640747"/>
-              <a:ext cx="3741117" cy="3238063"/>
+              <a:off x="4299766" y="4925870"/>
+              <a:ext cx="330176" cy="369332"/>
             </a:xfrm>
             <a:prstGeom prst="rect">
               <a:avLst/>
             </a:prstGeom>
             <a:noFill/>
-            <a:effectLst/>
           </p:spPr>
-          <p:style>
-            <a:lnRef idx="1">
-              <a:schemeClr val="accent1"/>
-            </a:lnRef>
-            <a:fillRef idx="3">
-              <a:schemeClr val="accent1"/>
-            </a:fillRef>
-            <a:effectRef idx="2">
-              <a:schemeClr val="accent1"/>
-            </a:effectRef>
-            <a:fontRef idx="minor">
-              <a:schemeClr val="lt1"/>
-            </a:fontRef>
-          </p:style>
           <p:txBody>
-            <a:bodyPr rtlCol="0" anchor="ctr"/>
+            <a:bodyPr wrap="none" rtlCol="0">
+              <a:spAutoFit/>
+            </a:bodyPr>
             <a:lstStyle/>
             <a:p>
-              <a:pPr algn="ctr"/>
-              <a:endParaRPr lang="en-US"/>
+              <a:r>
+                <a:rPr lang="en-US" b="1" dirty="0" smtClean="0"/>
+                <a:t>D</a:t>
+              </a:r>
+              <a:endParaRPr lang="en-US" b="1" dirty="0"/>
             </a:p>
           </p:txBody>
         </p:sp>
-      </p:grpSp>
-      <p:grpSp>
-        <p:nvGrpSpPr>
-          <p:cNvPr id="52" name="Group 51"/>
-          <p:cNvGrpSpPr/>
-          <p:nvPr/>
-        </p:nvGrpSpPr>
-        <p:grpSpPr>
-          <a:xfrm>
-            <a:off x="4088014" y="5208533"/>
-            <a:ext cx="3741117" cy="3238063"/>
-            <a:chOff x="205933" y="640747"/>
-            <a:chExt cx="3741117" cy="3238063"/>
-          </a:xfrm>
-        </p:grpSpPr>
-        <p:grpSp>
-          <p:nvGrpSpPr>
-            <p:cNvPr id="53" name="Group 52"/>
-            <p:cNvGrpSpPr>
-              <a:grpSpLocks noChangeAspect="1"/>
-            </p:cNvGrpSpPr>
-            <p:nvPr/>
-          </p:nvGrpSpPr>
-          <p:grpSpPr>
-            <a:xfrm>
-              <a:off x="315625" y="754859"/>
-              <a:ext cx="3529195" cy="3005007"/>
-              <a:chOff x="315625" y="98681"/>
-              <a:chExt cx="3798388" cy="3234217"/>
-            </a:xfrm>
-          </p:grpSpPr>
-          <p:sp>
-            <p:nvSpPr>
-              <p:cNvPr id="55" name="Oval 54"/>
-              <p:cNvSpPr/>
-              <p:nvPr/>
-            </p:nvSpPr>
-            <p:spPr>
-              <a:xfrm>
-                <a:off x="2038349" y="416384"/>
-                <a:ext cx="1815431" cy="1784530"/>
-              </a:xfrm>
-              <a:prstGeom prst="ellipse">
-                <a:avLst/>
-              </a:prstGeom>
-              <a:solidFill>
-                <a:schemeClr val="accent5">
-                  <a:alpha val="43000"/>
-                </a:schemeClr>
-              </a:solidFill>
-              <a:ln>
-                <a:solidFill>
-                  <a:srgbClr val="000000"/>
-                </a:solidFill>
-              </a:ln>
-              <a:effectLst/>
-            </p:spPr>
-            <p:style>
-              <a:lnRef idx="1">
-                <a:schemeClr val="accent1"/>
-              </a:lnRef>
-              <a:fillRef idx="3">
-                <a:schemeClr val="accent1"/>
-              </a:fillRef>
-              <a:effectRef idx="2">
-                <a:schemeClr val="accent1"/>
-              </a:effectRef>
-              <a:fontRef idx="minor">
-                <a:schemeClr val="lt1"/>
-              </a:fontRef>
-            </p:style>
-            <p:txBody>
-              <a:bodyPr rtlCol="0" anchor="ctr"/>
-              <a:lstStyle/>
-              <a:p>
-                <a:pPr algn="ctr"/>
-                <a:endParaRPr lang="en-US" sz="1200"/>
-              </a:p>
-            </p:txBody>
-          </p:sp>
-          <p:sp>
-            <p:nvSpPr>
-              <p:cNvPr id="56" name="Oval 55"/>
-              <p:cNvSpPr/>
-              <p:nvPr/>
-            </p:nvSpPr>
-            <p:spPr>
-              <a:xfrm>
-                <a:off x="776045" y="416384"/>
-                <a:ext cx="1815431" cy="1784530"/>
-              </a:xfrm>
-              <a:prstGeom prst="ellipse">
-                <a:avLst/>
-              </a:prstGeom>
-              <a:solidFill>
-                <a:schemeClr val="accent4">
-                  <a:alpha val="50000"/>
-                </a:schemeClr>
-              </a:solidFill>
-              <a:ln>
-                <a:solidFill>
-                  <a:schemeClr val="tx1"/>
-                </a:solidFill>
-              </a:ln>
-              <a:effectLst/>
-            </p:spPr>
-            <p:style>
-              <a:lnRef idx="1">
-                <a:schemeClr val="accent1"/>
-              </a:lnRef>
-              <a:fillRef idx="3">
-                <a:schemeClr val="accent1"/>
-              </a:fillRef>
-              <a:effectRef idx="2">
-                <a:schemeClr val="accent1"/>
-              </a:effectRef>
-              <a:fontRef idx="minor">
-                <a:schemeClr val="lt1"/>
-              </a:fontRef>
-            </p:style>
-            <p:txBody>
-              <a:bodyPr rtlCol="0" anchor="ctr"/>
-              <a:lstStyle/>
-              <a:p>
-                <a:pPr algn="ctr"/>
-                <a:endParaRPr lang="en-US" sz="1200"/>
-              </a:p>
-            </p:txBody>
-          </p:sp>
-          <p:sp>
-            <p:nvSpPr>
-              <p:cNvPr id="57" name="Oval 56"/>
-              <p:cNvSpPr/>
-              <p:nvPr/>
-            </p:nvSpPr>
-            <p:spPr>
-              <a:xfrm>
-                <a:off x="1437325" y="1251482"/>
-                <a:ext cx="1815431" cy="1784530"/>
-              </a:xfrm>
-              <a:prstGeom prst="ellipse">
-                <a:avLst/>
-              </a:prstGeom>
-              <a:solidFill>
-                <a:schemeClr val="accent6">
-                  <a:alpha val="39000"/>
-                </a:schemeClr>
-              </a:solidFill>
-              <a:ln>
-                <a:solidFill>
-                  <a:srgbClr val="000000"/>
-                </a:solidFill>
-              </a:ln>
-              <a:effectLst/>
-            </p:spPr>
-            <p:style>
-              <a:lnRef idx="1">
-                <a:schemeClr val="accent1"/>
-              </a:lnRef>
-              <a:fillRef idx="3">
-                <a:schemeClr val="accent1"/>
-              </a:fillRef>
-              <a:effectRef idx="2">
-                <a:schemeClr val="accent1"/>
-              </a:effectRef>
-              <a:fontRef idx="minor">
-                <a:schemeClr val="lt1"/>
-              </a:fontRef>
-            </p:style>
-            <p:txBody>
-              <a:bodyPr rtlCol="0" anchor="ctr"/>
-              <a:lstStyle/>
-              <a:p>
-                <a:pPr algn="ctr"/>
-                <a:endParaRPr lang="en-US" sz="1200"/>
-              </a:p>
-            </p:txBody>
-          </p:sp>
-          <p:sp>
-            <p:nvSpPr>
-              <p:cNvPr id="58" name="TextBox 57"/>
-              <p:cNvSpPr txBox="1"/>
-              <p:nvPr/>
-            </p:nvSpPr>
-            <p:spPr>
-              <a:xfrm>
-                <a:off x="1151492" y="1015590"/>
-                <a:ext cx="571668" cy="298127"/>
-              </a:xfrm>
-              <a:prstGeom prst="rect">
-                <a:avLst/>
-              </a:prstGeom>
-              <a:noFill/>
-            </p:spPr>
-            <p:txBody>
-              <a:bodyPr wrap="square" rtlCol="0">
-                <a:spAutoFit/>
-              </a:bodyPr>
-              <a:lstStyle/>
-              <a:p>
-                <a:pPr algn="ctr"/>
-                <a:r>
-                  <a:rPr lang="en-US" sz="1200" dirty="0" smtClean="0"/>
-                  <a:t>37</a:t>
-                </a:r>
-                <a:endParaRPr lang="en-US" sz="1200" dirty="0"/>
-              </a:p>
-            </p:txBody>
-          </p:sp>
-          <p:sp>
-            <p:nvSpPr>
-              <p:cNvPr id="59" name="TextBox 58"/>
-              <p:cNvSpPr txBox="1"/>
-              <p:nvPr/>
-            </p:nvSpPr>
-            <p:spPr>
-              <a:xfrm>
-                <a:off x="2019809" y="897643"/>
-                <a:ext cx="571668" cy="298127"/>
-              </a:xfrm>
-              <a:prstGeom prst="rect">
-                <a:avLst/>
-              </a:prstGeom>
-              <a:noFill/>
-            </p:spPr>
-            <p:txBody>
-              <a:bodyPr wrap="square" rtlCol="0">
-                <a:spAutoFit/>
-              </a:bodyPr>
-              <a:lstStyle/>
-              <a:p>
-                <a:pPr algn="ctr"/>
-                <a:r>
-                  <a:rPr lang="en-US" sz="1200" dirty="0" smtClean="0"/>
-                  <a:t>11</a:t>
-                </a:r>
-                <a:endParaRPr lang="en-US" sz="1200" dirty="0"/>
-              </a:p>
-            </p:txBody>
-          </p:sp>
-          <p:sp>
-            <p:nvSpPr>
-              <p:cNvPr id="60" name="TextBox 59"/>
-              <p:cNvSpPr txBox="1"/>
-              <p:nvPr/>
-            </p:nvSpPr>
-            <p:spPr>
-              <a:xfrm>
-                <a:off x="2874220" y="1015590"/>
-                <a:ext cx="571668" cy="298127"/>
-              </a:xfrm>
-              <a:prstGeom prst="rect">
-                <a:avLst/>
-              </a:prstGeom>
-              <a:noFill/>
-            </p:spPr>
-            <p:txBody>
-              <a:bodyPr wrap="square" rtlCol="0">
-                <a:spAutoFit/>
-              </a:bodyPr>
-              <a:lstStyle/>
-              <a:p>
-                <a:pPr algn="ctr"/>
-                <a:r>
-                  <a:rPr lang="en-US" sz="1200" dirty="0" smtClean="0"/>
-                  <a:t>58</a:t>
-                </a:r>
-                <a:endParaRPr lang="en-US" sz="1200" dirty="0"/>
-              </a:p>
-            </p:txBody>
-          </p:sp>
-          <p:sp>
-            <p:nvSpPr>
-              <p:cNvPr id="61" name="TextBox 60"/>
-              <p:cNvSpPr txBox="1"/>
-              <p:nvPr/>
-            </p:nvSpPr>
-            <p:spPr>
-              <a:xfrm>
-                <a:off x="1534663" y="1715497"/>
-                <a:ext cx="571668" cy="298127"/>
-              </a:xfrm>
-              <a:prstGeom prst="rect">
-                <a:avLst/>
-              </a:prstGeom>
-              <a:noFill/>
-            </p:spPr>
-            <p:txBody>
-              <a:bodyPr wrap="square" rtlCol="0">
-                <a:spAutoFit/>
-              </a:bodyPr>
-              <a:lstStyle/>
-              <a:p>
-                <a:pPr algn="ctr"/>
-                <a:r>
-                  <a:rPr lang="en-US" sz="1200" dirty="0" smtClean="0"/>
-                  <a:t>772</a:t>
-                </a:r>
-                <a:endParaRPr lang="en-US" sz="1200" dirty="0"/>
-              </a:p>
-            </p:txBody>
-          </p:sp>
-          <p:sp>
-            <p:nvSpPr>
-              <p:cNvPr id="62" name="TextBox 61"/>
-              <p:cNvSpPr txBox="1"/>
-              <p:nvPr/>
-            </p:nvSpPr>
-            <p:spPr>
-              <a:xfrm>
-                <a:off x="2019809" y="1414213"/>
-                <a:ext cx="571668" cy="298127"/>
-              </a:xfrm>
-              <a:prstGeom prst="rect">
-                <a:avLst/>
-              </a:prstGeom>
-              <a:noFill/>
-            </p:spPr>
-            <p:txBody>
-              <a:bodyPr wrap="square" rtlCol="0">
-                <a:spAutoFit/>
-              </a:bodyPr>
-              <a:lstStyle/>
-              <a:p>
-                <a:pPr algn="ctr"/>
-                <a:r>
-                  <a:rPr lang="en-US" sz="1200" dirty="0" smtClean="0"/>
-                  <a:t>15</a:t>
-                </a:r>
-                <a:endParaRPr lang="en-US" sz="1200" dirty="0"/>
-              </a:p>
-            </p:txBody>
-          </p:sp>
-          <p:sp>
-            <p:nvSpPr>
-              <p:cNvPr id="63" name="TextBox 62"/>
-              <p:cNvSpPr txBox="1"/>
-              <p:nvPr/>
-            </p:nvSpPr>
-            <p:spPr>
-              <a:xfrm>
-                <a:off x="2515768" y="1715497"/>
-                <a:ext cx="571668" cy="298127"/>
-              </a:xfrm>
-              <a:prstGeom prst="rect">
-                <a:avLst/>
-              </a:prstGeom>
-              <a:noFill/>
-            </p:spPr>
-            <p:txBody>
-              <a:bodyPr wrap="square" rtlCol="0">
-                <a:spAutoFit/>
-              </a:bodyPr>
-              <a:lstStyle/>
-              <a:p>
-                <a:pPr algn="ctr"/>
-                <a:r>
-                  <a:rPr lang="en-US" sz="1200" dirty="0" smtClean="0"/>
-                  <a:t>419</a:t>
-                </a:r>
-                <a:endParaRPr lang="en-US" sz="1200" dirty="0"/>
-              </a:p>
-            </p:txBody>
-          </p:sp>
-          <p:sp>
-            <p:nvSpPr>
-              <p:cNvPr id="64" name="TextBox 63"/>
-              <p:cNvSpPr txBox="1"/>
-              <p:nvPr/>
-            </p:nvSpPr>
-            <p:spPr>
-              <a:xfrm>
-                <a:off x="2019809" y="2318066"/>
-                <a:ext cx="571668" cy="298127"/>
-              </a:xfrm>
-              <a:prstGeom prst="rect">
-                <a:avLst/>
-              </a:prstGeom>
-              <a:noFill/>
-            </p:spPr>
-            <p:txBody>
-              <a:bodyPr wrap="square" rtlCol="0">
-                <a:spAutoFit/>
-              </a:bodyPr>
-              <a:lstStyle/>
-              <a:p>
-                <a:pPr algn="ctr"/>
-                <a:r>
-                  <a:rPr lang="en-US" sz="1200" dirty="0" smtClean="0"/>
-                  <a:t>1044</a:t>
-                </a:r>
-                <a:endParaRPr lang="en-US" sz="1200" dirty="0"/>
-              </a:p>
-            </p:txBody>
-          </p:sp>
-          <p:sp>
-            <p:nvSpPr>
-              <p:cNvPr id="65" name="TextBox 64"/>
-              <p:cNvSpPr txBox="1"/>
-              <p:nvPr/>
-            </p:nvSpPr>
-            <p:spPr>
-              <a:xfrm>
-                <a:off x="315625" y="98681"/>
-                <a:ext cx="685521" cy="496879"/>
-              </a:xfrm>
-              <a:prstGeom prst="rect">
-                <a:avLst/>
-              </a:prstGeom>
-              <a:noFill/>
-            </p:spPr>
-            <p:txBody>
-              <a:bodyPr wrap="none" rtlCol="0">
-                <a:spAutoFit/>
-              </a:bodyPr>
-              <a:lstStyle/>
-              <a:p>
-                <a:r>
-                  <a:rPr lang="en-US" sz="1200" dirty="0" smtClean="0"/>
-                  <a:t>Carbon </a:t>
-                </a:r>
-                <a:br>
-                  <a:rPr lang="en-US" sz="1200" dirty="0" smtClean="0"/>
-                </a:br>
-                <a:r>
-                  <a:rPr lang="en-US" sz="1200" dirty="0" smtClean="0"/>
-                  <a:t>Source</a:t>
-                </a:r>
-                <a:endParaRPr lang="en-US" sz="1200" dirty="0"/>
-              </a:p>
-            </p:txBody>
-          </p:sp>
-          <p:sp>
-            <p:nvSpPr>
-              <p:cNvPr id="66" name="TextBox 65"/>
-              <p:cNvSpPr txBox="1"/>
-              <p:nvPr/>
-            </p:nvSpPr>
-            <p:spPr>
-              <a:xfrm>
-                <a:off x="3252756" y="98681"/>
-                <a:ext cx="861257" cy="298127"/>
-              </a:xfrm>
-              <a:prstGeom prst="rect">
-                <a:avLst/>
-              </a:prstGeom>
-              <a:noFill/>
-            </p:spPr>
-            <p:txBody>
-              <a:bodyPr wrap="none" rtlCol="0">
-                <a:spAutoFit/>
-              </a:bodyPr>
-              <a:lstStyle/>
-              <a:p>
-                <a:r>
-                  <a:rPr lang="en-US" sz="1200" dirty="0" smtClean="0"/>
-                  <a:t>Mg Stress</a:t>
-                </a:r>
-                <a:endParaRPr lang="en-US" sz="1200" dirty="0"/>
-              </a:p>
-            </p:txBody>
-          </p:sp>
-          <p:sp>
-            <p:nvSpPr>
-              <p:cNvPr id="67" name="TextBox 66"/>
-              <p:cNvSpPr txBox="1"/>
-              <p:nvPr/>
-            </p:nvSpPr>
-            <p:spPr>
-              <a:xfrm>
-                <a:off x="1913286" y="3034771"/>
-                <a:ext cx="833652" cy="298127"/>
-              </a:xfrm>
-              <a:prstGeom prst="rect">
-                <a:avLst/>
-              </a:prstGeom>
-              <a:noFill/>
-            </p:spPr>
-            <p:txBody>
-              <a:bodyPr wrap="none" rtlCol="0">
-                <a:spAutoFit/>
-              </a:bodyPr>
-              <a:lstStyle/>
-              <a:p>
-                <a:r>
-                  <a:rPr lang="en-US" sz="1200" dirty="0" smtClean="0"/>
-                  <a:t>Na Stress</a:t>
-                </a:r>
-                <a:endParaRPr lang="en-US" sz="1200" dirty="0"/>
-              </a:p>
-            </p:txBody>
-          </p:sp>
-        </p:grpSp>
         <p:sp>
           <p:nvSpPr>
-            <p:cNvPr id="54" name="Rectangle 53"/>
-            <p:cNvSpPr/>
+            <p:cNvPr id="77" name="TextBox 76"/>
+            <p:cNvSpPr txBox="1"/>
             <p:nvPr/>
           </p:nvSpPr>
           <p:spPr>
             <a:xfrm>
-              <a:off x="205933" y="640747"/>
-              <a:ext cx="3741117" cy="3238063"/>
+              <a:off x="4299766" y="1509308"/>
+              <a:ext cx="314058" cy="369332"/>
             </a:xfrm>
             <a:prstGeom prst="rect">
               <a:avLst/>
             </a:prstGeom>
             <a:noFill/>
-            <a:effectLst/>
           </p:spPr>
-          <p:style>
-            <a:lnRef idx="1">
-              <a:schemeClr val="accent1"/>
-            </a:lnRef>
-            <a:fillRef idx="3">
-              <a:schemeClr val="accent1"/>
-            </a:fillRef>
-            <a:effectRef idx="2">
-              <a:schemeClr val="accent1"/>
-            </a:effectRef>
-            <a:fontRef idx="minor">
-              <a:schemeClr val="lt1"/>
-            </a:fontRef>
-          </p:style>
           <p:txBody>
-            <a:bodyPr rtlCol="0" anchor="ctr"/>
+            <a:bodyPr wrap="none" rtlCol="0">
+              <a:spAutoFit/>
+            </a:bodyPr>
             <a:lstStyle/>
             <a:p>
-              <a:pPr algn="ctr"/>
-              <a:endParaRPr lang="en-US"/>
+              <a:r>
+                <a:rPr lang="en-US" b="1" dirty="0"/>
+                <a:t>B</a:t>
+              </a:r>
             </a:p>
           </p:txBody>
         </p:sp>
       </p:grpSp>
-      <p:sp>
-        <p:nvSpPr>
-          <p:cNvPr id="68" name="TextBox 67"/>
-          <p:cNvSpPr txBox="1"/>
-          <p:nvPr/>
-        </p:nvSpPr>
-        <p:spPr>
-          <a:xfrm>
-            <a:off x="191134" y="1248575"/>
-            <a:ext cx="776963" cy="369332"/>
-          </a:xfrm>
-          <a:prstGeom prst="rect">
-            <a:avLst/>
-          </a:prstGeom>
-          <a:noFill/>
-        </p:spPr>
-        <p:txBody>
-          <a:bodyPr wrap="none" rtlCol="0">
-            <a:spAutoFit/>
-          </a:bodyPr>
-          <a:lstStyle/>
-          <a:p>
-            <a:r>
-              <a:rPr lang="en-US" dirty="0" smtClean="0"/>
-              <a:t>mRNA</a:t>
-            </a:r>
-            <a:endParaRPr lang="en-US" dirty="0"/>
-          </a:p>
-        </p:txBody>
-      </p:sp>
-      <p:sp>
-        <p:nvSpPr>
-          <p:cNvPr id="69" name="TextBox 68"/>
-          <p:cNvSpPr txBox="1"/>
-          <p:nvPr/>
-        </p:nvSpPr>
-        <p:spPr>
-          <a:xfrm>
-            <a:off x="4088014" y="1248575"/>
-            <a:ext cx="872542" cy="369332"/>
-          </a:xfrm>
-          <a:prstGeom prst="rect">
-            <a:avLst/>
-          </a:prstGeom>
-          <a:noFill/>
-        </p:spPr>
-        <p:txBody>
-          <a:bodyPr wrap="none" rtlCol="0">
-            <a:spAutoFit/>
-          </a:bodyPr>
-          <a:lstStyle/>
-          <a:p>
-            <a:r>
-              <a:rPr lang="en-US" dirty="0" smtClean="0"/>
-              <a:t>Protein</a:t>
-            </a:r>
-            <a:endParaRPr lang="en-US" dirty="0"/>
-          </a:p>
-        </p:txBody>
-      </p:sp>
-      <p:sp>
-        <p:nvSpPr>
-          <p:cNvPr id="70" name="TextBox 69"/>
-          <p:cNvSpPr txBox="1"/>
-          <p:nvPr/>
-        </p:nvSpPr>
-        <p:spPr>
-          <a:xfrm>
-            <a:off x="7914648" y="3093996"/>
-            <a:ext cx="1289911" cy="369332"/>
-          </a:xfrm>
-          <a:prstGeom prst="rect">
-            <a:avLst/>
-          </a:prstGeom>
-          <a:noFill/>
-        </p:spPr>
-        <p:txBody>
-          <a:bodyPr wrap="none" rtlCol="0">
-            <a:spAutoFit/>
-          </a:bodyPr>
-          <a:lstStyle/>
-          <a:p>
-            <a:r>
-              <a:rPr lang="en-US" dirty="0" smtClean="0"/>
-              <a:t>Exponential</a:t>
-            </a:r>
-            <a:endParaRPr lang="en-US" dirty="0"/>
-          </a:p>
-        </p:txBody>
-      </p:sp>
-      <p:sp>
-        <p:nvSpPr>
-          <p:cNvPr id="71" name="TextBox 70"/>
-          <p:cNvSpPr txBox="1"/>
-          <p:nvPr/>
-        </p:nvSpPr>
-        <p:spPr>
-          <a:xfrm>
-            <a:off x="7914648" y="6451571"/>
-            <a:ext cx="1146468" cy="369332"/>
-          </a:xfrm>
-          <a:prstGeom prst="rect">
-            <a:avLst/>
-          </a:prstGeom>
-          <a:noFill/>
-        </p:spPr>
-        <p:txBody>
-          <a:bodyPr wrap="none" rtlCol="0">
-            <a:spAutoFit/>
-          </a:bodyPr>
-          <a:lstStyle/>
-          <a:p>
-            <a:r>
-              <a:rPr lang="en-US" dirty="0" smtClean="0"/>
-              <a:t>Stationary</a:t>
-            </a:r>
-            <a:endParaRPr lang="en-US" dirty="0"/>
-          </a:p>
-        </p:txBody>
-      </p:sp>
-      <p:sp>
-        <p:nvSpPr>
-          <p:cNvPr id="2" name="TextBox 1"/>
-          <p:cNvSpPr txBox="1"/>
-          <p:nvPr/>
-        </p:nvSpPr>
-        <p:spPr>
-          <a:xfrm>
-            <a:off x="300826" y="2463756"/>
-            <a:ext cx="325730" cy="369332"/>
-          </a:xfrm>
-          <a:prstGeom prst="rect">
-            <a:avLst/>
-          </a:prstGeom>
-          <a:noFill/>
-        </p:spPr>
-        <p:txBody>
-          <a:bodyPr wrap="none" rtlCol="0">
-            <a:spAutoFit/>
-          </a:bodyPr>
-          <a:lstStyle/>
-          <a:p>
-            <a:r>
-              <a:rPr lang="en-US" b="1" dirty="0" smtClean="0"/>
-              <a:t>A</a:t>
-            </a:r>
-            <a:endParaRPr lang="en-US" b="1" dirty="0"/>
-          </a:p>
-        </p:txBody>
-      </p:sp>
-      <p:sp>
-        <p:nvSpPr>
-          <p:cNvPr id="75" name="TextBox 74"/>
-          <p:cNvSpPr txBox="1"/>
-          <p:nvPr/>
-        </p:nvSpPr>
-        <p:spPr>
-          <a:xfrm>
-            <a:off x="300826" y="5880318"/>
-            <a:ext cx="306845" cy="369332"/>
-          </a:xfrm>
-          <a:prstGeom prst="rect">
-            <a:avLst/>
-          </a:prstGeom>
-          <a:noFill/>
-        </p:spPr>
-        <p:txBody>
-          <a:bodyPr wrap="none" rtlCol="0">
-            <a:spAutoFit/>
-          </a:bodyPr>
-          <a:lstStyle/>
-          <a:p>
-            <a:r>
-              <a:rPr lang="en-US" b="1" dirty="0"/>
-              <a:t>C</a:t>
-            </a:r>
-            <a:endParaRPr lang="en-US" b="1" dirty="0"/>
-          </a:p>
-        </p:txBody>
-      </p:sp>
-      <p:sp>
-        <p:nvSpPr>
-          <p:cNvPr id="76" name="TextBox 75"/>
-          <p:cNvSpPr txBox="1"/>
-          <p:nvPr/>
-        </p:nvSpPr>
-        <p:spPr>
-          <a:xfrm>
-            <a:off x="4299766" y="5880318"/>
-            <a:ext cx="330176" cy="369332"/>
-          </a:xfrm>
-          <a:prstGeom prst="rect">
-            <a:avLst/>
-          </a:prstGeom>
-          <a:noFill/>
-        </p:spPr>
-        <p:txBody>
-          <a:bodyPr wrap="none" rtlCol="0">
-            <a:spAutoFit/>
-          </a:bodyPr>
-          <a:lstStyle/>
-          <a:p>
-            <a:r>
-              <a:rPr lang="en-US" b="1" dirty="0" smtClean="0"/>
-              <a:t>D</a:t>
-            </a:r>
-            <a:endParaRPr lang="en-US" b="1" dirty="0"/>
-          </a:p>
-        </p:txBody>
-      </p:sp>
-      <p:sp>
-        <p:nvSpPr>
-          <p:cNvPr id="77" name="TextBox 76"/>
-          <p:cNvSpPr txBox="1"/>
-          <p:nvPr/>
-        </p:nvSpPr>
-        <p:spPr>
-          <a:xfrm>
-            <a:off x="4299766" y="2463756"/>
-            <a:ext cx="314058" cy="369332"/>
-          </a:xfrm>
-          <a:prstGeom prst="rect">
-            <a:avLst/>
-          </a:prstGeom>
-          <a:noFill/>
-        </p:spPr>
-        <p:txBody>
-          <a:bodyPr wrap="none" rtlCol="0">
-            <a:spAutoFit/>
-          </a:bodyPr>
-          <a:lstStyle/>
-          <a:p>
-            <a:r>
-              <a:rPr lang="en-US" b="1" dirty="0"/>
-              <a:t>B</a:t>
-            </a:r>
-            <a:endParaRPr lang="en-US" b="1" dirty="0"/>
-          </a:p>
-        </p:txBody>
-      </p:sp>
     </p:spTree>
     <p:extLst>
       <p:ext uri="{BB962C8B-B14F-4D97-AF65-F5344CB8AC3E}">

</xml_diff>

<commit_message>
some code update kegg and mf pathways
</commit_message>
<xml_diff>
--- a/text/fig5_responses_to_conditions.pptx
+++ b/text/fig5_responses_to_conditions.pptx
@@ -6,6 +6,7 @@
   </p:sldMasterIdLst>
   <p:sldIdLst>
     <p:sldId id="256" r:id="rId2"/>
+    <p:sldId id="257" r:id="rId3"/>
   </p:sldIdLst>
   <p:sldSz cx="9144000" cy="8686800"/>
   <p:notesSz cx="6858000" cy="9144000"/>
@@ -288,7 +289,7 @@
           <a:p>
             <a:fld id="{1FCDAA73-CC50-0946-9171-AC34B7EC631E}" type="datetimeFigureOut">
               <a:rPr lang="en-US" smtClean="0"/>
-              <a:t>2/24/16</a:t>
+              <a:t>3/2/16</a:t>
             </a:fld>
             <a:endParaRPr lang="en-US"/>
           </a:p>
@@ -458,7 +459,7 @@
           <a:p>
             <a:fld id="{1FCDAA73-CC50-0946-9171-AC34B7EC631E}" type="datetimeFigureOut">
               <a:rPr lang="en-US" smtClean="0"/>
-              <a:t>2/24/16</a:t>
+              <a:t>3/2/16</a:t>
             </a:fld>
             <a:endParaRPr lang="en-US"/>
           </a:p>
@@ -638,7 +639,7 @@
           <a:p>
             <a:fld id="{1FCDAA73-CC50-0946-9171-AC34B7EC631E}" type="datetimeFigureOut">
               <a:rPr lang="en-US" smtClean="0"/>
-              <a:t>2/24/16</a:t>
+              <a:t>3/2/16</a:t>
             </a:fld>
             <a:endParaRPr lang="en-US"/>
           </a:p>
@@ -808,7 +809,7 @@
           <a:p>
             <a:fld id="{1FCDAA73-CC50-0946-9171-AC34B7EC631E}" type="datetimeFigureOut">
               <a:rPr lang="en-US" smtClean="0"/>
-              <a:t>2/24/16</a:t>
+              <a:t>3/2/16</a:t>
             </a:fld>
             <a:endParaRPr lang="en-US"/>
           </a:p>
@@ -1054,7 +1055,7 @@
           <a:p>
             <a:fld id="{1FCDAA73-CC50-0946-9171-AC34B7EC631E}" type="datetimeFigureOut">
               <a:rPr lang="en-US" smtClean="0"/>
-              <a:t>2/24/16</a:t>
+              <a:t>3/2/16</a:t>
             </a:fld>
             <a:endParaRPr lang="en-US"/>
           </a:p>
@@ -1342,7 +1343,7 @@
           <a:p>
             <a:fld id="{1FCDAA73-CC50-0946-9171-AC34B7EC631E}" type="datetimeFigureOut">
               <a:rPr lang="en-US" smtClean="0"/>
-              <a:t>2/24/16</a:t>
+              <a:t>3/2/16</a:t>
             </a:fld>
             <a:endParaRPr lang="en-US"/>
           </a:p>
@@ -1769,7 +1770,7 @@
           <a:p>
             <a:fld id="{1FCDAA73-CC50-0946-9171-AC34B7EC631E}" type="datetimeFigureOut">
               <a:rPr lang="en-US" smtClean="0"/>
-              <a:t>2/24/16</a:t>
+              <a:t>3/2/16</a:t>
             </a:fld>
             <a:endParaRPr lang="en-US"/>
           </a:p>
@@ -1887,7 +1888,7 @@
           <a:p>
             <a:fld id="{1FCDAA73-CC50-0946-9171-AC34B7EC631E}" type="datetimeFigureOut">
               <a:rPr lang="en-US" smtClean="0"/>
-              <a:t>2/24/16</a:t>
+              <a:t>3/2/16</a:t>
             </a:fld>
             <a:endParaRPr lang="en-US"/>
           </a:p>
@@ -1982,7 +1983,7 @@
           <a:p>
             <a:fld id="{1FCDAA73-CC50-0946-9171-AC34B7EC631E}" type="datetimeFigureOut">
               <a:rPr lang="en-US" smtClean="0"/>
-              <a:t>2/24/16</a:t>
+              <a:t>3/2/16</a:t>
             </a:fld>
             <a:endParaRPr lang="en-US"/>
           </a:p>
@@ -2259,7 +2260,7 @@
           <a:p>
             <a:fld id="{1FCDAA73-CC50-0946-9171-AC34B7EC631E}" type="datetimeFigureOut">
               <a:rPr lang="en-US" smtClean="0"/>
-              <a:t>2/24/16</a:t>
+              <a:t>3/2/16</a:t>
             </a:fld>
             <a:endParaRPr lang="en-US"/>
           </a:p>
@@ -2512,7 +2513,7 @@
           <a:p>
             <a:fld id="{1FCDAA73-CC50-0946-9171-AC34B7EC631E}" type="datetimeFigureOut">
               <a:rPr lang="en-US" smtClean="0"/>
-              <a:t>2/24/16</a:t>
+              <a:t>3/2/16</a:t>
             </a:fld>
             <a:endParaRPr lang="en-US"/>
           </a:p>
@@ -2725,7 +2726,7 @@
           <a:p>
             <a:fld id="{1FCDAA73-CC50-0946-9171-AC34B7EC631E}" type="datetimeFigureOut">
               <a:rPr lang="en-US" smtClean="0"/>
-              <a:t>2/24/16</a:t>
+              <a:t>3/2/16</a:t>
             </a:fld>
             <a:endParaRPr lang="en-US"/>
           </a:p>
@@ -3795,7 +3796,6 @@
                 <a:rPr lang="en-US" sz="1200" dirty="0"/>
                 <a:t>2</a:t>
               </a:r>
-              <a:endParaRPr lang="en-US" sz="1200" dirty="0"/>
             </a:p>
           </p:txBody>
         </p:sp>
@@ -3888,7 +3888,6 @@
                 <a:rPr lang="en-US" sz="1200" dirty="0"/>
                 <a:t>2</a:t>
               </a:r>
-              <a:endParaRPr lang="en-US" sz="1200" dirty="0"/>
             </a:p>
           </p:txBody>
         </p:sp>
@@ -5260,6 +5259,1186 @@
     <p:extLst>
       <p:ext uri="{BB962C8B-B14F-4D97-AF65-F5344CB8AC3E}">
         <p14:creationId xmlns:p14="http://schemas.microsoft.com/office/powerpoint/2010/main" val="1321434054"/>
+      </p:ext>
+    </p:extLst>
+  </p:cSld>
+  <p:clrMapOvr>
+    <a:masterClrMapping/>
+  </p:clrMapOvr>
+  <p:timing>
+    <p:tnLst>
+      <p:par>
+        <p:cTn xmlns:p14="http://schemas.microsoft.com/office/powerpoint/2010/main" id="1" dur="indefinite" restart="never" nodeType="tmRoot"/>
+      </p:par>
+    </p:tnLst>
+  </p:timing>
+</p:sld>
+</file>
+
+<file path=ppt/slides/slide2.xml><?xml version="1.0" encoding="utf-8"?>
+<p:sld xmlns:a="http://schemas.openxmlformats.org/drawingml/2006/main" xmlns:r="http://schemas.openxmlformats.org/officeDocument/2006/relationships" xmlns:p="http://schemas.openxmlformats.org/presentationml/2006/main">
+  <p:cSld>
+    <p:spTree>
+      <p:nvGrpSpPr>
+        <p:cNvPr id="1" name=""/>
+        <p:cNvGrpSpPr/>
+        <p:nvPr/>
+      </p:nvGrpSpPr>
+      <p:grpSpPr>
+        <a:xfrm>
+          <a:off x="0" y="0"/>
+          <a:ext cx="0" cy="0"/>
+          <a:chOff x="0" y="0"/>
+          <a:chExt cx="0" cy="0"/>
+        </a:xfrm>
+      </p:grpSpPr>
+      <p:grpSp>
+        <p:nvGrpSpPr>
+          <p:cNvPr id="20" name="Group 19"/>
+          <p:cNvGrpSpPr/>
+          <p:nvPr/>
+        </p:nvGrpSpPr>
+        <p:grpSpPr>
+          <a:xfrm>
+            <a:off x="4179118" y="2204980"/>
+            <a:ext cx="3805695" cy="2774175"/>
+            <a:chOff x="4205853" y="5553477"/>
+            <a:chExt cx="3805695" cy="2774175"/>
+          </a:xfrm>
+        </p:grpSpPr>
+        <p:sp>
+          <p:nvSpPr>
+            <p:cNvPr id="55" name="Oval 54"/>
+            <p:cNvSpPr/>
+            <p:nvPr/>
+          </p:nvSpPr>
+          <p:spPr>
+            <a:xfrm>
+              <a:off x="5798340" y="5617832"/>
+              <a:ext cx="1686771" cy="1658060"/>
+            </a:xfrm>
+            <a:prstGeom prst="ellipse">
+              <a:avLst/>
+            </a:prstGeom>
+            <a:solidFill>
+              <a:schemeClr val="accent5">
+                <a:alpha val="43000"/>
+              </a:schemeClr>
+            </a:solidFill>
+            <a:ln>
+              <a:solidFill>
+                <a:srgbClr val="000000"/>
+              </a:solidFill>
+            </a:ln>
+            <a:effectLst/>
+          </p:spPr>
+          <p:style>
+            <a:lnRef idx="1">
+              <a:schemeClr val="accent1"/>
+            </a:lnRef>
+            <a:fillRef idx="3">
+              <a:schemeClr val="accent1"/>
+            </a:fillRef>
+            <a:effectRef idx="2">
+              <a:schemeClr val="accent1"/>
+            </a:effectRef>
+            <a:fontRef idx="minor">
+              <a:schemeClr val="lt1"/>
+            </a:fontRef>
+          </p:style>
+          <p:txBody>
+            <a:bodyPr rtlCol="0" anchor="ctr"/>
+            <a:lstStyle/>
+            <a:p>
+              <a:pPr algn="ctr"/>
+              <a:endParaRPr lang="en-US" sz="1200"/>
+            </a:p>
+          </p:txBody>
+        </p:sp>
+        <p:sp>
+          <p:nvSpPr>
+            <p:cNvPr id="56" name="Oval 55"/>
+            <p:cNvSpPr/>
+            <p:nvPr/>
+          </p:nvSpPr>
+          <p:spPr>
+            <a:xfrm>
+              <a:off x="4625496" y="5617832"/>
+              <a:ext cx="1686771" cy="1658060"/>
+            </a:xfrm>
+            <a:prstGeom prst="ellipse">
+              <a:avLst/>
+            </a:prstGeom>
+            <a:solidFill>
+              <a:schemeClr val="accent4">
+                <a:alpha val="50000"/>
+              </a:schemeClr>
+            </a:solidFill>
+            <a:ln>
+              <a:solidFill>
+                <a:schemeClr val="tx1"/>
+              </a:solidFill>
+            </a:ln>
+            <a:effectLst/>
+          </p:spPr>
+          <p:style>
+            <a:lnRef idx="1">
+              <a:schemeClr val="accent1"/>
+            </a:lnRef>
+            <a:fillRef idx="3">
+              <a:schemeClr val="accent1"/>
+            </a:fillRef>
+            <a:effectRef idx="2">
+              <a:schemeClr val="accent1"/>
+            </a:effectRef>
+            <a:fontRef idx="minor">
+              <a:schemeClr val="lt1"/>
+            </a:fontRef>
+          </p:style>
+          <p:txBody>
+            <a:bodyPr rtlCol="0" anchor="ctr"/>
+            <a:lstStyle/>
+            <a:p>
+              <a:pPr algn="ctr"/>
+              <a:endParaRPr lang="en-US" sz="1200"/>
+            </a:p>
+          </p:txBody>
+        </p:sp>
+        <p:sp>
+          <p:nvSpPr>
+            <p:cNvPr id="57" name="Oval 56"/>
+            <p:cNvSpPr/>
+            <p:nvPr/>
+          </p:nvSpPr>
+          <p:spPr>
+            <a:xfrm>
+              <a:off x="5239911" y="6393747"/>
+              <a:ext cx="1686771" cy="1658060"/>
+            </a:xfrm>
+            <a:prstGeom prst="ellipse">
+              <a:avLst/>
+            </a:prstGeom>
+            <a:solidFill>
+              <a:schemeClr val="accent6">
+                <a:alpha val="39000"/>
+              </a:schemeClr>
+            </a:solidFill>
+            <a:ln>
+              <a:solidFill>
+                <a:srgbClr val="000000"/>
+              </a:solidFill>
+            </a:ln>
+            <a:effectLst/>
+          </p:spPr>
+          <p:style>
+            <a:lnRef idx="1">
+              <a:schemeClr val="accent1"/>
+            </a:lnRef>
+            <a:fillRef idx="3">
+              <a:schemeClr val="accent1"/>
+            </a:fillRef>
+            <a:effectRef idx="2">
+              <a:schemeClr val="accent1"/>
+            </a:effectRef>
+            <a:fontRef idx="minor">
+              <a:schemeClr val="lt1"/>
+            </a:fontRef>
+          </p:style>
+          <p:txBody>
+            <a:bodyPr rtlCol="0" anchor="ctr"/>
+            <a:lstStyle/>
+            <a:p>
+              <a:pPr algn="ctr"/>
+              <a:endParaRPr lang="en-US" sz="1200"/>
+            </a:p>
+          </p:txBody>
+        </p:sp>
+        <p:sp>
+          <p:nvSpPr>
+            <p:cNvPr id="58" name="TextBox 57"/>
+            <p:cNvSpPr txBox="1"/>
+            <p:nvPr/>
+          </p:nvSpPr>
+          <p:spPr>
+            <a:xfrm>
+              <a:off x="4974335" y="6174572"/>
+              <a:ext cx="531154" cy="276999"/>
+            </a:xfrm>
+            <a:prstGeom prst="rect">
+              <a:avLst/>
+            </a:prstGeom>
+            <a:noFill/>
+          </p:spPr>
+          <p:txBody>
+            <a:bodyPr wrap="square" rtlCol="0">
+              <a:spAutoFit/>
+            </a:bodyPr>
+            <a:lstStyle/>
+            <a:p>
+              <a:pPr algn="ctr"/>
+              <a:r>
+                <a:rPr lang="en-US" sz="1200" dirty="0" smtClean="0"/>
+                <a:t>53</a:t>
+              </a:r>
+              <a:endParaRPr lang="en-US" sz="1200" dirty="0"/>
+            </a:p>
+          </p:txBody>
+        </p:sp>
+        <p:sp>
+          <p:nvSpPr>
+            <p:cNvPr id="59" name="TextBox 58"/>
+            <p:cNvSpPr txBox="1"/>
+            <p:nvPr/>
+          </p:nvSpPr>
+          <p:spPr>
+            <a:xfrm>
+              <a:off x="5781114" y="6064984"/>
+              <a:ext cx="531154" cy="276999"/>
+            </a:xfrm>
+            <a:prstGeom prst="rect">
+              <a:avLst/>
+            </a:prstGeom>
+            <a:noFill/>
+          </p:spPr>
+          <p:txBody>
+            <a:bodyPr wrap="square" rtlCol="0">
+              <a:spAutoFit/>
+            </a:bodyPr>
+            <a:lstStyle/>
+            <a:p>
+              <a:pPr algn="ctr"/>
+              <a:r>
+                <a:rPr lang="en-US" sz="1200" dirty="0"/>
+                <a:t>2</a:t>
+              </a:r>
+            </a:p>
+          </p:txBody>
+        </p:sp>
+        <p:sp>
+          <p:nvSpPr>
+            <p:cNvPr id="60" name="TextBox 59"/>
+            <p:cNvSpPr txBox="1"/>
+            <p:nvPr/>
+          </p:nvSpPr>
+          <p:spPr>
+            <a:xfrm>
+              <a:off x="6574973" y="6174572"/>
+              <a:ext cx="531154" cy="276999"/>
+            </a:xfrm>
+            <a:prstGeom prst="rect">
+              <a:avLst/>
+            </a:prstGeom>
+            <a:noFill/>
+          </p:spPr>
+          <p:txBody>
+            <a:bodyPr wrap="square" rtlCol="0">
+              <a:spAutoFit/>
+            </a:bodyPr>
+            <a:lstStyle/>
+            <a:p>
+              <a:pPr algn="ctr"/>
+              <a:r>
+                <a:rPr lang="en-US" sz="1200" dirty="0" smtClean="0"/>
+                <a:t>14</a:t>
+              </a:r>
+              <a:endParaRPr lang="en-US" sz="1200" dirty="0"/>
+            </a:p>
+          </p:txBody>
+        </p:sp>
+        <p:sp>
+          <p:nvSpPr>
+            <p:cNvPr id="61" name="TextBox 60"/>
+            <p:cNvSpPr txBox="1"/>
+            <p:nvPr/>
+          </p:nvSpPr>
+          <p:spPr>
+            <a:xfrm>
+              <a:off x="5330351" y="6824877"/>
+              <a:ext cx="531154" cy="276999"/>
+            </a:xfrm>
+            <a:prstGeom prst="rect">
+              <a:avLst/>
+            </a:prstGeom>
+            <a:noFill/>
+          </p:spPr>
+          <p:txBody>
+            <a:bodyPr wrap="square" rtlCol="0">
+              <a:spAutoFit/>
+            </a:bodyPr>
+            <a:lstStyle/>
+            <a:p>
+              <a:pPr algn="ctr"/>
+              <a:r>
+                <a:rPr lang="en-US" sz="1200" dirty="0" smtClean="0"/>
+                <a:t>297</a:t>
+              </a:r>
+              <a:endParaRPr lang="en-US" sz="1200" dirty="0"/>
+            </a:p>
+          </p:txBody>
+        </p:sp>
+        <p:sp>
+          <p:nvSpPr>
+            <p:cNvPr id="62" name="TextBox 61"/>
+            <p:cNvSpPr txBox="1"/>
+            <p:nvPr/>
+          </p:nvSpPr>
+          <p:spPr>
+            <a:xfrm>
+              <a:off x="5781114" y="6544945"/>
+              <a:ext cx="531154" cy="276999"/>
+            </a:xfrm>
+            <a:prstGeom prst="rect">
+              <a:avLst/>
+            </a:prstGeom>
+            <a:noFill/>
+          </p:spPr>
+          <p:txBody>
+            <a:bodyPr wrap="square" rtlCol="0">
+              <a:spAutoFit/>
+            </a:bodyPr>
+            <a:lstStyle/>
+            <a:p>
+              <a:pPr algn="ctr"/>
+              <a:r>
+                <a:rPr lang="en-US" sz="1200" dirty="0"/>
+                <a:t>2</a:t>
+              </a:r>
+            </a:p>
+          </p:txBody>
+        </p:sp>
+        <p:sp>
+          <p:nvSpPr>
+            <p:cNvPr id="63" name="TextBox 62"/>
+            <p:cNvSpPr txBox="1"/>
+            <p:nvPr/>
+          </p:nvSpPr>
+          <p:spPr>
+            <a:xfrm>
+              <a:off x="6241924" y="6824877"/>
+              <a:ext cx="531154" cy="276999"/>
+            </a:xfrm>
+            <a:prstGeom prst="rect">
+              <a:avLst/>
+            </a:prstGeom>
+            <a:noFill/>
+          </p:spPr>
+          <p:txBody>
+            <a:bodyPr wrap="square" rtlCol="0">
+              <a:spAutoFit/>
+            </a:bodyPr>
+            <a:lstStyle/>
+            <a:p>
+              <a:pPr algn="ctr"/>
+              <a:r>
+                <a:rPr lang="en-US" sz="1200" dirty="0" smtClean="0"/>
+                <a:t>16</a:t>
+              </a:r>
+              <a:endParaRPr lang="en-US" sz="1200" dirty="0"/>
+            </a:p>
+          </p:txBody>
+        </p:sp>
+        <p:sp>
+          <p:nvSpPr>
+            <p:cNvPr id="64" name="TextBox 63"/>
+            <p:cNvSpPr txBox="1"/>
+            <p:nvPr/>
+          </p:nvSpPr>
+          <p:spPr>
+            <a:xfrm>
+              <a:off x="5781114" y="7384741"/>
+              <a:ext cx="531154" cy="276999"/>
+            </a:xfrm>
+            <a:prstGeom prst="rect">
+              <a:avLst/>
+            </a:prstGeom>
+            <a:noFill/>
+          </p:spPr>
+          <p:txBody>
+            <a:bodyPr wrap="square" rtlCol="0">
+              <a:spAutoFit/>
+            </a:bodyPr>
+            <a:lstStyle/>
+            <a:p>
+              <a:pPr algn="ctr"/>
+              <a:r>
+                <a:rPr lang="en-US" sz="1200" dirty="0" smtClean="0"/>
+                <a:t>1186</a:t>
+              </a:r>
+              <a:endParaRPr lang="en-US" sz="1200" dirty="0"/>
+            </a:p>
+          </p:txBody>
+        </p:sp>
+        <p:sp>
+          <p:nvSpPr>
+            <p:cNvPr id="65" name="TextBox 64"/>
+            <p:cNvSpPr txBox="1"/>
+            <p:nvPr/>
+          </p:nvSpPr>
+          <p:spPr>
+            <a:xfrm>
+              <a:off x="4205853" y="5553477"/>
+              <a:ext cx="636938" cy="461665"/>
+            </a:xfrm>
+            <a:prstGeom prst="rect">
+              <a:avLst/>
+            </a:prstGeom>
+            <a:noFill/>
+          </p:spPr>
+          <p:txBody>
+            <a:bodyPr wrap="none" rtlCol="0">
+              <a:spAutoFit/>
+            </a:bodyPr>
+            <a:lstStyle/>
+            <a:p>
+              <a:r>
+                <a:rPr lang="en-US" sz="1200" dirty="0" smtClean="0"/>
+                <a:t>Carbon </a:t>
+              </a:r>
+              <a:br>
+                <a:rPr lang="en-US" sz="1200" dirty="0" smtClean="0"/>
+              </a:br>
+              <a:r>
+                <a:rPr lang="en-US" sz="1200" dirty="0" smtClean="0"/>
+                <a:t>Source</a:t>
+              </a:r>
+              <a:endParaRPr lang="en-US" sz="1200" dirty="0"/>
+            </a:p>
+          </p:txBody>
+        </p:sp>
+        <p:sp>
+          <p:nvSpPr>
+            <p:cNvPr id="66" name="TextBox 65"/>
+            <p:cNvSpPr txBox="1"/>
+            <p:nvPr/>
+          </p:nvSpPr>
+          <p:spPr>
+            <a:xfrm>
+              <a:off x="7211329" y="5639571"/>
+              <a:ext cx="800219" cy="276999"/>
+            </a:xfrm>
+            <a:prstGeom prst="rect">
+              <a:avLst/>
+            </a:prstGeom>
+            <a:noFill/>
+          </p:spPr>
+          <p:txBody>
+            <a:bodyPr wrap="none" rtlCol="0">
+              <a:spAutoFit/>
+            </a:bodyPr>
+            <a:lstStyle/>
+            <a:p>
+              <a:r>
+                <a:rPr lang="en-US" sz="1200" dirty="0" smtClean="0"/>
+                <a:t>Mg Stress</a:t>
+              </a:r>
+              <a:endParaRPr lang="en-US" sz="1200" dirty="0"/>
+            </a:p>
+          </p:txBody>
+        </p:sp>
+        <p:sp>
+          <p:nvSpPr>
+            <p:cNvPr id="67" name="TextBox 66"/>
+            <p:cNvSpPr txBox="1"/>
+            <p:nvPr/>
+          </p:nvSpPr>
+          <p:spPr>
+            <a:xfrm>
+              <a:off x="5682140" y="8050653"/>
+              <a:ext cx="774571" cy="276999"/>
+            </a:xfrm>
+            <a:prstGeom prst="rect">
+              <a:avLst/>
+            </a:prstGeom>
+            <a:noFill/>
+          </p:spPr>
+          <p:txBody>
+            <a:bodyPr wrap="none" rtlCol="0">
+              <a:spAutoFit/>
+            </a:bodyPr>
+            <a:lstStyle/>
+            <a:p>
+              <a:r>
+                <a:rPr lang="en-US" sz="1200" dirty="0" smtClean="0"/>
+                <a:t>Na Stress</a:t>
+              </a:r>
+              <a:endParaRPr lang="en-US" sz="1200" dirty="0"/>
+            </a:p>
+          </p:txBody>
+        </p:sp>
+      </p:grpSp>
+      <p:sp>
+        <p:nvSpPr>
+          <p:cNvPr id="69" name="TextBox 68"/>
+          <p:cNvSpPr txBox="1"/>
+          <p:nvPr/>
+        </p:nvSpPr>
+        <p:spPr>
+          <a:xfrm>
+            <a:off x="5478754" y="1818313"/>
+            <a:ext cx="1146468" cy="369332"/>
+          </a:xfrm>
+          <a:prstGeom prst="rect">
+            <a:avLst/>
+          </a:prstGeom>
+          <a:noFill/>
+        </p:spPr>
+        <p:txBody>
+          <a:bodyPr wrap="none" rtlCol="0">
+            <a:spAutoFit/>
+          </a:bodyPr>
+          <a:lstStyle/>
+          <a:p>
+            <a:r>
+              <a:rPr lang="en-US" dirty="0" smtClean="0"/>
+              <a:t>Stationary</a:t>
+            </a:r>
+            <a:endParaRPr lang="en-US" dirty="0"/>
+          </a:p>
+        </p:txBody>
+      </p:sp>
+      <p:grpSp>
+        <p:nvGrpSpPr>
+          <p:cNvPr id="22" name="Group 21"/>
+          <p:cNvGrpSpPr/>
+          <p:nvPr/>
+        </p:nvGrpSpPr>
+        <p:grpSpPr>
+          <a:xfrm>
+            <a:off x="99711" y="2204980"/>
+            <a:ext cx="3802330" cy="2752713"/>
+            <a:chOff x="4205853" y="2213390"/>
+            <a:chExt cx="3802330" cy="2752713"/>
+          </a:xfrm>
+        </p:grpSpPr>
+        <p:sp>
+          <p:nvSpPr>
+            <p:cNvPr id="49" name="TextBox 48"/>
+            <p:cNvSpPr txBox="1"/>
+            <p:nvPr/>
+          </p:nvSpPr>
+          <p:spPr>
+            <a:xfrm>
+              <a:off x="4205853" y="2213390"/>
+              <a:ext cx="636938" cy="461665"/>
+            </a:xfrm>
+            <a:prstGeom prst="rect">
+              <a:avLst/>
+            </a:prstGeom>
+            <a:noFill/>
+          </p:spPr>
+          <p:txBody>
+            <a:bodyPr wrap="none" rtlCol="0">
+              <a:spAutoFit/>
+            </a:bodyPr>
+            <a:lstStyle/>
+            <a:p>
+              <a:r>
+                <a:rPr lang="en-US" sz="1200" dirty="0" smtClean="0"/>
+                <a:t>Carbon </a:t>
+              </a:r>
+              <a:br>
+                <a:rPr lang="en-US" sz="1200" dirty="0" smtClean="0"/>
+              </a:br>
+              <a:r>
+                <a:rPr lang="en-US" sz="1200" dirty="0" smtClean="0"/>
+                <a:t>Source</a:t>
+              </a:r>
+              <a:endParaRPr lang="en-US" sz="1200" dirty="0"/>
+            </a:p>
+          </p:txBody>
+        </p:sp>
+        <p:sp>
+          <p:nvSpPr>
+            <p:cNvPr id="39" name="Oval 38"/>
+            <p:cNvSpPr/>
+            <p:nvPr/>
+          </p:nvSpPr>
+          <p:spPr>
+            <a:xfrm>
+              <a:off x="5794975" y="2256283"/>
+              <a:ext cx="1686771" cy="1658060"/>
+            </a:xfrm>
+            <a:prstGeom prst="ellipse">
+              <a:avLst/>
+            </a:prstGeom>
+            <a:solidFill>
+              <a:schemeClr val="accent5">
+                <a:alpha val="43000"/>
+              </a:schemeClr>
+            </a:solidFill>
+            <a:ln>
+              <a:solidFill>
+                <a:srgbClr val="000000"/>
+              </a:solidFill>
+            </a:ln>
+            <a:effectLst/>
+          </p:spPr>
+          <p:style>
+            <a:lnRef idx="1">
+              <a:schemeClr val="accent1"/>
+            </a:lnRef>
+            <a:fillRef idx="3">
+              <a:schemeClr val="accent1"/>
+            </a:fillRef>
+            <a:effectRef idx="2">
+              <a:schemeClr val="accent1"/>
+            </a:effectRef>
+            <a:fontRef idx="minor">
+              <a:schemeClr val="lt1"/>
+            </a:fontRef>
+          </p:style>
+          <p:txBody>
+            <a:bodyPr rtlCol="0" anchor="ctr"/>
+            <a:lstStyle/>
+            <a:p>
+              <a:pPr algn="ctr"/>
+              <a:endParaRPr lang="en-US" sz="1200"/>
+            </a:p>
+          </p:txBody>
+        </p:sp>
+        <p:sp>
+          <p:nvSpPr>
+            <p:cNvPr id="40" name="Oval 39"/>
+            <p:cNvSpPr/>
+            <p:nvPr/>
+          </p:nvSpPr>
+          <p:spPr>
+            <a:xfrm>
+              <a:off x="4622131" y="2256283"/>
+              <a:ext cx="1686771" cy="1658060"/>
+            </a:xfrm>
+            <a:prstGeom prst="ellipse">
+              <a:avLst/>
+            </a:prstGeom>
+            <a:solidFill>
+              <a:schemeClr val="accent4">
+                <a:alpha val="50000"/>
+              </a:schemeClr>
+            </a:solidFill>
+            <a:ln>
+              <a:solidFill>
+                <a:schemeClr val="tx1"/>
+              </a:solidFill>
+            </a:ln>
+            <a:effectLst/>
+          </p:spPr>
+          <p:style>
+            <a:lnRef idx="1">
+              <a:schemeClr val="accent1"/>
+            </a:lnRef>
+            <a:fillRef idx="3">
+              <a:schemeClr val="accent1"/>
+            </a:fillRef>
+            <a:effectRef idx="2">
+              <a:schemeClr val="accent1"/>
+            </a:effectRef>
+            <a:fontRef idx="minor">
+              <a:schemeClr val="lt1"/>
+            </a:fontRef>
+          </p:style>
+          <p:txBody>
+            <a:bodyPr rtlCol="0" anchor="ctr"/>
+            <a:lstStyle/>
+            <a:p>
+              <a:pPr algn="ctr"/>
+              <a:endParaRPr lang="en-US" sz="1200"/>
+            </a:p>
+          </p:txBody>
+        </p:sp>
+        <p:sp>
+          <p:nvSpPr>
+            <p:cNvPr id="41" name="Oval 40"/>
+            <p:cNvSpPr/>
+            <p:nvPr/>
+          </p:nvSpPr>
+          <p:spPr>
+            <a:xfrm>
+              <a:off x="5236546" y="3032198"/>
+              <a:ext cx="1686771" cy="1658060"/>
+            </a:xfrm>
+            <a:prstGeom prst="ellipse">
+              <a:avLst/>
+            </a:prstGeom>
+            <a:solidFill>
+              <a:schemeClr val="accent6">
+                <a:alpha val="39000"/>
+              </a:schemeClr>
+            </a:solidFill>
+            <a:ln>
+              <a:solidFill>
+                <a:srgbClr val="000000"/>
+              </a:solidFill>
+            </a:ln>
+            <a:effectLst/>
+          </p:spPr>
+          <p:style>
+            <a:lnRef idx="1">
+              <a:schemeClr val="accent1"/>
+            </a:lnRef>
+            <a:fillRef idx="3">
+              <a:schemeClr val="accent1"/>
+            </a:fillRef>
+            <a:effectRef idx="2">
+              <a:schemeClr val="accent1"/>
+            </a:effectRef>
+            <a:fontRef idx="minor">
+              <a:schemeClr val="lt1"/>
+            </a:fontRef>
+          </p:style>
+          <p:txBody>
+            <a:bodyPr rtlCol="0" anchor="ctr"/>
+            <a:lstStyle/>
+            <a:p>
+              <a:pPr algn="ctr"/>
+              <a:endParaRPr lang="en-US" sz="1200"/>
+            </a:p>
+          </p:txBody>
+        </p:sp>
+        <p:sp>
+          <p:nvSpPr>
+            <p:cNvPr id="42" name="TextBox 41"/>
+            <p:cNvSpPr txBox="1"/>
+            <p:nvPr/>
+          </p:nvSpPr>
+          <p:spPr>
+            <a:xfrm>
+              <a:off x="4970970" y="2813023"/>
+              <a:ext cx="531154" cy="276999"/>
+            </a:xfrm>
+            <a:prstGeom prst="rect">
+              <a:avLst/>
+            </a:prstGeom>
+            <a:noFill/>
+          </p:spPr>
+          <p:txBody>
+            <a:bodyPr wrap="square" rtlCol="0">
+              <a:spAutoFit/>
+            </a:bodyPr>
+            <a:lstStyle/>
+            <a:p>
+              <a:pPr algn="ctr"/>
+              <a:r>
+                <a:rPr lang="en-US" sz="1200" dirty="0" smtClean="0"/>
+                <a:t>188</a:t>
+              </a:r>
+              <a:endParaRPr lang="en-US" sz="1200" dirty="0"/>
+            </a:p>
+          </p:txBody>
+        </p:sp>
+        <p:sp>
+          <p:nvSpPr>
+            <p:cNvPr id="43" name="TextBox 42"/>
+            <p:cNvSpPr txBox="1"/>
+            <p:nvPr/>
+          </p:nvSpPr>
+          <p:spPr>
+            <a:xfrm>
+              <a:off x="5777749" y="2703435"/>
+              <a:ext cx="531154" cy="276999"/>
+            </a:xfrm>
+            <a:prstGeom prst="rect">
+              <a:avLst/>
+            </a:prstGeom>
+            <a:noFill/>
+          </p:spPr>
+          <p:txBody>
+            <a:bodyPr wrap="square" rtlCol="0">
+              <a:spAutoFit/>
+            </a:bodyPr>
+            <a:lstStyle/>
+            <a:p>
+              <a:pPr algn="ctr"/>
+              <a:r>
+                <a:rPr lang="en-US" sz="1200" dirty="0" smtClean="0"/>
+                <a:t>21</a:t>
+              </a:r>
+              <a:endParaRPr lang="en-US" sz="1200" dirty="0"/>
+            </a:p>
+          </p:txBody>
+        </p:sp>
+        <p:sp>
+          <p:nvSpPr>
+            <p:cNvPr id="44" name="TextBox 43"/>
+            <p:cNvSpPr txBox="1"/>
+            <p:nvPr/>
+          </p:nvSpPr>
+          <p:spPr>
+            <a:xfrm>
+              <a:off x="6571608" y="2813023"/>
+              <a:ext cx="531154" cy="276999"/>
+            </a:xfrm>
+            <a:prstGeom prst="rect">
+              <a:avLst/>
+            </a:prstGeom>
+            <a:noFill/>
+          </p:spPr>
+          <p:txBody>
+            <a:bodyPr wrap="square" rtlCol="0">
+              <a:spAutoFit/>
+            </a:bodyPr>
+            <a:lstStyle/>
+            <a:p>
+              <a:pPr algn="ctr"/>
+              <a:r>
+                <a:rPr lang="en-US" sz="1200" dirty="0" smtClean="0"/>
+                <a:t>47</a:t>
+              </a:r>
+              <a:endParaRPr lang="en-US" sz="1200" dirty="0"/>
+            </a:p>
+          </p:txBody>
+        </p:sp>
+        <p:sp>
+          <p:nvSpPr>
+            <p:cNvPr id="45" name="TextBox 44"/>
+            <p:cNvSpPr txBox="1"/>
+            <p:nvPr/>
+          </p:nvSpPr>
+          <p:spPr>
+            <a:xfrm>
+              <a:off x="5326985" y="3463328"/>
+              <a:ext cx="531154" cy="276999"/>
+            </a:xfrm>
+            <a:prstGeom prst="rect">
+              <a:avLst/>
+            </a:prstGeom>
+            <a:noFill/>
+          </p:spPr>
+          <p:txBody>
+            <a:bodyPr wrap="square" rtlCol="0">
+              <a:spAutoFit/>
+            </a:bodyPr>
+            <a:lstStyle/>
+            <a:p>
+              <a:pPr algn="ctr"/>
+              <a:r>
+                <a:rPr lang="en-US" sz="1200" dirty="0" smtClean="0"/>
+                <a:t>809</a:t>
+              </a:r>
+              <a:endParaRPr lang="en-US" sz="1200" dirty="0"/>
+            </a:p>
+          </p:txBody>
+        </p:sp>
+        <p:sp>
+          <p:nvSpPr>
+            <p:cNvPr id="46" name="TextBox 45"/>
+            <p:cNvSpPr txBox="1"/>
+            <p:nvPr/>
+          </p:nvSpPr>
+          <p:spPr>
+            <a:xfrm>
+              <a:off x="5777749" y="3183396"/>
+              <a:ext cx="531154" cy="276999"/>
+            </a:xfrm>
+            <a:prstGeom prst="rect">
+              <a:avLst/>
+            </a:prstGeom>
+            <a:noFill/>
+          </p:spPr>
+          <p:txBody>
+            <a:bodyPr wrap="square" rtlCol="0">
+              <a:spAutoFit/>
+            </a:bodyPr>
+            <a:lstStyle/>
+            <a:p>
+              <a:pPr algn="ctr"/>
+              <a:r>
+                <a:rPr lang="en-US" sz="1200" dirty="0" smtClean="0"/>
+                <a:t>52</a:t>
+              </a:r>
+              <a:endParaRPr lang="en-US" sz="1200" dirty="0"/>
+            </a:p>
+          </p:txBody>
+        </p:sp>
+        <p:sp>
+          <p:nvSpPr>
+            <p:cNvPr id="47" name="TextBox 46"/>
+            <p:cNvSpPr txBox="1"/>
+            <p:nvPr/>
+          </p:nvSpPr>
+          <p:spPr>
+            <a:xfrm>
+              <a:off x="6238559" y="3463328"/>
+              <a:ext cx="531154" cy="276999"/>
+            </a:xfrm>
+            <a:prstGeom prst="rect">
+              <a:avLst/>
+            </a:prstGeom>
+            <a:noFill/>
+          </p:spPr>
+          <p:txBody>
+            <a:bodyPr wrap="square" rtlCol="0">
+              <a:spAutoFit/>
+            </a:bodyPr>
+            <a:lstStyle/>
+            <a:p>
+              <a:pPr algn="ctr"/>
+              <a:r>
+                <a:rPr lang="en-US" sz="1200" dirty="0" smtClean="0"/>
+                <a:t>49</a:t>
+              </a:r>
+              <a:endParaRPr lang="en-US" sz="1200" dirty="0"/>
+            </a:p>
+          </p:txBody>
+        </p:sp>
+        <p:sp>
+          <p:nvSpPr>
+            <p:cNvPr id="48" name="TextBox 47"/>
+            <p:cNvSpPr txBox="1"/>
+            <p:nvPr/>
+          </p:nvSpPr>
+          <p:spPr>
+            <a:xfrm>
+              <a:off x="5777749" y="4023192"/>
+              <a:ext cx="531154" cy="276999"/>
+            </a:xfrm>
+            <a:prstGeom prst="rect">
+              <a:avLst/>
+            </a:prstGeom>
+            <a:noFill/>
+          </p:spPr>
+          <p:txBody>
+            <a:bodyPr wrap="square" rtlCol="0">
+              <a:spAutoFit/>
+            </a:bodyPr>
+            <a:lstStyle/>
+            <a:p>
+              <a:pPr algn="ctr"/>
+              <a:r>
+                <a:rPr lang="en-US" sz="1200" dirty="0" smtClean="0"/>
+                <a:t>1280</a:t>
+              </a:r>
+              <a:endParaRPr lang="en-US" sz="1200" dirty="0"/>
+            </a:p>
+          </p:txBody>
+        </p:sp>
+        <p:sp>
+          <p:nvSpPr>
+            <p:cNvPr id="50" name="TextBox 49"/>
+            <p:cNvSpPr txBox="1"/>
+            <p:nvPr/>
+          </p:nvSpPr>
+          <p:spPr>
+            <a:xfrm>
+              <a:off x="7207964" y="2278022"/>
+              <a:ext cx="800219" cy="276999"/>
+            </a:xfrm>
+            <a:prstGeom prst="rect">
+              <a:avLst/>
+            </a:prstGeom>
+            <a:noFill/>
+          </p:spPr>
+          <p:txBody>
+            <a:bodyPr wrap="none" rtlCol="0">
+              <a:spAutoFit/>
+            </a:bodyPr>
+            <a:lstStyle/>
+            <a:p>
+              <a:r>
+                <a:rPr lang="en-US" sz="1200" dirty="0" smtClean="0"/>
+                <a:t>Mg Stress</a:t>
+              </a:r>
+              <a:endParaRPr lang="en-US" sz="1200" dirty="0"/>
+            </a:p>
+          </p:txBody>
+        </p:sp>
+        <p:sp>
+          <p:nvSpPr>
+            <p:cNvPr id="51" name="TextBox 50"/>
+            <p:cNvSpPr txBox="1"/>
+            <p:nvPr/>
+          </p:nvSpPr>
+          <p:spPr>
+            <a:xfrm>
+              <a:off x="5678775" y="4689104"/>
+              <a:ext cx="774571" cy="276999"/>
+            </a:xfrm>
+            <a:prstGeom prst="rect">
+              <a:avLst/>
+            </a:prstGeom>
+            <a:noFill/>
+          </p:spPr>
+          <p:txBody>
+            <a:bodyPr wrap="none" rtlCol="0">
+              <a:spAutoFit/>
+            </a:bodyPr>
+            <a:lstStyle/>
+            <a:p>
+              <a:r>
+                <a:rPr lang="en-US" sz="1200" dirty="0" smtClean="0"/>
+                <a:t>Na Stress</a:t>
+              </a:r>
+              <a:endParaRPr lang="en-US" sz="1200" dirty="0"/>
+            </a:p>
+          </p:txBody>
+        </p:sp>
+      </p:grpSp>
+      <p:grpSp>
+        <p:nvGrpSpPr>
+          <p:cNvPr id="3" name="Group 2"/>
+          <p:cNvGrpSpPr/>
+          <p:nvPr/>
+        </p:nvGrpSpPr>
+        <p:grpSpPr>
+          <a:xfrm>
+            <a:off x="169888" y="1778717"/>
+            <a:ext cx="4408738" cy="3826127"/>
+            <a:chOff x="221204" y="1509308"/>
+            <a:chExt cx="4408738" cy="3826127"/>
+          </a:xfrm>
+        </p:grpSpPr>
+        <p:sp>
+          <p:nvSpPr>
+            <p:cNvPr id="2" name="TextBox 1"/>
+            <p:cNvSpPr txBox="1"/>
+            <p:nvPr/>
+          </p:nvSpPr>
+          <p:spPr>
+            <a:xfrm>
+              <a:off x="221204" y="1549541"/>
+              <a:ext cx="325730" cy="369332"/>
+            </a:xfrm>
+            <a:prstGeom prst="rect">
+              <a:avLst/>
+            </a:prstGeom>
+            <a:noFill/>
+          </p:spPr>
+          <p:txBody>
+            <a:bodyPr wrap="none" rtlCol="0">
+              <a:spAutoFit/>
+            </a:bodyPr>
+            <a:lstStyle/>
+            <a:p>
+              <a:r>
+                <a:rPr lang="en-US" b="1" dirty="0" smtClean="0"/>
+                <a:t>A</a:t>
+              </a:r>
+              <a:endParaRPr lang="en-US" b="1" dirty="0"/>
+            </a:p>
+          </p:txBody>
+        </p:sp>
+        <p:sp>
+          <p:nvSpPr>
+            <p:cNvPr id="75" name="TextBox 74"/>
+            <p:cNvSpPr txBox="1"/>
+            <p:nvPr/>
+          </p:nvSpPr>
+          <p:spPr>
+            <a:xfrm>
+              <a:off x="221204" y="4966103"/>
+              <a:ext cx="306845" cy="369332"/>
+            </a:xfrm>
+            <a:prstGeom prst="rect">
+              <a:avLst/>
+            </a:prstGeom>
+            <a:noFill/>
+          </p:spPr>
+          <p:txBody>
+            <a:bodyPr wrap="none" rtlCol="0">
+              <a:spAutoFit/>
+            </a:bodyPr>
+            <a:lstStyle/>
+            <a:p>
+              <a:r>
+                <a:rPr lang="en-US" b="1" dirty="0"/>
+                <a:t>C</a:t>
+              </a:r>
+            </a:p>
+          </p:txBody>
+        </p:sp>
+        <p:sp>
+          <p:nvSpPr>
+            <p:cNvPr id="76" name="TextBox 75"/>
+            <p:cNvSpPr txBox="1"/>
+            <p:nvPr/>
+          </p:nvSpPr>
+          <p:spPr>
+            <a:xfrm>
+              <a:off x="4299766" y="4925870"/>
+              <a:ext cx="330176" cy="369332"/>
+            </a:xfrm>
+            <a:prstGeom prst="rect">
+              <a:avLst/>
+            </a:prstGeom>
+            <a:noFill/>
+          </p:spPr>
+          <p:txBody>
+            <a:bodyPr wrap="none" rtlCol="0">
+              <a:spAutoFit/>
+            </a:bodyPr>
+            <a:lstStyle/>
+            <a:p>
+              <a:r>
+                <a:rPr lang="en-US" b="1" dirty="0" smtClean="0"/>
+                <a:t>D</a:t>
+              </a:r>
+              <a:endParaRPr lang="en-US" b="1" dirty="0"/>
+            </a:p>
+          </p:txBody>
+        </p:sp>
+        <p:sp>
+          <p:nvSpPr>
+            <p:cNvPr id="77" name="TextBox 76"/>
+            <p:cNvSpPr txBox="1"/>
+            <p:nvPr/>
+          </p:nvSpPr>
+          <p:spPr>
+            <a:xfrm>
+              <a:off x="4299766" y="1509308"/>
+              <a:ext cx="314058" cy="369332"/>
+            </a:xfrm>
+            <a:prstGeom prst="rect">
+              <a:avLst/>
+            </a:prstGeom>
+            <a:noFill/>
+          </p:spPr>
+          <p:txBody>
+            <a:bodyPr wrap="none" rtlCol="0">
+              <a:spAutoFit/>
+            </a:bodyPr>
+            <a:lstStyle/>
+            <a:p>
+              <a:r>
+                <a:rPr lang="en-US" b="1" dirty="0"/>
+                <a:t>B</a:t>
+              </a:r>
+            </a:p>
+          </p:txBody>
+        </p:sp>
+      </p:grpSp>
+      <p:sp>
+        <p:nvSpPr>
+          <p:cNvPr id="72" name="TextBox 71"/>
+          <p:cNvSpPr txBox="1"/>
+          <p:nvPr/>
+        </p:nvSpPr>
+        <p:spPr>
+          <a:xfrm>
+            <a:off x="1220843" y="1778717"/>
+            <a:ext cx="1289911" cy="369332"/>
+          </a:xfrm>
+          <a:prstGeom prst="rect">
+            <a:avLst/>
+          </a:prstGeom>
+          <a:noFill/>
+        </p:spPr>
+        <p:txBody>
+          <a:bodyPr wrap="none" rtlCol="0">
+            <a:spAutoFit/>
+          </a:bodyPr>
+          <a:lstStyle/>
+          <a:p>
+            <a:r>
+              <a:rPr lang="en-US" dirty="0" smtClean="0"/>
+              <a:t>Exponential</a:t>
+            </a:r>
+            <a:endParaRPr lang="en-US" dirty="0"/>
+          </a:p>
+        </p:txBody>
+      </p:sp>
+    </p:spTree>
+    <p:extLst>
+      <p:ext uri="{BB962C8B-B14F-4D97-AF65-F5344CB8AC3E}">
+        <p14:creationId xmlns:p14="http://schemas.microsoft.com/office/powerpoint/2010/main" val="3445166557"/>
       </p:ext>
     </p:extLst>
   </p:cSld>

</xml_diff>

<commit_message>
latest figure and protein data updates
There will be some more updates in text figures and tables
</commit_message>
<xml_diff>
--- a/text/fig5_responses_to_conditions.pptx
+++ b/text/fig5_responses_to_conditions.pptx
@@ -289,7 +289,7 @@
           <a:p>
             <a:fld id="{1FCDAA73-CC50-0946-9171-AC34B7EC631E}" type="datetimeFigureOut">
               <a:rPr lang="en-US" smtClean="0"/>
-              <a:t>3/2/16</a:t>
+              <a:t>3/14/16</a:t>
             </a:fld>
             <a:endParaRPr lang="en-US"/>
           </a:p>
@@ -459,7 +459,7 @@
           <a:p>
             <a:fld id="{1FCDAA73-CC50-0946-9171-AC34B7EC631E}" type="datetimeFigureOut">
               <a:rPr lang="en-US" smtClean="0"/>
-              <a:t>3/2/16</a:t>
+              <a:t>3/14/16</a:t>
             </a:fld>
             <a:endParaRPr lang="en-US"/>
           </a:p>
@@ -639,7 +639,7 @@
           <a:p>
             <a:fld id="{1FCDAA73-CC50-0946-9171-AC34B7EC631E}" type="datetimeFigureOut">
               <a:rPr lang="en-US" smtClean="0"/>
-              <a:t>3/2/16</a:t>
+              <a:t>3/14/16</a:t>
             </a:fld>
             <a:endParaRPr lang="en-US"/>
           </a:p>
@@ -809,7 +809,7 @@
           <a:p>
             <a:fld id="{1FCDAA73-CC50-0946-9171-AC34B7EC631E}" type="datetimeFigureOut">
               <a:rPr lang="en-US" smtClean="0"/>
-              <a:t>3/2/16</a:t>
+              <a:t>3/14/16</a:t>
             </a:fld>
             <a:endParaRPr lang="en-US"/>
           </a:p>
@@ -1055,7 +1055,7 @@
           <a:p>
             <a:fld id="{1FCDAA73-CC50-0946-9171-AC34B7EC631E}" type="datetimeFigureOut">
               <a:rPr lang="en-US" smtClean="0"/>
-              <a:t>3/2/16</a:t>
+              <a:t>3/14/16</a:t>
             </a:fld>
             <a:endParaRPr lang="en-US"/>
           </a:p>
@@ -1343,7 +1343,7 @@
           <a:p>
             <a:fld id="{1FCDAA73-CC50-0946-9171-AC34B7EC631E}" type="datetimeFigureOut">
               <a:rPr lang="en-US" smtClean="0"/>
-              <a:t>3/2/16</a:t>
+              <a:t>3/14/16</a:t>
             </a:fld>
             <a:endParaRPr lang="en-US"/>
           </a:p>
@@ -1770,7 +1770,7 @@
           <a:p>
             <a:fld id="{1FCDAA73-CC50-0946-9171-AC34B7EC631E}" type="datetimeFigureOut">
               <a:rPr lang="en-US" smtClean="0"/>
-              <a:t>3/2/16</a:t>
+              <a:t>3/14/16</a:t>
             </a:fld>
             <a:endParaRPr lang="en-US"/>
           </a:p>
@@ -1888,7 +1888,7 @@
           <a:p>
             <a:fld id="{1FCDAA73-CC50-0946-9171-AC34B7EC631E}" type="datetimeFigureOut">
               <a:rPr lang="en-US" smtClean="0"/>
-              <a:t>3/2/16</a:t>
+              <a:t>3/14/16</a:t>
             </a:fld>
             <a:endParaRPr lang="en-US"/>
           </a:p>
@@ -1983,7 +1983,7 @@
           <a:p>
             <a:fld id="{1FCDAA73-CC50-0946-9171-AC34B7EC631E}" type="datetimeFigureOut">
               <a:rPr lang="en-US" smtClean="0"/>
-              <a:t>3/2/16</a:t>
+              <a:t>3/14/16</a:t>
             </a:fld>
             <a:endParaRPr lang="en-US"/>
           </a:p>
@@ -2260,7 +2260,7 @@
           <a:p>
             <a:fld id="{1FCDAA73-CC50-0946-9171-AC34B7EC631E}" type="datetimeFigureOut">
               <a:rPr lang="en-US" smtClean="0"/>
-              <a:t>3/2/16</a:t>
+              <a:t>3/14/16</a:t>
             </a:fld>
             <a:endParaRPr lang="en-US"/>
           </a:p>
@@ -2513,7 +2513,7 @@
           <a:p>
             <a:fld id="{1FCDAA73-CC50-0946-9171-AC34B7EC631E}" type="datetimeFigureOut">
               <a:rPr lang="en-US" smtClean="0"/>
-              <a:t>3/2/16</a:t>
+              <a:t>3/14/16</a:t>
             </a:fld>
             <a:endParaRPr lang="en-US"/>
           </a:p>
@@ -2726,7 +2726,7 @@
           <a:p>
             <a:fld id="{1FCDAA73-CC50-0946-9171-AC34B7EC631E}" type="datetimeFigureOut">
               <a:rPr lang="en-US" smtClean="0"/>
-              <a:t>3/2/16</a:t>
+              <a:t>3/14/16</a:t>
             </a:fld>
             <a:endParaRPr lang="en-US"/>
           </a:p>
@@ -3386,7 +3386,7 @@
               <a:pPr algn="ctr"/>
               <a:r>
                 <a:rPr lang="en-US" sz="1200" dirty="0" smtClean="0"/>
-                <a:t>575</a:t>
+                <a:t>570</a:t>
               </a:r>
               <a:endParaRPr lang="en-US" sz="1200" dirty="0"/>
             </a:p>
@@ -3417,7 +3417,7 @@
               <a:pPr algn="ctr"/>
               <a:r>
                 <a:rPr lang="en-US" sz="1200" dirty="0" smtClean="0"/>
-                <a:t>32</a:t>
+                <a:t>33</a:t>
               </a:r>
               <a:endParaRPr lang="en-US" sz="1200" dirty="0"/>
             </a:p>
@@ -3448,7 +3448,7 @@
               <a:pPr algn="ctr"/>
               <a:r>
                 <a:rPr lang="en-US" sz="1200" dirty="0" smtClean="0"/>
-                <a:t>66</a:t>
+                <a:t>65</a:t>
               </a:r>
               <a:endParaRPr lang="en-US" sz="1200" dirty="0"/>
             </a:p>
@@ -3479,7 +3479,7 @@
               <a:pPr algn="ctr"/>
               <a:r>
                 <a:rPr lang="en-US" sz="1200" dirty="0" smtClean="0"/>
-                <a:t>92</a:t>
+                <a:t>87</a:t>
               </a:r>
               <a:endParaRPr lang="en-US" sz="1200" dirty="0"/>
             </a:p>
@@ -3510,7 +3510,7 @@
               <a:pPr algn="ctr"/>
               <a:r>
                 <a:rPr lang="en-US" sz="1200" dirty="0" smtClean="0"/>
-                <a:t>138</a:t>
+                <a:t>143</a:t>
               </a:r>
               <a:endParaRPr lang="en-US" sz="1200" dirty="0"/>
             </a:p>
@@ -3763,7 +3763,7 @@
               <a:pPr algn="ctr"/>
               <a:r>
                 <a:rPr lang="en-US" sz="1200" dirty="0" smtClean="0"/>
-                <a:t>53</a:t>
+                <a:t>153</a:t>
               </a:r>
               <a:endParaRPr lang="en-US" sz="1200" dirty="0"/>
             </a:p>
@@ -3794,8 +3794,9 @@
               <a:pPr algn="ctr"/>
               <a:r>
                 <a:rPr lang="en-US" sz="1200" dirty="0"/>
-                <a:t>2</a:t>
-              </a:r>
+                <a:t>8</a:t>
+              </a:r>
+              <a:endParaRPr lang="en-US" sz="1200" dirty="0"/>
             </a:p>
           </p:txBody>
         </p:sp>
@@ -3824,7 +3825,7 @@
               <a:pPr algn="ctr"/>
               <a:r>
                 <a:rPr lang="en-US" sz="1200" dirty="0" smtClean="0"/>
-                <a:t>14</a:t>
+                <a:t>21</a:t>
               </a:r>
               <a:endParaRPr lang="en-US" sz="1200" dirty="0"/>
             </a:p>
@@ -3855,7 +3856,7 @@
               <a:pPr algn="ctr"/>
               <a:r>
                 <a:rPr lang="en-US" sz="1200" dirty="0" smtClean="0"/>
-                <a:t>297</a:t>
+                <a:t>90</a:t>
               </a:r>
               <a:endParaRPr lang="en-US" sz="1200" dirty="0"/>
             </a:p>
@@ -3916,7 +3917,7 @@
               <a:pPr algn="ctr"/>
               <a:r>
                 <a:rPr lang="en-US" sz="1200" dirty="0" smtClean="0"/>
-                <a:t>16</a:t>
+                <a:t>20</a:t>
               </a:r>
               <a:endParaRPr lang="en-US" sz="1200" dirty="0"/>
             </a:p>
@@ -3947,7 +3948,7 @@
               <a:pPr algn="ctr"/>
               <a:r>
                 <a:rPr lang="en-US" sz="1200" dirty="0" smtClean="0"/>
-                <a:t>1186</a:t>
+                <a:t>1372</a:t>
               </a:r>
               <a:endParaRPr lang="en-US" sz="1200" dirty="0"/>
             </a:p>
@@ -4237,7 +4238,7 @@
               <a:pPr algn="ctr"/>
               <a:r>
                 <a:rPr lang="en-US" sz="1200" dirty="0" smtClean="0"/>
-                <a:t>323</a:t>
+                <a:t>310</a:t>
               </a:r>
               <a:endParaRPr lang="en-US" sz="1200" dirty="0"/>
             </a:p>
@@ -4268,8 +4269,9 @@
               <a:pPr algn="ctr"/>
               <a:r>
                 <a:rPr lang="en-US" sz="1200" dirty="0" smtClean="0"/>
-                <a:t>808</a:t>
-              </a:r>
+                <a:t>458</a:t>
+              </a:r>
+              <a:endParaRPr lang="en-US" sz="1200" dirty="0" smtClean="0"/>
             </a:p>
           </p:txBody>
         </p:sp>
@@ -4298,7 +4300,7 @@
               <a:pPr algn="ctr"/>
               <a:r>
                 <a:rPr lang="en-US" sz="1200" dirty="0" smtClean="0"/>
-                <a:t>936</a:t>
+                <a:t>688</a:t>
               </a:r>
               <a:endParaRPr lang="en-US" sz="1200" dirty="0"/>
             </a:p>
@@ -4329,7 +4331,7 @@
               <a:pPr algn="ctr"/>
               <a:r>
                 <a:rPr lang="en-US" sz="1200" dirty="0" smtClean="0"/>
-                <a:t>28</a:t>
+                <a:t>22</a:t>
               </a:r>
               <a:endParaRPr lang="en-US" sz="1200" dirty="0"/>
             </a:p>
@@ -4360,7 +4362,7 @@
               <a:pPr algn="ctr"/>
               <a:r>
                 <a:rPr lang="en-US" sz="1200" dirty="0" smtClean="0"/>
-                <a:t>57</a:t>
+                <a:t>38</a:t>
               </a:r>
               <a:endParaRPr lang="en-US" sz="1200" dirty="0"/>
             </a:p>
@@ -4391,7 +4393,7 @@
               <a:pPr algn="ctr"/>
               <a:r>
                 <a:rPr lang="en-US" sz="1200" dirty="0" smtClean="0"/>
-                <a:t>61</a:t>
+                <a:t>39</a:t>
               </a:r>
               <a:endParaRPr lang="en-US" sz="1200" dirty="0"/>
             </a:p>
@@ -4422,7 +4424,7 @@
               <a:pPr algn="ctr"/>
               <a:r>
                 <a:rPr lang="en-US" sz="1200" dirty="0" smtClean="0"/>
-                <a:t>81</a:t>
+                <a:t>104</a:t>
               </a:r>
               <a:endParaRPr lang="en-US" sz="1200" dirty="0"/>
             </a:p>
@@ -4809,7 +4811,7 @@
               <a:pPr algn="ctr"/>
               <a:r>
                 <a:rPr lang="en-US" sz="1200" dirty="0" smtClean="0"/>
-                <a:t>188</a:t>
+                <a:t>287</a:t>
               </a:r>
               <a:endParaRPr lang="en-US" sz="1200" dirty="0"/>
             </a:p>
@@ -4840,7 +4842,7 @@
               <a:pPr algn="ctr"/>
               <a:r>
                 <a:rPr lang="en-US" sz="1200" dirty="0" smtClean="0"/>
-                <a:t>21</a:t>
+                <a:t>61</a:t>
               </a:r>
               <a:endParaRPr lang="en-US" sz="1200" dirty="0"/>
             </a:p>
@@ -4871,7 +4873,7 @@
               <a:pPr algn="ctr"/>
               <a:r>
                 <a:rPr lang="en-US" sz="1200" dirty="0" smtClean="0"/>
-                <a:t>47</a:t>
+                <a:t>53</a:t>
               </a:r>
               <a:endParaRPr lang="en-US" sz="1200" dirty="0"/>
             </a:p>
@@ -4902,7 +4904,7 @@
               <a:pPr algn="ctr"/>
               <a:r>
                 <a:rPr lang="en-US" sz="1200" dirty="0" smtClean="0"/>
-                <a:t>809</a:t>
+                <a:t>502</a:t>
               </a:r>
               <a:endParaRPr lang="en-US" sz="1200" dirty="0"/>
             </a:p>
@@ -4933,7 +4935,7 @@
               <a:pPr algn="ctr"/>
               <a:r>
                 <a:rPr lang="en-US" sz="1200" dirty="0" smtClean="0"/>
-                <a:t>52</a:t>
+                <a:t>87</a:t>
               </a:r>
               <a:endParaRPr lang="en-US" sz="1200" dirty="0"/>
             </a:p>
@@ -4964,7 +4966,7 @@
               <a:pPr algn="ctr"/>
               <a:r>
                 <a:rPr lang="en-US" sz="1200" dirty="0" smtClean="0"/>
-                <a:t>49</a:t>
+                <a:t>35</a:t>
               </a:r>
               <a:endParaRPr lang="en-US" sz="1200" dirty="0"/>
             </a:p>
@@ -4995,7 +4997,7 @@
               <a:pPr algn="ctr"/>
               <a:r>
                 <a:rPr lang="en-US" sz="1200" dirty="0" smtClean="0"/>
-                <a:t>1280</a:t>
+                <a:t>1645</a:t>
               </a:r>
               <a:endParaRPr lang="en-US" sz="1200" dirty="0"/>
             </a:p>

</xml_diff>